<commit_message>
edited motivation slide in presentation.pptx
</commit_message>
<xml_diff>
--- a/presentation.pptx
+++ b/presentation.pptx
@@ -203,7 +203,7 @@
           <a:p>
             <a:fld id="{BE2A43AE-C781-437F-82F9-639F52CA20CD}" type="datetimeFigureOut">
               <a:rPr lang="en-US" smtClean="0"/>
-              <a:t>4/25/2023</a:t>
+              <a:t>4/26/2023</a:t>
             </a:fld>
             <a:endParaRPr lang="en-US"/>
           </a:p>
@@ -795,7 +795,7 @@
           <p:cNvPr id="2" name="Title 1">
             <a:extLst>
               <a:ext uri="{FF2B5EF4-FFF2-40B4-BE49-F238E27FC236}">
-                <a16:creationId xmlns:a16="http://schemas.microsoft.com/office/drawing/2014/main" id="{213A34AA-5E43-435A-A7B7-BCC9F3E207DC}"/>
+                <a16:creationId xmlns:a16="http://schemas.microsoft.com/office/drawing/2014/main" xmlns="" id="{213A34AA-5E43-435A-A7B7-BCC9F3E207DC}"/>
               </a:ext>
             </a:extLst>
           </p:cNvPr>
@@ -832,7 +832,7 @@
           <p:cNvPr id="3" name="Subtitle 2">
             <a:extLst>
               <a:ext uri="{FF2B5EF4-FFF2-40B4-BE49-F238E27FC236}">
-                <a16:creationId xmlns:a16="http://schemas.microsoft.com/office/drawing/2014/main" id="{5F4F9EDB-7F05-4023-B4E0-405F390EA9F3}"/>
+                <a16:creationId xmlns:a16="http://schemas.microsoft.com/office/drawing/2014/main" xmlns="" id="{5F4F9EDB-7F05-4023-B4E0-405F390EA9F3}"/>
               </a:ext>
             </a:extLst>
           </p:cNvPr>
@@ -902,7 +902,7 @@
           <p:cNvPr id="4" name="Date Placeholder 3">
             <a:extLst>
               <a:ext uri="{FF2B5EF4-FFF2-40B4-BE49-F238E27FC236}">
-                <a16:creationId xmlns:a16="http://schemas.microsoft.com/office/drawing/2014/main" id="{F3FF794F-1319-48B1-A178-7CF25CA76618}"/>
+                <a16:creationId xmlns:a16="http://schemas.microsoft.com/office/drawing/2014/main" xmlns="" id="{F3FF794F-1319-48B1-A178-7CF25CA76618}"/>
               </a:ext>
             </a:extLst>
           </p:cNvPr>
@@ -920,7 +920,7 @@
           <a:p>
             <a:fld id="{65DDBF0C-176C-41A2-A7B0-D55ED202E141}" type="datetimeFigureOut">
               <a:rPr lang="en-US" smtClean="0"/>
-              <a:t>4/25/2023</a:t>
+              <a:t>4/26/2023</a:t>
             </a:fld>
             <a:endParaRPr lang="en-US"/>
           </a:p>
@@ -931,7 +931,7 @@
           <p:cNvPr id="5" name="Footer Placeholder 4">
             <a:extLst>
               <a:ext uri="{FF2B5EF4-FFF2-40B4-BE49-F238E27FC236}">
-                <a16:creationId xmlns:a16="http://schemas.microsoft.com/office/drawing/2014/main" id="{AD6F78D6-F2B5-4B62-BD56-CE7B1EE4BFD4}"/>
+                <a16:creationId xmlns:a16="http://schemas.microsoft.com/office/drawing/2014/main" xmlns="" id="{AD6F78D6-F2B5-4B62-BD56-CE7B1EE4BFD4}"/>
               </a:ext>
             </a:extLst>
           </p:cNvPr>
@@ -956,7 +956,7 @@
           <p:cNvPr id="6" name="Slide Number Placeholder 5">
             <a:extLst>
               <a:ext uri="{FF2B5EF4-FFF2-40B4-BE49-F238E27FC236}">
-                <a16:creationId xmlns:a16="http://schemas.microsoft.com/office/drawing/2014/main" id="{7B5ED8BB-7569-424A-BB8B-F7DB6CD610AF}"/>
+                <a16:creationId xmlns:a16="http://schemas.microsoft.com/office/drawing/2014/main" xmlns="" id="{7B5ED8BB-7569-424A-BB8B-F7DB6CD610AF}"/>
               </a:ext>
             </a:extLst>
           </p:cNvPr>
@@ -1015,7 +1015,7 @@
           <p:cNvPr id="2" name="Title 1">
             <a:extLst>
               <a:ext uri="{FF2B5EF4-FFF2-40B4-BE49-F238E27FC236}">
-                <a16:creationId xmlns:a16="http://schemas.microsoft.com/office/drawing/2014/main" id="{674061D1-01DA-4CF4-ADFD-4320CF9A1AC2}"/>
+                <a16:creationId xmlns:a16="http://schemas.microsoft.com/office/drawing/2014/main" xmlns="" id="{674061D1-01DA-4CF4-ADFD-4320CF9A1AC2}"/>
               </a:ext>
             </a:extLst>
           </p:cNvPr>
@@ -1043,7 +1043,7 @@
           <p:cNvPr id="3" name="Vertical Text Placeholder 2">
             <a:extLst>
               <a:ext uri="{FF2B5EF4-FFF2-40B4-BE49-F238E27FC236}">
-                <a16:creationId xmlns:a16="http://schemas.microsoft.com/office/drawing/2014/main" id="{72FADD50-F22E-4FF0-8992-4446F74924B0}"/>
+                <a16:creationId xmlns:a16="http://schemas.microsoft.com/office/drawing/2014/main" xmlns="" id="{72FADD50-F22E-4FF0-8992-4446F74924B0}"/>
               </a:ext>
             </a:extLst>
           </p:cNvPr>
@@ -1100,7 +1100,7 @@
           <p:cNvPr id="4" name="Date Placeholder 3">
             <a:extLst>
               <a:ext uri="{FF2B5EF4-FFF2-40B4-BE49-F238E27FC236}">
-                <a16:creationId xmlns:a16="http://schemas.microsoft.com/office/drawing/2014/main" id="{4FD568AB-3774-460A-9993-F8C912398DEE}"/>
+                <a16:creationId xmlns:a16="http://schemas.microsoft.com/office/drawing/2014/main" xmlns="" id="{4FD568AB-3774-460A-9993-F8C912398DEE}"/>
               </a:ext>
             </a:extLst>
           </p:cNvPr>
@@ -1118,7 +1118,7 @@
           <a:p>
             <a:fld id="{65DDBF0C-176C-41A2-A7B0-D55ED202E141}" type="datetimeFigureOut">
               <a:rPr lang="en-US" smtClean="0"/>
-              <a:t>4/25/2023</a:t>
+              <a:t>4/26/2023</a:t>
             </a:fld>
             <a:endParaRPr lang="en-US"/>
           </a:p>
@@ -1129,7 +1129,7 @@
           <p:cNvPr id="5" name="Footer Placeholder 4">
             <a:extLst>
               <a:ext uri="{FF2B5EF4-FFF2-40B4-BE49-F238E27FC236}">
-                <a16:creationId xmlns:a16="http://schemas.microsoft.com/office/drawing/2014/main" id="{26595190-64E7-44FA-8F10-C4B9CE118C7C}"/>
+                <a16:creationId xmlns:a16="http://schemas.microsoft.com/office/drawing/2014/main" xmlns="" id="{26595190-64E7-44FA-8F10-C4B9CE118C7C}"/>
               </a:ext>
             </a:extLst>
           </p:cNvPr>
@@ -1154,7 +1154,7 @@
           <p:cNvPr id="6" name="Slide Number Placeholder 5">
             <a:extLst>
               <a:ext uri="{FF2B5EF4-FFF2-40B4-BE49-F238E27FC236}">
-                <a16:creationId xmlns:a16="http://schemas.microsoft.com/office/drawing/2014/main" id="{1269AE7E-E85B-4C0C-9F9F-4A9E512A8DD4}"/>
+                <a16:creationId xmlns:a16="http://schemas.microsoft.com/office/drawing/2014/main" xmlns="" id="{1269AE7E-E85B-4C0C-9F9F-4A9E512A8DD4}"/>
               </a:ext>
             </a:extLst>
           </p:cNvPr>
@@ -1213,7 +1213,7 @@
           <p:cNvPr id="2" name="Vertical Title 1">
             <a:extLst>
               <a:ext uri="{FF2B5EF4-FFF2-40B4-BE49-F238E27FC236}">
-                <a16:creationId xmlns:a16="http://schemas.microsoft.com/office/drawing/2014/main" id="{75F13DAB-B72E-415D-AB8E-CE29234F5655}"/>
+                <a16:creationId xmlns:a16="http://schemas.microsoft.com/office/drawing/2014/main" xmlns="" id="{75F13DAB-B72E-415D-AB8E-CE29234F5655}"/>
               </a:ext>
             </a:extLst>
           </p:cNvPr>
@@ -1246,7 +1246,7 @@
           <p:cNvPr id="3" name="Vertical Text Placeholder 2">
             <a:extLst>
               <a:ext uri="{FF2B5EF4-FFF2-40B4-BE49-F238E27FC236}">
-                <a16:creationId xmlns:a16="http://schemas.microsoft.com/office/drawing/2014/main" id="{8A678E1E-5EB3-48CE-A09B-F57E17B5BA50}"/>
+                <a16:creationId xmlns:a16="http://schemas.microsoft.com/office/drawing/2014/main" xmlns="" id="{8A678E1E-5EB3-48CE-A09B-F57E17B5BA50}"/>
               </a:ext>
             </a:extLst>
           </p:cNvPr>
@@ -1308,7 +1308,7 @@
           <p:cNvPr id="4" name="Date Placeholder 3">
             <a:extLst>
               <a:ext uri="{FF2B5EF4-FFF2-40B4-BE49-F238E27FC236}">
-                <a16:creationId xmlns:a16="http://schemas.microsoft.com/office/drawing/2014/main" id="{0B724926-44BF-43CC-984F-83B2B3ABCB87}"/>
+                <a16:creationId xmlns:a16="http://schemas.microsoft.com/office/drawing/2014/main" xmlns="" id="{0B724926-44BF-43CC-984F-83B2B3ABCB87}"/>
               </a:ext>
             </a:extLst>
           </p:cNvPr>
@@ -1326,7 +1326,7 @@
           <a:p>
             <a:fld id="{65DDBF0C-176C-41A2-A7B0-D55ED202E141}" type="datetimeFigureOut">
               <a:rPr lang="en-US" smtClean="0"/>
-              <a:t>4/25/2023</a:t>
+              <a:t>4/26/2023</a:t>
             </a:fld>
             <a:endParaRPr lang="en-US"/>
           </a:p>
@@ -1337,7 +1337,7 @@
           <p:cNvPr id="5" name="Footer Placeholder 4">
             <a:extLst>
               <a:ext uri="{FF2B5EF4-FFF2-40B4-BE49-F238E27FC236}">
-                <a16:creationId xmlns:a16="http://schemas.microsoft.com/office/drawing/2014/main" id="{5F3EF2D1-473B-44ED-BC3D-63CE7CEE9F7B}"/>
+                <a16:creationId xmlns:a16="http://schemas.microsoft.com/office/drawing/2014/main" xmlns="" id="{5F3EF2D1-473B-44ED-BC3D-63CE7CEE9F7B}"/>
               </a:ext>
             </a:extLst>
           </p:cNvPr>
@@ -1362,7 +1362,7 @@
           <p:cNvPr id="6" name="Slide Number Placeholder 5">
             <a:extLst>
               <a:ext uri="{FF2B5EF4-FFF2-40B4-BE49-F238E27FC236}">
-                <a16:creationId xmlns:a16="http://schemas.microsoft.com/office/drawing/2014/main" id="{E5835003-389E-431A-BBE3-43DD45A54185}"/>
+                <a16:creationId xmlns:a16="http://schemas.microsoft.com/office/drawing/2014/main" xmlns="" id="{E5835003-389E-431A-BBE3-43DD45A54185}"/>
               </a:ext>
             </a:extLst>
           </p:cNvPr>
@@ -1421,7 +1421,7 @@
           <p:cNvPr id="2" name="Title 1">
             <a:extLst>
               <a:ext uri="{FF2B5EF4-FFF2-40B4-BE49-F238E27FC236}">
-                <a16:creationId xmlns:a16="http://schemas.microsoft.com/office/drawing/2014/main" id="{5452D5BD-C1DF-4673-AD18-9028F79FC53C}"/>
+                <a16:creationId xmlns:a16="http://schemas.microsoft.com/office/drawing/2014/main" xmlns="" id="{5452D5BD-C1DF-4673-AD18-9028F79FC53C}"/>
               </a:ext>
             </a:extLst>
           </p:cNvPr>
@@ -1460,7 +1460,7 @@
           <p:cNvPr id="3" name="Content Placeholder 2">
             <a:extLst>
               <a:ext uri="{FF2B5EF4-FFF2-40B4-BE49-F238E27FC236}">
-                <a16:creationId xmlns:a16="http://schemas.microsoft.com/office/drawing/2014/main" id="{872F80AF-00BC-4B52-99D4-8FCA3A097FC0}"/>
+                <a16:creationId xmlns:a16="http://schemas.microsoft.com/office/drawing/2014/main" xmlns="" id="{872F80AF-00BC-4B52-99D4-8FCA3A097FC0}"/>
               </a:ext>
             </a:extLst>
           </p:cNvPr>
@@ -1517,7 +1517,7 @@
           <p:cNvPr id="4" name="Date Placeholder 3">
             <a:extLst>
               <a:ext uri="{FF2B5EF4-FFF2-40B4-BE49-F238E27FC236}">
-                <a16:creationId xmlns:a16="http://schemas.microsoft.com/office/drawing/2014/main" id="{0292E782-6B5B-40FC-91C1-A2D12D0D9806}"/>
+                <a16:creationId xmlns:a16="http://schemas.microsoft.com/office/drawing/2014/main" xmlns="" id="{0292E782-6B5B-40FC-91C1-A2D12D0D9806}"/>
               </a:ext>
             </a:extLst>
           </p:cNvPr>
@@ -1535,7 +1535,7 @@
           <a:p>
             <a:fld id="{65DDBF0C-176C-41A2-A7B0-D55ED202E141}" type="datetimeFigureOut">
               <a:rPr lang="en-US" smtClean="0"/>
-              <a:t>4/25/2023</a:t>
+              <a:t>4/26/2023</a:t>
             </a:fld>
             <a:endParaRPr lang="en-US"/>
           </a:p>
@@ -1546,7 +1546,7 @@
           <p:cNvPr id="5" name="Footer Placeholder 4">
             <a:extLst>
               <a:ext uri="{FF2B5EF4-FFF2-40B4-BE49-F238E27FC236}">
-                <a16:creationId xmlns:a16="http://schemas.microsoft.com/office/drawing/2014/main" id="{E22C71DF-7E1C-480A-9F46-C30FE13A6F29}"/>
+                <a16:creationId xmlns:a16="http://schemas.microsoft.com/office/drawing/2014/main" xmlns="" id="{E22C71DF-7E1C-480A-9F46-C30FE13A6F29}"/>
               </a:ext>
             </a:extLst>
           </p:cNvPr>
@@ -1571,7 +1571,7 @@
           <p:cNvPr id="6" name="Slide Number Placeholder 5">
             <a:extLst>
               <a:ext uri="{FF2B5EF4-FFF2-40B4-BE49-F238E27FC236}">
-                <a16:creationId xmlns:a16="http://schemas.microsoft.com/office/drawing/2014/main" id="{7BDBEA1F-7D89-4993-B0E2-EBEF464F47BA}"/>
+                <a16:creationId xmlns:a16="http://schemas.microsoft.com/office/drawing/2014/main" xmlns="" id="{7BDBEA1F-7D89-4993-B0E2-EBEF464F47BA}"/>
               </a:ext>
             </a:extLst>
           </p:cNvPr>
@@ -1600,7 +1600,7 @@
           <p:cNvPr id="7" name="Straight Connector 6">
             <a:extLst>
               <a:ext uri="{FF2B5EF4-FFF2-40B4-BE49-F238E27FC236}">
-                <a16:creationId xmlns:a16="http://schemas.microsoft.com/office/drawing/2014/main" id="{1FFB6EB9-9B8F-2375-C5BD-AD79DF4E3AD2}"/>
+                <a16:creationId xmlns:a16="http://schemas.microsoft.com/office/drawing/2014/main" xmlns="" id="{1FFB6EB9-9B8F-2375-C5BD-AD79DF4E3AD2}"/>
               </a:ext>
             </a:extLst>
           </p:cNvPr>
@@ -1674,7 +1674,7 @@
           <p:cNvPr id="2" name="Title 1">
             <a:extLst>
               <a:ext uri="{FF2B5EF4-FFF2-40B4-BE49-F238E27FC236}">
-                <a16:creationId xmlns:a16="http://schemas.microsoft.com/office/drawing/2014/main" id="{DE75824E-C687-48A0-9A3C-B8705386EAF9}"/>
+                <a16:creationId xmlns:a16="http://schemas.microsoft.com/office/drawing/2014/main" xmlns="" id="{DE75824E-C687-48A0-9A3C-B8705386EAF9}"/>
               </a:ext>
             </a:extLst>
           </p:cNvPr>
@@ -1711,7 +1711,7 @@
           <p:cNvPr id="3" name="Text Placeholder 2">
             <a:extLst>
               <a:ext uri="{FF2B5EF4-FFF2-40B4-BE49-F238E27FC236}">
-                <a16:creationId xmlns:a16="http://schemas.microsoft.com/office/drawing/2014/main" id="{0D1B597D-16B1-4C13-8406-A9E5AFB4CCAD}"/>
+                <a16:creationId xmlns:a16="http://schemas.microsoft.com/office/drawing/2014/main" xmlns="" id="{0D1B597D-16B1-4C13-8406-A9E5AFB4CCAD}"/>
               </a:ext>
             </a:extLst>
           </p:cNvPr>
@@ -1836,7 +1836,7 @@
           <p:cNvPr id="4" name="Date Placeholder 3">
             <a:extLst>
               <a:ext uri="{FF2B5EF4-FFF2-40B4-BE49-F238E27FC236}">
-                <a16:creationId xmlns:a16="http://schemas.microsoft.com/office/drawing/2014/main" id="{E3A81C5D-813E-43A4-BA6C-1E3E5035FC73}"/>
+                <a16:creationId xmlns:a16="http://schemas.microsoft.com/office/drawing/2014/main" xmlns="" id="{E3A81C5D-813E-43A4-BA6C-1E3E5035FC73}"/>
               </a:ext>
             </a:extLst>
           </p:cNvPr>
@@ -1854,7 +1854,7 @@
           <a:p>
             <a:fld id="{65DDBF0C-176C-41A2-A7B0-D55ED202E141}" type="datetimeFigureOut">
               <a:rPr lang="en-US" smtClean="0"/>
-              <a:t>4/25/2023</a:t>
+              <a:t>4/26/2023</a:t>
             </a:fld>
             <a:endParaRPr lang="en-US"/>
           </a:p>
@@ -1865,7 +1865,7 @@
           <p:cNvPr id="5" name="Footer Placeholder 4">
             <a:extLst>
               <a:ext uri="{FF2B5EF4-FFF2-40B4-BE49-F238E27FC236}">
-                <a16:creationId xmlns:a16="http://schemas.microsoft.com/office/drawing/2014/main" id="{5EA3CFD6-6559-4140-B76A-09E4BE83C8B5}"/>
+                <a16:creationId xmlns:a16="http://schemas.microsoft.com/office/drawing/2014/main" xmlns="" id="{5EA3CFD6-6559-4140-B76A-09E4BE83C8B5}"/>
               </a:ext>
             </a:extLst>
           </p:cNvPr>
@@ -1890,7 +1890,7 @@
           <p:cNvPr id="6" name="Slide Number Placeholder 5">
             <a:extLst>
               <a:ext uri="{FF2B5EF4-FFF2-40B4-BE49-F238E27FC236}">
-                <a16:creationId xmlns:a16="http://schemas.microsoft.com/office/drawing/2014/main" id="{ECDA1549-12AC-4059-A8F6-0D84C0707D1F}"/>
+                <a16:creationId xmlns:a16="http://schemas.microsoft.com/office/drawing/2014/main" xmlns="" id="{ECDA1549-12AC-4059-A8F6-0D84C0707D1F}"/>
               </a:ext>
             </a:extLst>
           </p:cNvPr>
@@ -1949,7 +1949,7 @@
           <p:cNvPr id="2" name="Title 1">
             <a:extLst>
               <a:ext uri="{FF2B5EF4-FFF2-40B4-BE49-F238E27FC236}">
-                <a16:creationId xmlns:a16="http://schemas.microsoft.com/office/drawing/2014/main" id="{A60BC9F5-576E-42DE-B055-199083CAF103}"/>
+                <a16:creationId xmlns:a16="http://schemas.microsoft.com/office/drawing/2014/main" xmlns="" id="{A60BC9F5-576E-42DE-B055-199083CAF103}"/>
               </a:ext>
             </a:extLst>
           </p:cNvPr>
@@ -1977,7 +1977,7 @@
           <p:cNvPr id="3" name="Content Placeholder 2">
             <a:extLst>
               <a:ext uri="{FF2B5EF4-FFF2-40B4-BE49-F238E27FC236}">
-                <a16:creationId xmlns:a16="http://schemas.microsoft.com/office/drawing/2014/main" id="{71A3C86C-66B7-4437-B8FF-5BA1B3B63C63}"/>
+                <a16:creationId xmlns:a16="http://schemas.microsoft.com/office/drawing/2014/main" xmlns="" id="{71A3C86C-66B7-4437-B8FF-5BA1B3B63C63}"/>
               </a:ext>
             </a:extLst>
           </p:cNvPr>
@@ -2039,7 +2039,7 @@
           <p:cNvPr id="4" name="Content Placeholder 3">
             <a:extLst>
               <a:ext uri="{FF2B5EF4-FFF2-40B4-BE49-F238E27FC236}">
-                <a16:creationId xmlns:a16="http://schemas.microsoft.com/office/drawing/2014/main" id="{92959486-1032-47F9-84F0-2B4B46D772F0}"/>
+                <a16:creationId xmlns:a16="http://schemas.microsoft.com/office/drawing/2014/main" xmlns="" id="{92959486-1032-47F9-84F0-2B4B46D772F0}"/>
               </a:ext>
             </a:extLst>
           </p:cNvPr>
@@ -2101,7 +2101,7 @@
           <p:cNvPr id="5" name="Date Placeholder 4">
             <a:extLst>
               <a:ext uri="{FF2B5EF4-FFF2-40B4-BE49-F238E27FC236}">
-                <a16:creationId xmlns:a16="http://schemas.microsoft.com/office/drawing/2014/main" id="{A6D883F3-47AF-45FD-9291-206A04A5F7EA}"/>
+                <a16:creationId xmlns:a16="http://schemas.microsoft.com/office/drawing/2014/main" xmlns="" id="{A6D883F3-47AF-45FD-9291-206A04A5F7EA}"/>
               </a:ext>
             </a:extLst>
           </p:cNvPr>
@@ -2119,7 +2119,7 @@
           <a:p>
             <a:fld id="{65DDBF0C-176C-41A2-A7B0-D55ED202E141}" type="datetimeFigureOut">
               <a:rPr lang="en-US" smtClean="0"/>
-              <a:t>4/25/2023</a:t>
+              <a:t>4/26/2023</a:t>
             </a:fld>
             <a:endParaRPr lang="en-US"/>
           </a:p>
@@ -2130,7 +2130,7 @@
           <p:cNvPr id="6" name="Footer Placeholder 5">
             <a:extLst>
               <a:ext uri="{FF2B5EF4-FFF2-40B4-BE49-F238E27FC236}">
-                <a16:creationId xmlns:a16="http://schemas.microsoft.com/office/drawing/2014/main" id="{69F8164B-C772-4EB8-94A2-C24897BD216C}"/>
+                <a16:creationId xmlns:a16="http://schemas.microsoft.com/office/drawing/2014/main" xmlns="" id="{69F8164B-C772-4EB8-94A2-C24897BD216C}"/>
               </a:ext>
             </a:extLst>
           </p:cNvPr>
@@ -2155,7 +2155,7 @@
           <p:cNvPr id="7" name="Slide Number Placeholder 6">
             <a:extLst>
               <a:ext uri="{FF2B5EF4-FFF2-40B4-BE49-F238E27FC236}">
-                <a16:creationId xmlns:a16="http://schemas.microsoft.com/office/drawing/2014/main" id="{40170100-5C66-4772-A280-A70E353823C6}"/>
+                <a16:creationId xmlns:a16="http://schemas.microsoft.com/office/drawing/2014/main" xmlns="" id="{40170100-5C66-4772-A280-A70E353823C6}"/>
               </a:ext>
             </a:extLst>
           </p:cNvPr>
@@ -2214,7 +2214,7 @@
           <p:cNvPr id="2" name="Title 1">
             <a:extLst>
               <a:ext uri="{FF2B5EF4-FFF2-40B4-BE49-F238E27FC236}">
-                <a16:creationId xmlns:a16="http://schemas.microsoft.com/office/drawing/2014/main" id="{01235673-6FE8-45A3-A361-B5F5F1F3C486}"/>
+                <a16:creationId xmlns:a16="http://schemas.microsoft.com/office/drawing/2014/main" xmlns="" id="{01235673-6FE8-45A3-A361-B5F5F1F3C486}"/>
               </a:ext>
             </a:extLst>
           </p:cNvPr>
@@ -2247,7 +2247,7 @@
           <p:cNvPr id="3" name="Text Placeholder 2">
             <a:extLst>
               <a:ext uri="{FF2B5EF4-FFF2-40B4-BE49-F238E27FC236}">
-                <a16:creationId xmlns:a16="http://schemas.microsoft.com/office/drawing/2014/main" id="{68B14653-79B1-4EDB-B3DB-60E1A37667C1}"/>
+                <a16:creationId xmlns:a16="http://schemas.microsoft.com/office/drawing/2014/main" xmlns="" id="{68B14653-79B1-4EDB-B3DB-60E1A37667C1}"/>
               </a:ext>
             </a:extLst>
           </p:cNvPr>
@@ -2318,7 +2318,7 @@
           <p:cNvPr id="4" name="Content Placeholder 3">
             <a:extLst>
               <a:ext uri="{FF2B5EF4-FFF2-40B4-BE49-F238E27FC236}">
-                <a16:creationId xmlns:a16="http://schemas.microsoft.com/office/drawing/2014/main" id="{0AC4CE1B-FA0F-4FED-AF46-75720527F96D}"/>
+                <a16:creationId xmlns:a16="http://schemas.microsoft.com/office/drawing/2014/main" xmlns="" id="{0AC4CE1B-FA0F-4FED-AF46-75720527F96D}"/>
               </a:ext>
             </a:extLst>
           </p:cNvPr>
@@ -2380,7 +2380,7 @@
           <p:cNvPr id="5" name="Text Placeholder 4">
             <a:extLst>
               <a:ext uri="{FF2B5EF4-FFF2-40B4-BE49-F238E27FC236}">
-                <a16:creationId xmlns:a16="http://schemas.microsoft.com/office/drawing/2014/main" id="{C928A86F-6541-41F4-8141-0E5397B6BFB2}"/>
+                <a16:creationId xmlns:a16="http://schemas.microsoft.com/office/drawing/2014/main" xmlns="" id="{C928A86F-6541-41F4-8141-0E5397B6BFB2}"/>
               </a:ext>
             </a:extLst>
           </p:cNvPr>
@@ -2451,7 +2451,7 @@
           <p:cNvPr id="6" name="Content Placeholder 5">
             <a:extLst>
               <a:ext uri="{FF2B5EF4-FFF2-40B4-BE49-F238E27FC236}">
-                <a16:creationId xmlns:a16="http://schemas.microsoft.com/office/drawing/2014/main" id="{4F930E6C-8D3B-46FB-8D9D-CAB40E0DBFD1}"/>
+                <a16:creationId xmlns:a16="http://schemas.microsoft.com/office/drawing/2014/main" xmlns="" id="{4F930E6C-8D3B-46FB-8D9D-CAB40E0DBFD1}"/>
               </a:ext>
             </a:extLst>
           </p:cNvPr>
@@ -2513,7 +2513,7 @@
           <p:cNvPr id="7" name="Date Placeholder 6">
             <a:extLst>
               <a:ext uri="{FF2B5EF4-FFF2-40B4-BE49-F238E27FC236}">
-                <a16:creationId xmlns:a16="http://schemas.microsoft.com/office/drawing/2014/main" id="{DC999066-0E0E-4AB1-A82D-0A337EFBA275}"/>
+                <a16:creationId xmlns:a16="http://schemas.microsoft.com/office/drawing/2014/main" xmlns="" id="{DC999066-0E0E-4AB1-A82D-0A337EFBA275}"/>
               </a:ext>
             </a:extLst>
           </p:cNvPr>
@@ -2531,7 +2531,7 @@
           <a:p>
             <a:fld id="{65DDBF0C-176C-41A2-A7B0-D55ED202E141}" type="datetimeFigureOut">
               <a:rPr lang="en-US" smtClean="0"/>
-              <a:t>4/25/2023</a:t>
+              <a:t>4/26/2023</a:t>
             </a:fld>
             <a:endParaRPr lang="en-US"/>
           </a:p>
@@ -2542,7 +2542,7 @@
           <p:cNvPr id="8" name="Footer Placeholder 7">
             <a:extLst>
               <a:ext uri="{FF2B5EF4-FFF2-40B4-BE49-F238E27FC236}">
-                <a16:creationId xmlns:a16="http://schemas.microsoft.com/office/drawing/2014/main" id="{8C1085FD-2875-4547-BCA9-0A7C3025B8E1}"/>
+                <a16:creationId xmlns:a16="http://schemas.microsoft.com/office/drawing/2014/main" xmlns="" id="{8C1085FD-2875-4547-BCA9-0A7C3025B8E1}"/>
               </a:ext>
             </a:extLst>
           </p:cNvPr>
@@ -2567,7 +2567,7 @@
           <p:cNvPr id="9" name="Slide Number Placeholder 8">
             <a:extLst>
               <a:ext uri="{FF2B5EF4-FFF2-40B4-BE49-F238E27FC236}">
-                <a16:creationId xmlns:a16="http://schemas.microsoft.com/office/drawing/2014/main" id="{4DC75EAD-6B1A-402D-8ABC-2B209FEC6432}"/>
+                <a16:creationId xmlns:a16="http://schemas.microsoft.com/office/drawing/2014/main" xmlns="" id="{4DC75EAD-6B1A-402D-8ABC-2B209FEC6432}"/>
               </a:ext>
             </a:extLst>
           </p:cNvPr>
@@ -2626,7 +2626,7 @@
           <p:cNvPr id="2" name="Title 1">
             <a:extLst>
               <a:ext uri="{FF2B5EF4-FFF2-40B4-BE49-F238E27FC236}">
-                <a16:creationId xmlns:a16="http://schemas.microsoft.com/office/drawing/2014/main" id="{0AEEC28D-2A24-4691-8B5E-BD2FAB5F770A}"/>
+                <a16:creationId xmlns:a16="http://schemas.microsoft.com/office/drawing/2014/main" xmlns="" id="{0AEEC28D-2A24-4691-8B5E-BD2FAB5F770A}"/>
               </a:ext>
             </a:extLst>
           </p:cNvPr>
@@ -2654,7 +2654,7 @@
           <p:cNvPr id="3" name="Date Placeholder 2">
             <a:extLst>
               <a:ext uri="{FF2B5EF4-FFF2-40B4-BE49-F238E27FC236}">
-                <a16:creationId xmlns:a16="http://schemas.microsoft.com/office/drawing/2014/main" id="{991570B2-8C27-4ABF-80B6-B55E4708B792}"/>
+                <a16:creationId xmlns:a16="http://schemas.microsoft.com/office/drawing/2014/main" xmlns="" id="{991570B2-8C27-4ABF-80B6-B55E4708B792}"/>
               </a:ext>
             </a:extLst>
           </p:cNvPr>
@@ -2672,7 +2672,7 @@
           <a:p>
             <a:fld id="{65DDBF0C-176C-41A2-A7B0-D55ED202E141}" type="datetimeFigureOut">
               <a:rPr lang="en-US" smtClean="0"/>
-              <a:t>4/25/2023</a:t>
+              <a:t>4/26/2023</a:t>
             </a:fld>
             <a:endParaRPr lang="en-US"/>
           </a:p>
@@ -2683,7 +2683,7 @@
           <p:cNvPr id="4" name="Footer Placeholder 3">
             <a:extLst>
               <a:ext uri="{FF2B5EF4-FFF2-40B4-BE49-F238E27FC236}">
-                <a16:creationId xmlns:a16="http://schemas.microsoft.com/office/drawing/2014/main" id="{1A3935D8-1AD9-4C98-A851-5552255BE606}"/>
+                <a16:creationId xmlns:a16="http://schemas.microsoft.com/office/drawing/2014/main" xmlns="" id="{1A3935D8-1AD9-4C98-A851-5552255BE606}"/>
               </a:ext>
             </a:extLst>
           </p:cNvPr>
@@ -2708,7 +2708,7 @@
           <p:cNvPr id="5" name="Slide Number Placeholder 4">
             <a:extLst>
               <a:ext uri="{FF2B5EF4-FFF2-40B4-BE49-F238E27FC236}">
-                <a16:creationId xmlns:a16="http://schemas.microsoft.com/office/drawing/2014/main" id="{60CC3E2B-319D-4F7D-AAE1-90F625AE016C}"/>
+                <a16:creationId xmlns:a16="http://schemas.microsoft.com/office/drawing/2014/main" xmlns="" id="{60CC3E2B-319D-4F7D-AAE1-90F625AE016C}"/>
               </a:ext>
             </a:extLst>
           </p:cNvPr>
@@ -2767,7 +2767,7 @@
           <p:cNvPr id="2" name="Date Placeholder 1">
             <a:extLst>
               <a:ext uri="{FF2B5EF4-FFF2-40B4-BE49-F238E27FC236}">
-                <a16:creationId xmlns:a16="http://schemas.microsoft.com/office/drawing/2014/main" id="{1A5AA1FD-5E00-4D00-8C52-C127D7954892}"/>
+                <a16:creationId xmlns:a16="http://schemas.microsoft.com/office/drawing/2014/main" xmlns="" id="{1A5AA1FD-5E00-4D00-8C52-C127D7954892}"/>
               </a:ext>
             </a:extLst>
           </p:cNvPr>
@@ -2785,7 +2785,7 @@
           <a:p>
             <a:fld id="{65DDBF0C-176C-41A2-A7B0-D55ED202E141}" type="datetimeFigureOut">
               <a:rPr lang="en-US" smtClean="0"/>
-              <a:t>4/25/2023</a:t>
+              <a:t>4/26/2023</a:t>
             </a:fld>
             <a:endParaRPr lang="en-US"/>
           </a:p>
@@ -2796,7 +2796,7 @@
           <p:cNvPr id="3" name="Footer Placeholder 2">
             <a:extLst>
               <a:ext uri="{FF2B5EF4-FFF2-40B4-BE49-F238E27FC236}">
-                <a16:creationId xmlns:a16="http://schemas.microsoft.com/office/drawing/2014/main" id="{9C406108-9619-49A5-AF84-495EFEBEA696}"/>
+                <a16:creationId xmlns:a16="http://schemas.microsoft.com/office/drawing/2014/main" xmlns="" id="{9C406108-9619-49A5-AF84-495EFEBEA696}"/>
               </a:ext>
             </a:extLst>
           </p:cNvPr>
@@ -2821,7 +2821,7 @@
           <p:cNvPr id="4" name="Slide Number Placeholder 3">
             <a:extLst>
               <a:ext uri="{FF2B5EF4-FFF2-40B4-BE49-F238E27FC236}">
-                <a16:creationId xmlns:a16="http://schemas.microsoft.com/office/drawing/2014/main" id="{1B813436-D426-492A-9226-0920D5CFE042}"/>
+                <a16:creationId xmlns:a16="http://schemas.microsoft.com/office/drawing/2014/main" xmlns="" id="{1B813436-D426-492A-9226-0920D5CFE042}"/>
               </a:ext>
             </a:extLst>
           </p:cNvPr>
@@ -2880,7 +2880,7 @@
           <p:cNvPr id="2" name="Title 1">
             <a:extLst>
               <a:ext uri="{FF2B5EF4-FFF2-40B4-BE49-F238E27FC236}">
-                <a16:creationId xmlns:a16="http://schemas.microsoft.com/office/drawing/2014/main" id="{D967986A-6145-42DA-B61A-658219270C61}"/>
+                <a16:creationId xmlns:a16="http://schemas.microsoft.com/office/drawing/2014/main" xmlns="" id="{D967986A-6145-42DA-B61A-658219270C61}"/>
               </a:ext>
             </a:extLst>
           </p:cNvPr>
@@ -2917,7 +2917,7 @@
           <p:cNvPr id="3" name="Content Placeholder 2">
             <a:extLst>
               <a:ext uri="{FF2B5EF4-FFF2-40B4-BE49-F238E27FC236}">
-                <a16:creationId xmlns:a16="http://schemas.microsoft.com/office/drawing/2014/main" id="{738B42C9-4D21-4D87-A4D6-B69D502D7A18}"/>
+                <a16:creationId xmlns:a16="http://schemas.microsoft.com/office/drawing/2014/main" xmlns="" id="{738B42C9-4D21-4D87-A4D6-B69D502D7A18}"/>
               </a:ext>
             </a:extLst>
           </p:cNvPr>
@@ -3007,7 +3007,7 @@
           <p:cNvPr id="4" name="Text Placeholder 3">
             <a:extLst>
               <a:ext uri="{FF2B5EF4-FFF2-40B4-BE49-F238E27FC236}">
-                <a16:creationId xmlns:a16="http://schemas.microsoft.com/office/drawing/2014/main" id="{2B7D580D-8BBE-4840-A34B-6929FF0BB154}"/>
+                <a16:creationId xmlns:a16="http://schemas.microsoft.com/office/drawing/2014/main" xmlns="" id="{2B7D580D-8BBE-4840-A34B-6929FF0BB154}"/>
               </a:ext>
             </a:extLst>
           </p:cNvPr>
@@ -3078,7 +3078,7 @@
           <p:cNvPr id="5" name="Date Placeholder 4">
             <a:extLst>
               <a:ext uri="{FF2B5EF4-FFF2-40B4-BE49-F238E27FC236}">
-                <a16:creationId xmlns:a16="http://schemas.microsoft.com/office/drawing/2014/main" id="{2F107C27-AD4E-4D6F-AEF2-D527DBBB420E}"/>
+                <a16:creationId xmlns:a16="http://schemas.microsoft.com/office/drawing/2014/main" xmlns="" id="{2F107C27-AD4E-4D6F-AEF2-D527DBBB420E}"/>
               </a:ext>
             </a:extLst>
           </p:cNvPr>
@@ -3096,7 +3096,7 @@
           <a:p>
             <a:fld id="{65DDBF0C-176C-41A2-A7B0-D55ED202E141}" type="datetimeFigureOut">
               <a:rPr lang="en-US" smtClean="0"/>
-              <a:t>4/25/2023</a:t>
+              <a:t>4/26/2023</a:t>
             </a:fld>
             <a:endParaRPr lang="en-US"/>
           </a:p>
@@ -3107,7 +3107,7 @@
           <p:cNvPr id="6" name="Footer Placeholder 5">
             <a:extLst>
               <a:ext uri="{FF2B5EF4-FFF2-40B4-BE49-F238E27FC236}">
-                <a16:creationId xmlns:a16="http://schemas.microsoft.com/office/drawing/2014/main" id="{1C73A189-BE23-44B5-AF70-7A5849D8877C}"/>
+                <a16:creationId xmlns:a16="http://schemas.microsoft.com/office/drawing/2014/main" xmlns="" id="{1C73A189-BE23-44B5-AF70-7A5849D8877C}"/>
               </a:ext>
             </a:extLst>
           </p:cNvPr>
@@ -3132,7 +3132,7 @@
           <p:cNvPr id="7" name="Slide Number Placeholder 6">
             <a:extLst>
               <a:ext uri="{FF2B5EF4-FFF2-40B4-BE49-F238E27FC236}">
-                <a16:creationId xmlns:a16="http://schemas.microsoft.com/office/drawing/2014/main" id="{3D5B1BE8-EA4A-445C-A2AB-FD678F21B492}"/>
+                <a16:creationId xmlns:a16="http://schemas.microsoft.com/office/drawing/2014/main" xmlns="" id="{3D5B1BE8-EA4A-445C-A2AB-FD678F21B492}"/>
               </a:ext>
             </a:extLst>
           </p:cNvPr>
@@ -3191,7 +3191,7 @@
           <p:cNvPr id="2" name="Title 1">
             <a:extLst>
               <a:ext uri="{FF2B5EF4-FFF2-40B4-BE49-F238E27FC236}">
-                <a16:creationId xmlns:a16="http://schemas.microsoft.com/office/drawing/2014/main" id="{205B61B1-267A-4FA9-B3C7-F1D55E48384B}"/>
+                <a16:creationId xmlns:a16="http://schemas.microsoft.com/office/drawing/2014/main" xmlns="" id="{205B61B1-267A-4FA9-B3C7-F1D55E48384B}"/>
               </a:ext>
             </a:extLst>
           </p:cNvPr>
@@ -3228,7 +3228,7 @@
           <p:cNvPr id="3" name="Picture Placeholder 2">
             <a:extLst>
               <a:ext uri="{FF2B5EF4-FFF2-40B4-BE49-F238E27FC236}">
-                <a16:creationId xmlns:a16="http://schemas.microsoft.com/office/drawing/2014/main" id="{1CB2FD67-EFF8-4BC3-850D-BA1B1B8085F9}"/>
+                <a16:creationId xmlns:a16="http://schemas.microsoft.com/office/drawing/2014/main" xmlns="" id="{1CB2FD67-EFF8-4BC3-850D-BA1B1B8085F9}"/>
               </a:ext>
             </a:extLst>
           </p:cNvPr>
@@ -3295,7 +3295,7 @@
           <p:cNvPr id="4" name="Text Placeholder 3">
             <a:extLst>
               <a:ext uri="{FF2B5EF4-FFF2-40B4-BE49-F238E27FC236}">
-                <a16:creationId xmlns:a16="http://schemas.microsoft.com/office/drawing/2014/main" id="{8F0F29B7-6DD9-4959-8D89-D8A87F449619}"/>
+                <a16:creationId xmlns:a16="http://schemas.microsoft.com/office/drawing/2014/main" xmlns="" id="{8F0F29B7-6DD9-4959-8D89-D8A87F449619}"/>
               </a:ext>
             </a:extLst>
           </p:cNvPr>
@@ -3366,7 +3366,7 @@
           <p:cNvPr id="5" name="Date Placeholder 4">
             <a:extLst>
               <a:ext uri="{FF2B5EF4-FFF2-40B4-BE49-F238E27FC236}">
-                <a16:creationId xmlns:a16="http://schemas.microsoft.com/office/drawing/2014/main" id="{C0F50D6A-6AB5-493A-99F8-5BD7085BB2FC}"/>
+                <a16:creationId xmlns:a16="http://schemas.microsoft.com/office/drawing/2014/main" xmlns="" id="{C0F50D6A-6AB5-493A-99F8-5BD7085BB2FC}"/>
               </a:ext>
             </a:extLst>
           </p:cNvPr>
@@ -3384,7 +3384,7 @@
           <a:p>
             <a:fld id="{65DDBF0C-176C-41A2-A7B0-D55ED202E141}" type="datetimeFigureOut">
               <a:rPr lang="en-US" smtClean="0"/>
-              <a:t>4/25/2023</a:t>
+              <a:t>4/26/2023</a:t>
             </a:fld>
             <a:endParaRPr lang="en-US"/>
           </a:p>
@@ -3395,7 +3395,7 @@
           <p:cNvPr id="6" name="Footer Placeholder 5">
             <a:extLst>
               <a:ext uri="{FF2B5EF4-FFF2-40B4-BE49-F238E27FC236}">
-                <a16:creationId xmlns:a16="http://schemas.microsoft.com/office/drawing/2014/main" id="{B5DDB1B5-62DF-4E2C-8AB0-9B77899B0C5B}"/>
+                <a16:creationId xmlns:a16="http://schemas.microsoft.com/office/drawing/2014/main" xmlns="" id="{B5DDB1B5-62DF-4E2C-8AB0-9B77899B0C5B}"/>
               </a:ext>
             </a:extLst>
           </p:cNvPr>
@@ -3420,7 +3420,7 @@
           <p:cNvPr id="7" name="Slide Number Placeholder 6">
             <a:extLst>
               <a:ext uri="{FF2B5EF4-FFF2-40B4-BE49-F238E27FC236}">
-                <a16:creationId xmlns:a16="http://schemas.microsoft.com/office/drawing/2014/main" id="{D70A59F4-0C5E-4F23-B69C-A3C9F776BEE2}"/>
+                <a16:creationId xmlns:a16="http://schemas.microsoft.com/office/drawing/2014/main" xmlns="" id="{D70A59F4-0C5E-4F23-B69C-A3C9F776BEE2}"/>
               </a:ext>
             </a:extLst>
           </p:cNvPr>
@@ -3484,7 +3484,7 @@
           <p:cNvPr id="2" name="Title Placeholder 1">
             <a:extLst>
               <a:ext uri="{FF2B5EF4-FFF2-40B4-BE49-F238E27FC236}">
-                <a16:creationId xmlns:a16="http://schemas.microsoft.com/office/drawing/2014/main" id="{4813BCD2-8A5E-4D49-90F8-55AE5F05214D}"/>
+                <a16:creationId xmlns:a16="http://schemas.microsoft.com/office/drawing/2014/main" xmlns="" id="{4813BCD2-8A5E-4D49-90F8-55AE5F05214D}"/>
               </a:ext>
             </a:extLst>
           </p:cNvPr>
@@ -3522,7 +3522,7 @@
           <p:cNvPr id="3" name="Text Placeholder 2">
             <a:extLst>
               <a:ext uri="{FF2B5EF4-FFF2-40B4-BE49-F238E27FC236}">
-                <a16:creationId xmlns:a16="http://schemas.microsoft.com/office/drawing/2014/main" id="{AE92E3E2-D29B-46E0-80AC-34D21DF87517}"/>
+                <a16:creationId xmlns:a16="http://schemas.microsoft.com/office/drawing/2014/main" xmlns="" id="{AE92E3E2-D29B-46E0-80AC-34D21DF87517}"/>
               </a:ext>
             </a:extLst>
           </p:cNvPr>
@@ -3589,7 +3589,7 @@
           <p:cNvPr id="4" name="Date Placeholder 3">
             <a:extLst>
               <a:ext uri="{FF2B5EF4-FFF2-40B4-BE49-F238E27FC236}">
-                <a16:creationId xmlns:a16="http://schemas.microsoft.com/office/drawing/2014/main" id="{2A31DDCA-89E3-4D45-B126-8247341F4621}"/>
+                <a16:creationId xmlns:a16="http://schemas.microsoft.com/office/drawing/2014/main" xmlns="" id="{2A31DDCA-89E3-4D45-B126-8247341F4621}"/>
               </a:ext>
             </a:extLst>
           </p:cNvPr>
@@ -3625,7 +3625,7 @@
           <a:p>
             <a:fld id="{65DDBF0C-176C-41A2-A7B0-D55ED202E141}" type="datetimeFigureOut">
               <a:rPr lang="en-US" smtClean="0"/>
-              <a:t>4/25/2023</a:t>
+              <a:t>4/26/2023</a:t>
             </a:fld>
             <a:endParaRPr lang="en-US"/>
           </a:p>
@@ -3636,7 +3636,7 @@
           <p:cNvPr id="5" name="Footer Placeholder 4">
             <a:extLst>
               <a:ext uri="{FF2B5EF4-FFF2-40B4-BE49-F238E27FC236}">
-                <a16:creationId xmlns:a16="http://schemas.microsoft.com/office/drawing/2014/main" id="{47DFE6DC-0EA6-47E4-B1F3-3EF1ADDD8CAD}"/>
+                <a16:creationId xmlns:a16="http://schemas.microsoft.com/office/drawing/2014/main" xmlns="" id="{47DFE6DC-0EA6-47E4-B1F3-3EF1ADDD8CAD}"/>
               </a:ext>
             </a:extLst>
           </p:cNvPr>
@@ -3679,7 +3679,7 @@
           <p:cNvPr id="6" name="Slide Number Placeholder 5">
             <a:extLst>
               <a:ext uri="{FF2B5EF4-FFF2-40B4-BE49-F238E27FC236}">
-                <a16:creationId xmlns:a16="http://schemas.microsoft.com/office/drawing/2014/main" id="{32F7927D-7ECA-4692-A0A9-E3D137290ECC}"/>
+                <a16:creationId xmlns:a16="http://schemas.microsoft.com/office/drawing/2014/main" xmlns="" id="{32F7927D-7ECA-4692-A0A9-E3D137290ECC}"/>
               </a:ext>
             </a:extLst>
           </p:cNvPr>
@@ -4055,10 +4055,10 @@
           <p:cNvPr id="8" name="Rectangle 7">
             <a:extLst>
               <a:ext uri="{FF2B5EF4-FFF2-40B4-BE49-F238E27FC236}">
-                <a16:creationId xmlns:a16="http://schemas.microsoft.com/office/drawing/2014/main" id="{FFD48BC7-DC40-47DE-87EE-9F4B6ECB9ABB}"/>
+                <a16:creationId xmlns:a16="http://schemas.microsoft.com/office/drawing/2014/main" xmlns="" id="{FFD48BC7-DC40-47DE-87EE-9F4B6ECB9ABB}"/>
               </a:ext>
               <a:ext uri="{C183D7F6-B498-43B3-948B-1728B52AA6E4}">
-                <adec:decorative xmlns:adec="http://schemas.microsoft.com/office/drawing/2017/decorative" val="1"/>
+                <adec:decorative xmlns:adec="http://schemas.microsoft.com/office/drawing/2017/decorative" xmlns="" val="1"/>
               </a:ext>
             </a:extLst>
           </p:cNvPr>
@@ -4068,7 +4068,7 @@
           <p:nvPr>
             <p:extLst>
               <p:ext uri="{386F3935-93C4-4BCD-93E2-E3B085C9AB24}">
-                <p16:designElem xmlns:p16="http://schemas.microsoft.com/office/powerpoint/2015/main" val="1"/>
+                <p16:designElem xmlns:p16="http://schemas.microsoft.com/office/powerpoint/2015/main" xmlns="" val="1"/>
               </p:ext>
             </p:extLst>
           </p:nvPr>
@@ -4115,10 +4115,10 @@
           <p:cNvPr id="10" name="Freeform: Shape 9">
             <a:extLst>
               <a:ext uri="{FF2B5EF4-FFF2-40B4-BE49-F238E27FC236}">
-                <a16:creationId xmlns:a16="http://schemas.microsoft.com/office/drawing/2014/main" id="{E502BBC7-2C76-46F3-BC24-5985BC13DB88}"/>
+                <a16:creationId xmlns:a16="http://schemas.microsoft.com/office/drawing/2014/main" xmlns="" id="{E502BBC7-2C76-46F3-BC24-5985BC13DB88}"/>
               </a:ext>
               <a:ext uri="{C183D7F6-B498-43B3-948B-1728B52AA6E4}">
-                <adec:decorative xmlns:adec="http://schemas.microsoft.com/office/drawing/2017/decorative" val="1"/>
+                <adec:decorative xmlns:adec="http://schemas.microsoft.com/office/drawing/2017/decorative" xmlns="" val="1"/>
               </a:ext>
             </a:extLst>
           </p:cNvPr>
@@ -4128,7 +4128,7 @@
           <p:nvPr>
             <p:extLst>
               <p:ext uri="{386F3935-93C4-4BCD-93E2-E3B085C9AB24}">
-                <p16:designElem xmlns:p16="http://schemas.microsoft.com/office/powerpoint/2015/main" val="1"/>
+                <p16:designElem xmlns:p16="http://schemas.microsoft.com/office/powerpoint/2015/main" xmlns="" val="1"/>
               </p:ext>
             </p:extLst>
           </p:nvPr>
@@ -4315,10 +4315,10 @@
           <p:cNvPr id="12" name="Freeform: Shape 11">
             <a:extLst>
               <a:ext uri="{FF2B5EF4-FFF2-40B4-BE49-F238E27FC236}">
-                <a16:creationId xmlns:a16="http://schemas.microsoft.com/office/drawing/2014/main" id="{C7F28D52-2A5F-4D23-81AE-7CB8B591C7AF}"/>
+                <a16:creationId xmlns:a16="http://schemas.microsoft.com/office/drawing/2014/main" xmlns="" id="{C7F28D52-2A5F-4D23-81AE-7CB8B591C7AF}"/>
               </a:ext>
               <a:ext uri="{C183D7F6-B498-43B3-948B-1728B52AA6E4}">
-                <adec:decorative xmlns:adec="http://schemas.microsoft.com/office/drawing/2017/decorative" val="1"/>
+                <adec:decorative xmlns:adec="http://schemas.microsoft.com/office/drawing/2017/decorative" xmlns="" val="1"/>
               </a:ext>
             </a:extLst>
           </p:cNvPr>
@@ -4328,7 +4328,7 @@
           <p:nvPr>
             <p:extLst>
               <p:ext uri="{386F3935-93C4-4BCD-93E2-E3B085C9AB24}">
-                <p16:designElem xmlns:p16="http://schemas.microsoft.com/office/powerpoint/2015/main" val="1"/>
+                <p16:designElem xmlns:p16="http://schemas.microsoft.com/office/powerpoint/2015/main" xmlns="" val="1"/>
               </p:ext>
             </p:extLst>
           </p:nvPr>
@@ -4506,7 +4506,7 @@
           <p:cNvPr id="2" name="Title 1">
             <a:extLst>
               <a:ext uri="{FF2B5EF4-FFF2-40B4-BE49-F238E27FC236}">
-                <a16:creationId xmlns:a16="http://schemas.microsoft.com/office/drawing/2014/main" id="{07A9CF8F-21F5-4E3B-BB07-9920DADEE900}"/>
+                <a16:creationId xmlns:a16="http://schemas.microsoft.com/office/drawing/2014/main" xmlns="" id="{07A9CF8F-21F5-4E3B-BB07-9920DADEE900}"/>
               </a:ext>
             </a:extLst>
           </p:cNvPr>
@@ -4541,6 +4541,10 @@
               <a:rPr lang="en-US" sz="4800" spc="-150" dirty="0"/>
               <a:t>COSC 6386 Project</a:t>
             </a:r>
+            <a:r>
+              <a:rPr lang="en-US" sz="6100" dirty="0"/>
+              <a:t/>
+            </a:r>
             <a:br>
               <a:rPr lang="en-US" sz="6100" dirty="0"/>
             </a:br>
@@ -4563,7 +4567,7 @@
           <p:cNvPr id="3" name="Subtitle 2">
             <a:extLst>
               <a:ext uri="{FF2B5EF4-FFF2-40B4-BE49-F238E27FC236}">
-                <a16:creationId xmlns:a16="http://schemas.microsoft.com/office/drawing/2014/main" id="{521EE48C-5A0E-4A1C-AE14-5F20EB0F0153}"/>
+                <a16:creationId xmlns:a16="http://schemas.microsoft.com/office/drawing/2014/main" xmlns="" id="{521EE48C-5A0E-4A1C-AE14-5F20EB0F0153}"/>
               </a:ext>
             </a:extLst>
           </p:cNvPr>
@@ -4612,10 +4616,10 @@
           <p:cNvPr id="14" name="Rectangle 13">
             <a:extLst>
               <a:ext uri="{FF2B5EF4-FFF2-40B4-BE49-F238E27FC236}">
-                <a16:creationId xmlns:a16="http://schemas.microsoft.com/office/drawing/2014/main" id="{3629484E-3792-4B3D-89AD-7C8A1ED0E0D4}"/>
+                <a16:creationId xmlns:a16="http://schemas.microsoft.com/office/drawing/2014/main" xmlns="" id="{3629484E-3792-4B3D-89AD-7C8A1ED0E0D4}"/>
               </a:ext>
               <a:ext uri="{C183D7F6-B498-43B3-948B-1728B52AA6E4}">
-                <adec:decorative xmlns:adec="http://schemas.microsoft.com/office/drawing/2017/decorative" val="1"/>
+                <adec:decorative xmlns:adec="http://schemas.microsoft.com/office/drawing/2017/decorative" xmlns="" val="1"/>
               </a:ext>
             </a:extLst>
           </p:cNvPr>
@@ -4625,7 +4629,7 @@
           <p:nvPr>
             <p:extLst>
               <p:ext uri="{386F3935-93C4-4BCD-93E2-E3B085C9AB24}">
-                <p16:designElem xmlns:p16="http://schemas.microsoft.com/office/powerpoint/2015/main" val="1"/>
+                <p16:designElem xmlns:p16="http://schemas.microsoft.com/office/powerpoint/2015/main" xmlns="" val="1"/>
               </p:ext>
             </p:extLst>
           </p:nvPr>
@@ -4734,7 +4738,7 @@
           <p:cNvPr id="2" name="Title 1">
             <a:extLst>
               <a:ext uri="{FF2B5EF4-FFF2-40B4-BE49-F238E27FC236}">
-                <a16:creationId xmlns:a16="http://schemas.microsoft.com/office/drawing/2014/main" id="{D0B87F8E-5D83-4513-9285-8A122C4A62CB}"/>
+                <a16:creationId xmlns:a16="http://schemas.microsoft.com/office/drawing/2014/main" xmlns="" id="{D0B87F8E-5D83-4513-9285-8A122C4A62CB}"/>
               </a:ext>
             </a:extLst>
           </p:cNvPr>
@@ -4767,7 +4771,7 @@
           <p:cNvPr id="5" name="Straight Connector 4">
             <a:extLst>
               <a:ext uri="{FF2B5EF4-FFF2-40B4-BE49-F238E27FC236}">
-                <a16:creationId xmlns:a16="http://schemas.microsoft.com/office/drawing/2014/main" id="{86EF85BD-B585-F4FA-AB4B-371C19D22622}"/>
+                <a16:creationId xmlns:a16="http://schemas.microsoft.com/office/drawing/2014/main" xmlns="" id="{86EF85BD-B585-F4FA-AB4B-371C19D22622}"/>
               </a:ext>
             </a:extLst>
           </p:cNvPr>
@@ -4811,7 +4815,7 @@
           <p:cNvPr id="4" name="Content Placeholder 3">
             <a:extLst>
               <a:ext uri="{FF2B5EF4-FFF2-40B4-BE49-F238E27FC236}">
-                <a16:creationId xmlns:a16="http://schemas.microsoft.com/office/drawing/2014/main" id="{8A9E4EF8-5E69-948B-8D9B-5C6461DEB974}"/>
+                <a16:creationId xmlns:a16="http://schemas.microsoft.com/office/drawing/2014/main" xmlns="" id="{8A9E4EF8-5E69-948B-8D9B-5C6461DEB974}"/>
               </a:ext>
             </a:extLst>
           </p:cNvPr>
@@ -4835,15 +4839,35 @@
           <a:lstStyle/>
           <a:p>
             <a:r>
-              <a:rPr lang="en-US" sz="3200" dirty="0"/>
-              <a:t>We wanted to avoid using Control Flow or Abstract Syntax Trees</a:t>
-            </a:r>
-          </a:p>
-          <a:p>
-            <a:r>
-              <a:rPr lang="en-US" sz="3200" dirty="0"/>
-              <a:t>We limit our work to python files</a:t>
-            </a:r>
+              <a:rPr lang="en-US" sz="3200" dirty="0" smtClean="0"/>
+              <a:t>We wanted to catch the simplest but most common types of clones (types I and II) at lightning speed.</a:t>
+            </a:r>
+          </a:p>
+          <a:p>
+            <a:pPr lvl="1"/>
+            <a:r>
+              <a:rPr lang="en-US" dirty="0" smtClean="0"/>
+              <a:t>We streamlined the detection model to be sensitive to cloned functions, which are common in our experience.</a:t>
+            </a:r>
+          </a:p>
+          <a:p>
+            <a:pPr lvl="1"/>
+            <a:r>
+              <a:rPr lang="en-US" dirty="0" smtClean="0"/>
+              <a:t>Our “lazy”/non-exhaustive approach might miss some clones, but it works efficiently and quickly to catch most clones in our </a:t>
+            </a:r>
+            <a:r>
+              <a:rPr lang="en-US" smtClean="0"/>
+              <a:t>intended category.</a:t>
+            </a:r>
+            <a:endParaRPr lang="en-US" dirty="0" smtClean="0"/>
+          </a:p>
+          <a:p>
+            <a:r>
+              <a:rPr lang="en-US" sz="3200" dirty="0" smtClean="0"/>
+              <a:t>Our work focuses on Python language exclusively, but it would be easy to adapt to other languages.</a:t>
+            </a:r>
+            <a:endParaRPr lang="en-US" sz="3200" dirty="0"/>
           </a:p>
         </p:txBody>
       </p:sp>
@@ -4882,7 +4906,7 @@
           <p:cNvPr id="2" name="Title 1">
             <a:extLst>
               <a:ext uri="{FF2B5EF4-FFF2-40B4-BE49-F238E27FC236}">
-                <a16:creationId xmlns:a16="http://schemas.microsoft.com/office/drawing/2014/main" id="{D0B87F8E-5D83-4513-9285-8A122C4A62CB}"/>
+                <a16:creationId xmlns:a16="http://schemas.microsoft.com/office/drawing/2014/main" xmlns="" id="{D0B87F8E-5D83-4513-9285-8A122C4A62CB}"/>
               </a:ext>
             </a:extLst>
           </p:cNvPr>
@@ -4916,7 +4940,7 @@
           <p:cNvPr id="5" name="Straight Connector 4">
             <a:extLst>
               <a:ext uri="{FF2B5EF4-FFF2-40B4-BE49-F238E27FC236}">
-                <a16:creationId xmlns:a16="http://schemas.microsoft.com/office/drawing/2014/main" id="{86EF85BD-B585-F4FA-AB4B-371C19D22622}"/>
+                <a16:creationId xmlns:a16="http://schemas.microsoft.com/office/drawing/2014/main" xmlns="" id="{86EF85BD-B585-F4FA-AB4B-371C19D22622}"/>
               </a:ext>
             </a:extLst>
           </p:cNvPr>
@@ -4960,7 +4984,7 @@
           <p:cNvPr id="3" name="TextBox 2">
             <a:extLst>
               <a:ext uri="{FF2B5EF4-FFF2-40B4-BE49-F238E27FC236}">
-                <a16:creationId xmlns:a16="http://schemas.microsoft.com/office/drawing/2014/main" id="{84DC2BB8-292B-9547-F547-714E254909AC}"/>
+                <a16:creationId xmlns:a16="http://schemas.microsoft.com/office/drawing/2014/main" xmlns="" id="{84DC2BB8-292B-9547-F547-714E254909AC}"/>
               </a:ext>
             </a:extLst>
           </p:cNvPr>
@@ -5000,7 +5024,7 @@
           <p:cNvPr id="6" name="Straight Arrow Connector 5">
             <a:extLst>
               <a:ext uri="{FF2B5EF4-FFF2-40B4-BE49-F238E27FC236}">
-                <a16:creationId xmlns:a16="http://schemas.microsoft.com/office/drawing/2014/main" id="{B78E30C3-3DDD-81E6-326B-A6A9E45AD369}"/>
+                <a16:creationId xmlns:a16="http://schemas.microsoft.com/office/drawing/2014/main" xmlns="" id="{B78E30C3-3DDD-81E6-326B-A6A9E45AD369}"/>
               </a:ext>
             </a:extLst>
           </p:cNvPr>
@@ -5041,7 +5065,7 @@
           <p:cNvPr id="8" name="TextBox 7">
             <a:extLst>
               <a:ext uri="{FF2B5EF4-FFF2-40B4-BE49-F238E27FC236}">
-                <a16:creationId xmlns:a16="http://schemas.microsoft.com/office/drawing/2014/main" id="{D67CC55F-BD51-EFE5-750B-92A0584389C0}"/>
+                <a16:creationId xmlns:a16="http://schemas.microsoft.com/office/drawing/2014/main" xmlns="" id="{D67CC55F-BD51-EFE5-750B-92A0584389C0}"/>
               </a:ext>
             </a:extLst>
           </p:cNvPr>
@@ -5082,7 +5106,7 @@
           <p:cNvPr id="4" name="TextBox 3">
             <a:extLst>
               <a:ext uri="{FF2B5EF4-FFF2-40B4-BE49-F238E27FC236}">
-                <a16:creationId xmlns:a16="http://schemas.microsoft.com/office/drawing/2014/main" id="{3F21C954-9D99-07CD-A05F-AD817D7E0C03}"/>
+                <a16:creationId xmlns:a16="http://schemas.microsoft.com/office/drawing/2014/main" xmlns="" id="{3F21C954-9D99-07CD-A05F-AD817D7E0C03}"/>
               </a:ext>
             </a:extLst>
           </p:cNvPr>
@@ -5123,7 +5147,7 @@
           <p:cNvPr id="9" name="Straight Arrow Connector 8">
             <a:extLst>
               <a:ext uri="{FF2B5EF4-FFF2-40B4-BE49-F238E27FC236}">
-                <a16:creationId xmlns:a16="http://schemas.microsoft.com/office/drawing/2014/main" id="{2C3F7B3C-ABB9-335A-DB6D-DDD7A150B158}"/>
+                <a16:creationId xmlns:a16="http://schemas.microsoft.com/office/drawing/2014/main" xmlns="" id="{2C3F7B3C-ABB9-335A-DB6D-DDD7A150B158}"/>
               </a:ext>
             </a:extLst>
           </p:cNvPr>
@@ -5164,7 +5188,7 @@
           <p:cNvPr id="11" name="TextBox 10">
             <a:extLst>
               <a:ext uri="{FF2B5EF4-FFF2-40B4-BE49-F238E27FC236}">
-                <a16:creationId xmlns:a16="http://schemas.microsoft.com/office/drawing/2014/main" id="{D0161953-B802-E031-9173-88AC95ED3465}"/>
+                <a16:creationId xmlns:a16="http://schemas.microsoft.com/office/drawing/2014/main" xmlns="" id="{D0161953-B802-E031-9173-88AC95ED3465}"/>
               </a:ext>
             </a:extLst>
           </p:cNvPr>
@@ -5205,7 +5229,7 @@
           <p:cNvPr id="15" name="Connector: Elbow 14">
             <a:extLst>
               <a:ext uri="{FF2B5EF4-FFF2-40B4-BE49-F238E27FC236}">
-                <a16:creationId xmlns:a16="http://schemas.microsoft.com/office/drawing/2014/main" id="{903C2CDA-62FB-F15C-9416-9C59F394A844}"/>
+                <a16:creationId xmlns:a16="http://schemas.microsoft.com/office/drawing/2014/main" xmlns="" id="{903C2CDA-62FB-F15C-9416-9C59F394A844}"/>
               </a:ext>
             </a:extLst>
           </p:cNvPr>
@@ -5247,7 +5271,7 @@
           <p:cNvPr id="18" name="TextBox 17">
             <a:extLst>
               <a:ext uri="{FF2B5EF4-FFF2-40B4-BE49-F238E27FC236}">
-                <a16:creationId xmlns:a16="http://schemas.microsoft.com/office/drawing/2014/main" id="{61A6DC2D-4998-61E7-D85C-270F4C9BAAD9}"/>
+                <a16:creationId xmlns:a16="http://schemas.microsoft.com/office/drawing/2014/main" xmlns="" id="{61A6DC2D-4998-61E7-D85C-270F4C9BAAD9}"/>
               </a:ext>
             </a:extLst>
           </p:cNvPr>
@@ -5288,7 +5312,7 @@
           <p:cNvPr id="25" name="Straight Arrow Connector 24">
             <a:extLst>
               <a:ext uri="{FF2B5EF4-FFF2-40B4-BE49-F238E27FC236}">
-                <a16:creationId xmlns:a16="http://schemas.microsoft.com/office/drawing/2014/main" id="{11D9F816-9BF9-5F34-1ACB-E701949DF6AB}"/>
+                <a16:creationId xmlns:a16="http://schemas.microsoft.com/office/drawing/2014/main" xmlns="" id="{11D9F816-9BF9-5F34-1ACB-E701949DF6AB}"/>
               </a:ext>
             </a:extLst>
           </p:cNvPr>
@@ -5331,7 +5355,7 @@
           <p:cNvPr id="51" name="TextBox 50">
             <a:extLst>
               <a:ext uri="{FF2B5EF4-FFF2-40B4-BE49-F238E27FC236}">
-                <a16:creationId xmlns:a16="http://schemas.microsoft.com/office/drawing/2014/main" id="{15083F6C-0154-66E7-F7B7-53AD23A4B728}"/>
+                <a16:creationId xmlns:a16="http://schemas.microsoft.com/office/drawing/2014/main" xmlns="" id="{15083F6C-0154-66E7-F7B7-53AD23A4B728}"/>
               </a:ext>
             </a:extLst>
           </p:cNvPr>
@@ -5372,7 +5396,7 @@
           <p:cNvPr id="52" name="TextBox 51">
             <a:extLst>
               <a:ext uri="{FF2B5EF4-FFF2-40B4-BE49-F238E27FC236}">
-                <a16:creationId xmlns:a16="http://schemas.microsoft.com/office/drawing/2014/main" id="{02D291B1-6347-2554-D1E5-35026E4AFB76}"/>
+                <a16:creationId xmlns:a16="http://schemas.microsoft.com/office/drawing/2014/main" xmlns="" id="{02D291B1-6347-2554-D1E5-35026E4AFB76}"/>
               </a:ext>
             </a:extLst>
           </p:cNvPr>
@@ -5413,7 +5437,7 @@
           <p:cNvPr id="53" name="Straight Arrow Connector 52">
             <a:extLst>
               <a:ext uri="{FF2B5EF4-FFF2-40B4-BE49-F238E27FC236}">
-                <a16:creationId xmlns:a16="http://schemas.microsoft.com/office/drawing/2014/main" id="{E9BAEEF3-4B8E-E5E2-7A33-34465E0CAEBE}"/>
+                <a16:creationId xmlns:a16="http://schemas.microsoft.com/office/drawing/2014/main" xmlns="" id="{E9BAEEF3-4B8E-E5E2-7A33-34465E0CAEBE}"/>
               </a:ext>
             </a:extLst>
           </p:cNvPr>
@@ -5454,7 +5478,7 @@
           <p:cNvPr id="12" name="Straight Arrow Connector 11">
             <a:extLst>
               <a:ext uri="{FF2B5EF4-FFF2-40B4-BE49-F238E27FC236}">
-                <a16:creationId xmlns:a16="http://schemas.microsoft.com/office/drawing/2014/main" id="{C000D6F9-0F1D-FB05-924E-C940EA0CEBE7}"/>
+                <a16:creationId xmlns:a16="http://schemas.microsoft.com/office/drawing/2014/main" xmlns="" id="{C000D6F9-0F1D-FB05-924E-C940EA0CEBE7}"/>
               </a:ext>
             </a:extLst>
           </p:cNvPr>
@@ -5525,7 +5549,7 @@
           <p:cNvPr id="2" name="Title 1">
             <a:extLst>
               <a:ext uri="{FF2B5EF4-FFF2-40B4-BE49-F238E27FC236}">
-                <a16:creationId xmlns:a16="http://schemas.microsoft.com/office/drawing/2014/main" id="{D0B87F8E-5D83-4513-9285-8A122C4A62CB}"/>
+                <a16:creationId xmlns:a16="http://schemas.microsoft.com/office/drawing/2014/main" xmlns="" id="{D0B87F8E-5D83-4513-9285-8A122C4A62CB}"/>
               </a:ext>
             </a:extLst>
           </p:cNvPr>
@@ -5558,7 +5582,7 @@
           <p:cNvPr id="5" name="Straight Connector 4">
             <a:extLst>
               <a:ext uri="{FF2B5EF4-FFF2-40B4-BE49-F238E27FC236}">
-                <a16:creationId xmlns:a16="http://schemas.microsoft.com/office/drawing/2014/main" id="{86EF85BD-B585-F4FA-AB4B-371C19D22622}"/>
+                <a16:creationId xmlns:a16="http://schemas.microsoft.com/office/drawing/2014/main" xmlns="" id="{86EF85BD-B585-F4FA-AB4B-371C19D22622}"/>
               </a:ext>
             </a:extLst>
           </p:cNvPr>
@@ -5602,7 +5626,7 @@
           <p:cNvPr id="4" name="TextBox 3">
             <a:extLst>
               <a:ext uri="{FF2B5EF4-FFF2-40B4-BE49-F238E27FC236}">
-                <a16:creationId xmlns:a16="http://schemas.microsoft.com/office/drawing/2014/main" id="{82DAD499-FD02-A701-175D-A67C401A6F59}"/>
+                <a16:creationId xmlns:a16="http://schemas.microsoft.com/office/drawing/2014/main" xmlns="" id="{82DAD499-FD02-A701-175D-A67C401A6F59}"/>
               </a:ext>
             </a:extLst>
           </p:cNvPr>
@@ -5733,7 +5757,7 @@
           <p:cNvPr id="2" name="Title 1">
             <a:extLst>
               <a:ext uri="{FF2B5EF4-FFF2-40B4-BE49-F238E27FC236}">
-                <a16:creationId xmlns:a16="http://schemas.microsoft.com/office/drawing/2014/main" id="{C522C03A-1F25-FFCB-9A59-564E472BE731}"/>
+                <a16:creationId xmlns:a16="http://schemas.microsoft.com/office/drawing/2014/main" xmlns="" id="{C522C03A-1F25-FFCB-9A59-564E472BE731}"/>
               </a:ext>
             </a:extLst>
           </p:cNvPr>
@@ -5761,7 +5785,7 @@
           <p:cNvPr id="3" name="Content Placeholder 2">
             <a:extLst>
               <a:ext uri="{FF2B5EF4-FFF2-40B4-BE49-F238E27FC236}">
-                <a16:creationId xmlns:a16="http://schemas.microsoft.com/office/drawing/2014/main" id="{4928701A-C732-A649-3B69-6F919769FA47}"/>
+                <a16:creationId xmlns:a16="http://schemas.microsoft.com/office/drawing/2014/main" xmlns="" id="{4928701A-C732-A649-3B69-6F919769FA47}"/>
               </a:ext>
             </a:extLst>
           </p:cNvPr>
@@ -5899,7 +5923,7 @@
           <p:cNvPr id="2" name="Title 1">
             <a:extLst>
               <a:ext uri="{FF2B5EF4-FFF2-40B4-BE49-F238E27FC236}">
-                <a16:creationId xmlns:a16="http://schemas.microsoft.com/office/drawing/2014/main" id="{C522C03A-1F25-FFCB-9A59-564E472BE731}"/>
+                <a16:creationId xmlns:a16="http://schemas.microsoft.com/office/drawing/2014/main" xmlns="" id="{C522C03A-1F25-FFCB-9A59-564E472BE731}"/>
               </a:ext>
             </a:extLst>
           </p:cNvPr>
@@ -5930,7 +5954,7 @@
           <p:cNvPr id="3" name="Content Placeholder 2">
             <a:extLst>
               <a:ext uri="{FF2B5EF4-FFF2-40B4-BE49-F238E27FC236}">
-                <a16:creationId xmlns:a16="http://schemas.microsoft.com/office/drawing/2014/main" id="{4928701A-C732-A649-3B69-6F919769FA47}"/>
+                <a16:creationId xmlns:a16="http://schemas.microsoft.com/office/drawing/2014/main" xmlns="" id="{4928701A-C732-A649-3B69-6F919769FA47}"/>
               </a:ext>
             </a:extLst>
           </p:cNvPr>
@@ -6013,7 +6037,7 @@
           <p:cNvPr id="2" name="Title 1">
             <a:extLst>
               <a:ext uri="{FF2B5EF4-FFF2-40B4-BE49-F238E27FC236}">
-                <a16:creationId xmlns:a16="http://schemas.microsoft.com/office/drawing/2014/main" id="{82A22F9F-30AD-859E-B701-92F7A256856D}"/>
+                <a16:creationId xmlns:a16="http://schemas.microsoft.com/office/drawing/2014/main" xmlns="" id="{82A22F9F-30AD-859E-B701-92F7A256856D}"/>
               </a:ext>
             </a:extLst>
           </p:cNvPr>
@@ -6043,7 +6067,7 @@
           <p:cNvPr id="3" name="Content Placeholder 2">
             <a:extLst>
               <a:ext uri="{FF2B5EF4-FFF2-40B4-BE49-F238E27FC236}">
-                <a16:creationId xmlns:a16="http://schemas.microsoft.com/office/drawing/2014/main" id="{49BF805F-408E-585C-FCBE-9B0FA5EA3A8C}"/>
+                <a16:creationId xmlns:a16="http://schemas.microsoft.com/office/drawing/2014/main" xmlns="" id="{49BF805F-408E-585C-FCBE-9B0FA5EA3A8C}"/>
               </a:ext>
             </a:extLst>
           </p:cNvPr>

</xml_diff>

<commit_message>
edited flow slide in presentation.pptx
</commit_message>
<xml_diff>
--- a/presentation.pptx
+++ b/presentation.pptx
@@ -4854,11 +4854,7 @@
             <a:pPr lvl="1"/>
             <a:r>
               <a:rPr lang="en-US" dirty="0" smtClean="0"/>
-              <a:t>Our “lazy”/non-exhaustive approach might miss some clones, but it works efficiently and quickly to catch most clones in our </a:t>
-            </a:r>
-            <a:r>
-              <a:rPr lang="en-US" smtClean="0"/>
-              <a:t>intended category.</a:t>
+              <a:t>Our “lazy”/non-exhaustive approach might miss some clones, but it works efficiently and quickly to catch most clones in our intended category.</a:t>
             </a:r>
             <a:endParaRPr lang="en-US" dirty="0" smtClean="0"/>
           </a:p>
@@ -4993,7 +4989,7 @@
         </p:nvSpPr>
         <p:spPr>
           <a:xfrm>
-            <a:off x="2482064" y="1615044"/>
+            <a:off x="3211269" y="1487719"/>
             <a:ext cx="7237163" cy="461665"/>
           </a:xfrm>
           <a:prstGeom prst="rect">
@@ -5030,13 +5026,15 @@
           </p:cNvPr>
           <p:cNvCxnSpPr>
             <a:cxnSpLocks/>
+            <a:stCxn id="3" idx="2"/>
+            <a:endCxn id="8" idx="0"/>
           </p:cNvCxnSpPr>
           <p:nvPr/>
         </p:nvCxnSpPr>
         <p:spPr>
-          <a:xfrm>
-            <a:off x="6100646" y="2076709"/>
-            <a:ext cx="0" cy="281721"/>
+          <a:xfrm flipH="1">
+            <a:off x="6829846" y="1949384"/>
+            <a:ext cx="5" cy="327419"/>
           </a:xfrm>
           <a:prstGeom prst="straightConnector1">
             <a:avLst/>
@@ -5074,8 +5072,8 @@
         </p:nvSpPr>
         <p:spPr>
           <a:xfrm>
-            <a:off x="2482060" y="2404128"/>
-            <a:ext cx="7261523" cy="461665"/>
+            <a:off x="3211265" y="2276803"/>
+            <a:ext cx="7237161" cy="461665"/>
           </a:xfrm>
           <a:prstGeom prst="rect">
             <a:avLst/>
@@ -5115,7 +5113,7 @@
         </p:nvSpPr>
         <p:spPr>
           <a:xfrm>
-            <a:off x="2482060" y="3198167"/>
+            <a:off x="3211265" y="3070842"/>
             <a:ext cx="7237161" cy="461665"/>
           </a:xfrm>
           <a:prstGeom prst="rect">
@@ -5153,13 +5151,15 @@
           </p:cNvPr>
           <p:cNvCxnSpPr>
             <a:cxnSpLocks/>
+            <a:stCxn id="8" idx="2"/>
+            <a:endCxn id="4" idx="0"/>
           </p:cNvCxnSpPr>
           <p:nvPr/>
         </p:nvCxnSpPr>
         <p:spPr>
           <a:xfrm>
-            <a:off x="6110461" y="2855168"/>
-            <a:ext cx="0" cy="342999"/>
+            <a:off x="6829846" y="2738468"/>
+            <a:ext cx="0" cy="332374"/>
           </a:xfrm>
           <a:prstGeom prst="straightConnector1">
             <a:avLst/>
@@ -5197,8 +5197,54 @@
         </p:nvSpPr>
         <p:spPr>
           <a:xfrm>
-            <a:off x="842138" y="3759337"/>
+            <a:off x="675022" y="4075864"/>
             <a:ext cx="2934215" cy="461665"/>
+          </a:xfrm>
+          <a:prstGeom prst="rect">
+            <a:avLst/>
+          </a:prstGeom>
+          <a:noFill/>
+          <a:ln w="19050">
+            <a:solidFill>
+              <a:schemeClr val="accent6"/>
+            </a:solidFill>
+          </a:ln>
+        </p:spPr>
+        <p:txBody>
+          <a:bodyPr wrap="square" rtlCol="0">
+            <a:spAutoFit/>
+          </a:bodyPr>
+          <a:lstStyle/>
+          <a:p>
+            <a:pPr algn="ctr"/>
+            <a:r>
+              <a:rPr lang="en-US" sz="2400" dirty="0"/>
+              <a:t>Report </a:t>
+            </a:r>
+            <a:r>
+              <a:rPr lang="en-US" sz="2400" dirty="0" smtClean="0"/>
+              <a:t>clone:</a:t>
+            </a:r>
+            <a:endParaRPr lang="en-US" sz="2400" dirty="0"/>
+          </a:p>
+        </p:txBody>
+      </p:sp>
+      <p:sp>
+        <p:nvSpPr>
+          <p:cNvPr id="18" name="TextBox 17">
+            <a:extLst>
+              <a:ext uri="{FF2B5EF4-FFF2-40B4-BE49-F238E27FC236}">
+                <a16:creationId xmlns:a16="http://schemas.microsoft.com/office/drawing/2014/main" xmlns="" id="{61A6DC2D-4998-61E7-D85C-270F4C9BAAD9}"/>
+              </a:ext>
+            </a:extLst>
+          </p:cNvPr>
+          <p:cNvSpPr txBox="1"/>
+          <p:nvPr/>
+        </p:nvSpPr>
+        <p:spPr>
+          <a:xfrm>
+            <a:off x="4293162" y="6217238"/>
+            <a:ext cx="5073361" cy="461665"/>
           </a:xfrm>
           <a:prstGeom prst="rect">
             <a:avLst/>
@@ -5218,238 +5264,76 @@
           <a:p>
             <a:pPr algn="ctr"/>
             <a:r>
-              <a:rPr lang="en-US" sz="2400" dirty="0"/>
-              <a:t>Report type I</a:t>
-            </a:r>
-          </a:p>
-        </p:txBody>
-      </p:sp>
-      <p:cxnSp>
-        <p:nvCxnSpPr>
-          <p:cNvPr id="15" name="Connector: Elbow 14">
-            <a:extLst>
-              <a:ext uri="{FF2B5EF4-FFF2-40B4-BE49-F238E27FC236}">
-                <a16:creationId xmlns:a16="http://schemas.microsoft.com/office/drawing/2014/main" xmlns="" id="{903C2CDA-62FB-F15C-9416-9C59F394A844}"/>
-              </a:ext>
-            </a:extLst>
-          </p:cNvPr>
-          <p:cNvCxnSpPr>
-            <a:cxnSpLocks/>
-            <a:endCxn id="11" idx="3"/>
-          </p:cNvCxnSpPr>
+              <a:rPr lang="en-US" sz="2400" dirty="0" smtClean="0"/>
+              <a:t>Code blocks: replace names as tokens</a:t>
+            </a:r>
+            <a:endParaRPr lang="en-US" sz="2400" dirty="0"/>
+          </a:p>
+        </p:txBody>
+      </p:sp>
+      <p:sp>
+        <p:nvSpPr>
+          <p:cNvPr id="7" name="Diamond 6"/>
+          <p:cNvSpPr/>
           <p:nvPr/>
-        </p:nvCxnSpPr>
-        <p:spPr>
-          <a:xfrm rot="10800000" flipV="1">
-            <a:off x="3776354" y="3659832"/>
-            <a:ext cx="831275" cy="330338"/>
-          </a:xfrm>
-          <a:prstGeom prst="bentConnector3">
+        </p:nvSpPr>
+        <p:spPr>
+          <a:xfrm>
+            <a:off x="5690128" y="3928845"/>
+            <a:ext cx="2279431" cy="755703"/>
+          </a:xfrm>
+          <a:prstGeom prst="diamond">
             <a:avLst/>
           </a:prstGeom>
-          <a:ln w="15875">
-            <a:tailEnd type="stealth" w="lg" len="med"/>
-          </a:ln>
+          <a:ln w="28575"/>
         </p:spPr>
         <p:style>
-          <a:lnRef idx="1">
+          <a:lnRef idx="2">
             <a:schemeClr val="accent1"/>
           </a:lnRef>
-          <a:fillRef idx="0">
-            <a:schemeClr val="accent1"/>
+          <a:fillRef idx="1">
+            <a:schemeClr val="lt1"/>
           </a:fillRef>
           <a:effectRef idx="0">
             <a:schemeClr val="accent1"/>
           </a:effectRef>
           <a:fontRef idx="minor">
-            <a:schemeClr val="tx1"/>
+            <a:schemeClr val="dk1"/>
           </a:fontRef>
         </p:style>
-      </p:cxnSp>
-      <p:sp>
-        <p:nvSpPr>
-          <p:cNvPr id="18" name="TextBox 17">
-            <a:extLst>
-              <a:ext uri="{FF2B5EF4-FFF2-40B4-BE49-F238E27FC236}">
-                <a16:creationId xmlns:a16="http://schemas.microsoft.com/office/drawing/2014/main" xmlns="" id="{61A6DC2D-4998-61E7-D85C-270F4C9BAAD9}"/>
-              </a:ext>
-            </a:extLst>
-          </p:cNvPr>
-          <p:cNvSpPr txBox="1"/>
-          <p:nvPr/>
-        </p:nvSpPr>
-        <p:spPr>
-          <a:xfrm>
-            <a:off x="2416380" y="4362635"/>
-            <a:ext cx="7344767" cy="461665"/>
-          </a:xfrm>
-          <a:prstGeom prst="rect">
-            <a:avLst/>
-          </a:prstGeom>
-          <a:noFill/>
-          <a:ln w="19050">
-            <a:solidFill>
-              <a:schemeClr val="accent1"/>
-            </a:solidFill>
-          </a:ln>
-        </p:spPr>
-        <p:txBody>
-          <a:bodyPr wrap="square" rtlCol="0">
-            <a:spAutoFit/>
-          </a:bodyPr>
+        <p:txBody>
+          <a:bodyPr wrap="none" rtlCol="0" anchor="ctr"/>
           <a:lstStyle/>
           <a:p>
             <a:pPr algn="ctr"/>
             <a:r>
-              <a:rPr lang="en-US" sz="2400" dirty="0"/>
-              <a:t>Replace internal names with tokens</a:t>
-            </a:r>
+              <a:rPr lang="en-US" dirty="0" smtClean="0"/>
+              <a:t>Hash similarity?</a:t>
+            </a:r>
+            <a:endParaRPr lang="en-US" dirty="0"/>
           </a:p>
         </p:txBody>
       </p:sp>
       <p:cxnSp>
         <p:nvCxnSpPr>
-          <p:cNvPr id="25" name="Straight Arrow Connector 24">
-            <a:extLst>
-              <a:ext uri="{FF2B5EF4-FFF2-40B4-BE49-F238E27FC236}">
-                <a16:creationId xmlns:a16="http://schemas.microsoft.com/office/drawing/2014/main" xmlns="" id="{11D9F816-9BF9-5F34-1ACB-E701949DF6AB}"/>
+          <p:cNvPr id="24" name="Straight Arrow Connector 23">
+            <a:extLst>
+              <a:ext uri="{FF2B5EF4-FFF2-40B4-BE49-F238E27FC236}">
+                <a16:creationId xmlns:a16="http://schemas.microsoft.com/office/drawing/2014/main" xmlns="" id="{2C3F7B3C-ABB9-335A-DB6D-DDD7A150B158}"/>
               </a:ext>
             </a:extLst>
           </p:cNvPr>
           <p:cNvCxnSpPr>
             <a:cxnSpLocks/>
             <a:stCxn id="4" idx="2"/>
-            <a:endCxn id="18" idx="0"/>
+            <a:endCxn id="7" idx="0"/>
           </p:cNvCxnSpPr>
           <p:nvPr/>
         </p:nvCxnSpPr>
         <p:spPr>
           <a:xfrm flipH="1">
-            <a:off x="6088764" y="3659832"/>
-            <a:ext cx="11877" cy="702803"/>
-          </a:xfrm>
-          <a:prstGeom prst="straightConnector1">
-            <a:avLst/>
-          </a:prstGeom>
-          <a:ln w="0">
-            <a:tailEnd type="triangle" w="lg" len="med"/>
-          </a:ln>
-        </p:spPr>
-        <p:style>
-          <a:lnRef idx="1">
-            <a:schemeClr val="accent1"/>
-          </a:lnRef>
-          <a:fillRef idx="0">
-            <a:schemeClr val="accent1"/>
-          </a:fillRef>
-          <a:effectRef idx="0">
-            <a:schemeClr val="accent1"/>
-          </a:effectRef>
-          <a:fontRef idx="minor">
-            <a:schemeClr val="tx1"/>
-          </a:fontRef>
-        </p:style>
-      </p:cxnSp>
-      <p:sp>
-        <p:nvSpPr>
-          <p:cNvPr id="51" name="TextBox 50">
-            <a:extLst>
-              <a:ext uri="{FF2B5EF4-FFF2-40B4-BE49-F238E27FC236}">
-                <a16:creationId xmlns:a16="http://schemas.microsoft.com/office/drawing/2014/main" xmlns="" id="{15083F6C-0154-66E7-F7B7-53AD23A4B728}"/>
-              </a:ext>
-            </a:extLst>
-          </p:cNvPr>
-          <p:cNvSpPr txBox="1"/>
-          <p:nvPr/>
-        </p:nvSpPr>
-        <p:spPr>
-          <a:xfrm>
-            <a:off x="2470184" y="5196765"/>
-            <a:ext cx="7261523" cy="461665"/>
-          </a:xfrm>
-          <a:prstGeom prst="rect">
-            <a:avLst/>
-          </a:prstGeom>
-          <a:noFill/>
-          <a:ln w="19050">
-            <a:solidFill>
-              <a:schemeClr val="accent1"/>
-            </a:solidFill>
-          </a:ln>
-        </p:spPr>
-        <p:txBody>
-          <a:bodyPr wrap="square" rtlCol="0">
-            <a:spAutoFit/>
-          </a:bodyPr>
-          <a:lstStyle/>
-          <a:p>
-            <a:pPr algn="ctr"/>
-            <a:r>
-              <a:rPr lang="en-US" sz="2400" dirty="0"/>
-              <a:t>Hash all of the code files again</a:t>
-            </a:r>
-          </a:p>
-        </p:txBody>
-      </p:sp>
-      <p:sp>
-        <p:nvSpPr>
-          <p:cNvPr id="52" name="TextBox 51">
-            <a:extLst>
-              <a:ext uri="{FF2B5EF4-FFF2-40B4-BE49-F238E27FC236}">
-                <a16:creationId xmlns:a16="http://schemas.microsoft.com/office/drawing/2014/main" xmlns="" id="{02D291B1-6347-2554-D1E5-35026E4AFB76}"/>
-              </a:ext>
-            </a:extLst>
-          </p:cNvPr>
-          <p:cNvSpPr txBox="1"/>
-          <p:nvPr/>
-        </p:nvSpPr>
-        <p:spPr>
-          <a:xfrm>
-            <a:off x="2470184" y="5990804"/>
-            <a:ext cx="7237161" cy="461665"/>
-          </a:xfrm>
-          <a:prstGeom prst="rect">
-            <a:avLst/>
-          </a:prstGeom>
-          <a:noFill/>
-          <a:ln w="19050">
-            <a:solidFill>
-              <a:schemeClr val="accent1"/>
-            </a:solidFill>
-          </a:ln>
-        </p:spPr>
-        <p:txBody>
-          <a:bodyPr wrap="square" rtlCol="0">
-            <a:spAutoFit/>
-          </a:bodyPr>
-          <a:lstStyle/>
-          <a:p>
-            <a:pPr algn="ctr"/>
-            <a:r>
-              <a:rPr lang="en-US" sz="2400" dirty="0"/>
-              <a:t>Compare – report as type II clones if matches</a:t>
-            </a:r>
-          </a:p>
-        </p:txBody>
-      </p:sp>
-      <p:cxnSp>
-        <p:nvCxnSpPr>
-          <p:cNvPr id="53" name="Straight Arrow Connector 52">
-            <a:extLst>
-              <a:ext uri="{FF2B5EF4-FFF2-40B4-BE49-F238E27FC236}">
-                <a16:creationId xmlns:a16="http://schemas.microsoft.com/office/drawing/2014/main" xmlns="" id="{E9BAEEF3-4B8E-E5E2-7A33-34465E0CAEBE}"/>
-              </a:ext>
-            </a:extLst>
-          </p:cNvPr>
-          <p:cNvCxnSpPr>
-            <a:cxnSpLocks/>
-          </p:cNvCxnSpPr>
-          <p:nvPr/>
-        </p:nvCxnSpPr>
-        <p:spPr>
-          <a:xfrm>
-            <a:off x="6098585" y="5647805"/>
-            <a:ext cx="0" cy="342999"/>
+            <a:off x="6829844" y="3532507"/>
+            <a:ext cx="2" cy="396338"/>
           </a:xfrm>
           <a:prstGeom prst="straightConnector1">
             <a:avLst/>
@@ -5475,28 +5359,23 @@
       </p:cxnSp>
       <p:cxnSp>
         <p:nvCxnSpPr>
-          <p:cNvPr id="12" name="Straight Arrow Connector 11">
-            <a:extLst>
-              <a:ext uri="{FF2B5EF4-FFF2-40B4-BE49-F238E27FC236}">
-                <a16:creationId xmlns:a16="http://schemas.microsoft.com/office/drawing/2014/main" xmlns="" id="{C000D6F9-0F1D-FB05-924E-C940EA0CEBE7}"/>
-              </a:ext>
-            </a:extLst>
-          </p:cNvPr>
+          <p:cNvPr id="27" name="Straight Arrow Connector 26"/>
           <p:cNvCxnSpPr>
-            <a:cxnSpLocks/>
+            <a:stCxn id="7" idx="1"/>
+            <a:endCxn id="11" idx="3"/>
           </p:cNvCxnSpPr>
           <p:nvPr/>
         </p:nvCxnSpPr>
         <p:spPr>
-          <a:xfrm>
-            <a:off x="6110461" y="4824300"/>
-            <a:ext cx="0" cy="342999"/>
+          <a:xfrm flipH="1">
+            <a:off x="3609237" y="4306697"/>
+            <a:ext cx="2080891" cy="0"/>
           </a:xfrm>
           <a:prstGeom prst="straightConnector1">
             <a:avLst/>
           </a:prstGeom>
-          <a:ln w="0">
-            <a:tailEnd type="triangle" w="lg" len="med"/>
+          <a:ln>
+            <a:tailEnd type="triangle"/>
           </a:ln>
         </p:spPr>
         <p:style>
@@ -5514,6 +5393,836 @@
           </a:fontRef>
         </p:style>
       </p:cxnSp>
+      <p:sp>
+        <p:nvSpPr>
+          <p:cNvPr id="28" name="TextBox 27"/>
+          <p:cNvSpPr txBox="1"/>
+          <p:nvPr/>
+        </p:nvSpPr>
+        <p:spPr>
+          <a:xfrm>
+            <a:off x="4439712" y="3955526"/>
+            <a:ext cx="699230" cy="369332"/>
+          </a:xfrm>
+          <a:prstGeom prst="rect">
+            <a:avLst/>
+          </a:prstGeom>
+          <a:noFill/>
+        </p:spPr>
+        <p:txBody>
+          <a:bodyPr wrap="none" rtlCol="0">
+            <a:spAutoFit/>
+          </a:bodyPr>
+          <a:lstStyle/>
+          <a:p>
+            <a:r>
+              <a:rPr lang="en-US" dirty="0" smtClean="0"/>
+              <a:t>&gt;90%</a:t>
+            </a:r>
+            <a:endParaRPr lang="en-US" dirty="0"/>
+          </a:p>
+        </p:txBody>
+      </p:sp>
+      <p:cxnSp>
+        <p:nvCxnSpPr>
+          <p:cNvPr id="30" name="Straight Arrow Connector 29"/>
+          <p:cNvCxnSpPr>
+            <a:stCxn id="7" idx="2"/>
+            <a:endCxn id="37" idx="0"/>
+          </p:cNvCxnSpPr>
+          <p:nvPr/>
+        </p:nvCxnSpPr>
+        <p:spPr>
+          <a:xfrm flipH="1">
+            <a:off x="6829843" y="4684548"/>
+            <a:ext cx="1" cy="428168"/>
+          </a:xfrm>
+          <a:prstGeom prst="straightConnector1">
+            <a:avLst/>
+          </a:prstGeom>
+          <a:ln>
+            <a:tailEnd type="triangle"/>
+          </a:ln>
+        </p:spPr>
+        <p:style>
+          <a:lnRef idx="1">
+            <a:schemeClr val="accent1"/>
+          </a:lnRef>
+          <a:fillRef idx="0">
+            <a:schemeClr val="accent1"/>
+          </a:fillRef>
+          <a:effectRef idx="0">
+            <a:schemeClr val="accent1"/>
+          </a:effectRef>
+          <a:fontRef idx="minor">
+            <a:schemeClr val="tx1"/>
+          </a:fontRef>
+        </p:style>
+      </p:cxnSp>
+      <p:sp>
+        <p:nvSpPr>
+          <p:cNvPr id="37" name="Diamond 36"/>
+          <p:cNvSpPr/>
+          <p:nvPr/>
+        </p:nvSpPr>
+        <p:spPr>
+          <a:xfrm>
+            <a:off x="5927082" y="5112716"/>
+            <a:ext cx="1805521" cy="755703"/>
+          </a:xfrm>
+          <a:prstGeom prst="diamond">
+            <a:avLst/>
+          </a:prstGeom>
+          <a:ln w="28575"/>
+        </p:spPr>
+        <p:style>
+          <a:lnRef idx="2">
+            <a:schemeClr val="accent1"/>
+          </a:lnRef>
+          <a:fillRef idx="1">
+            <a:schemeClr val="lt1"/>
+          </a:fillRef>
+          <a:effectRef idx="0">
+            <a:schemeClr val="accent1"/>
+          </a:effectRef>
+          <a:fontRef idx="minor">
+            <a:schemeClr val="dk1"/>
+          </a:fontRef>
+        </p:style>
+        <p:txBody>
+          <a:bodyPr wrap="none" lIns="0" tIns="0" rIns="0" bIns="0" rtlCol="0" anchor="ctr"/>
+          <a:lstStyle/>
+          <a:p>
+            <a:pPr algn="ctr"/>
+            <a:r>
+              <a:rPr lang="en-US" dirty="0" smtClean="0"/>
+              <a:t>Tokens yet?</a:t>
+            </a:r>
+            <a:endParaRPr lang="en-US" dirty="0"/>
+          </a:p>
+        </p:txBody>
+      </p:sp>
+      <p:sp>
+        <p:nvSpPr>
+          <p:cNvPr id="38" name="TextBox 37">
+            <a:extLst>
+              <a:ext uri="{FF2B5EF4-FFF2-40B4-BE49-F238E27FC236}">
+                <a16:creationId xmlns:a16="http://schemas.microsoft.com/office/drawing/2014/main" xmlns="" id="{D0161953-B802-E031-9173-88AC95ED3465}"/>
+              </a:ext>
+            </a:extLst>
+          </p:cNvPr>
+          <p:cNvSpPr txBox="1"/>
+          <p:nvPr/>
+        </p:nvSpPr>
+        <p:spPr>
+          <a:xfrm>
+            <a:off x="8635744" y="4075864"/>
+            <a:ext cx="2934215" cy="461665"/>
+          </a:xfrm>
+          <a:prstGeom prst="rect">
+            <a:avLst/>
+          </a:prstGeom>
+          <a:ln w="19050">
+            <a:solidFill>
+              <a:schemeClr val="accent3"/>
+            </a:solidFill>
+          </a:ln>
+        </p:spPr>
+        <p:style>
+          <a:lnRef idx="2">
+            <a:schemeClr val="accent2"/>
+          </a:lnRef>
+          <a:fillRef idx="1">
+            <a:schemeClr val="lt1"/>
+          </a:fillRef>
+          <a:effectRef idx="0">
+            <a:schemeClr val="accent2"/>
+          </a:effectRef>
+          <a:fontRef idx="minor">
+            <a:schemeClr val="dk1"/>
+          </a:fontRef>
+        </p:style>
+        <p:txBody>
+          <a:bodyPr wrap="square" rtlCol="0">
+            <a:spAutoFit/>
+          </a:bodyPr>
+          <a:lstStyle/>
+          <a:p>
+            <a:pPr algn="ctr"/>
+            <a:r>
+              <a:rPr lang="en-US" sz="2400" dirty="0" smtClean="0"/>
+              <a:t>Not clone; discard</a:t>
+            </a:r>
+            <a:endParaRPr lang="en-US" sz="2400" dirty="0"/>
+          </a:p>
+        </p:txBody>
+      </p:sp>
+      <p:cxnSp>
+        <p:nvCxnSpPr>
+          <p:cNvPr id="35" name="Straight Arrow Connector 34"/>
+          <p:cNvCxnSpPr>
+            <a:stCxn id="7" idx="3"/>
+            <a:endCxn id="38" idx="1"/>
+          </p:cNvCxnSpPr>
+          <p:nvPr/>
+        </p:nvCxnSpPr>
+        <p:spPr>
+          <a:xfrm>
+            <a:off x="7969559" y="4306697"/>
+            <a:ext cx="666185" cy="0"/>
+          </a:xfrm>
+          <a:prstGeom prst="straightConnector1">
+            <a:avLst/>
+          </a:prstGeom>
+          <a:ln>
+            <a:tailEnd type="triangle"/>
+          </a:ln>
+        </p:spPr>
+        <p:style>
+          <a:lnRef idx="1">
+            <a:schemeClr val="accent1"/>
+          </a:lnRef>
+          <a:fillRef idx="0">
+            <a:schemeClr val="accent1"/>
+          </a:fillRef>
+          <a:effectRef idx="0">
+            <a:schemeClr val="accent1"/>
+          </a:effectRef>
+          <a:fontRef idx="minor">
+            <a:schemeClr val="tx1"/>
+          </a:fontRef>
+        </p:style>
+      </p:cxnSp>
+      <p:sp>
+        <p:nvSpPr>
+          <p:cNvPr id="54" name="TextBox 53"/>
+          <p:cNvSpPr txBox="1"/>
+          <p:nvPr/>
+        </p:nvSpPr>
+        <p:spPr>
+          <a:xfrm>
+            <a:off x="7925113" y="3955526"/>
+            <a:ext cx="699230" cy="369332"/>
+          </a:xfrm>
+          <a:prstGeom prst="rect">
+            <a:avLst/>
+          </a:prstGeom>
+          <a:noFill/>
+        </p:spPr>
+        <p:txBody>
+          <a:bodyPr wrap="none" rtlCol="0">
+            <a:spAutoFit/>
+          </a:bodyPr>
+          <a:lstStyle/>
+          <a:p>
+            <a:r>
+              <a:rPr lang="en-US" dirty="0" smtClean="0"/>
+              <a:t>&lt;50%</a:t>
+            </a:r>
+            <a:endParaRPr lang="en-US" dirty="0"/>
+          </a:p>
+        </p:txBody>
+      </p:sp>
+      <p:sp>
+        <p:nvSpPr>
+          <p:cNvPr id="55" name="TextBox 54"/>
+          <p:cNvSpPr txBox="1"/>
+          <p:nvPr/>
+        </p:nvSpPr>
+        <p:spPr>
+          <a:xfrm>
+            <a:off x="6831047" y="4717596"/>
+            <a:ext cx="933269" cy="369332"/>
+          </a:xfrm>
+          <a:prstGeom prst="rect">
+            <a:avLst/>
+          </a:prstGeom>
+          <a:noFill/>
+        </p:spPr>
+        <p:txBody>
+          <a:bodyPr wrap="none" rtlCol="0">
+            <a:spAutoFit/>
+          </a:bodyPr>
+          <a:lstStyle/>
+          <a:p>
+            <a:r>
+              <a:rPr lang="en-US" dirty="0" smtClean="0"/>
+              <a:t>50~90%</a:t>
+            </a:r>
+            <a:endParaRPr lang="en-US" dirty="0"/>
+          </a:p>
+        </p:txBody>
+      </p:sp>
+      <p:sp>
+        <p:nvSpPr>
+          <p:cNvPr id="56" name="Diamond 55"/>
+          <p:cNvSpPr/>
+          <p:nvPr/>
+        </p:nvSpPr>
+        <p:spPr>
+          <a:xfrm>
+            <a:off x="1240154" y="5112716"/>
+            <a:ext cx="1803953" cy="755703"/>
+          </a:xfrm>
+          <a:prstGeom prst="diamond">
+            <a:avLst/>
+          </a:prstGeom>
+          <a:ln w="28575"/>
+        </p:spPr>
+        <p:style>
+          <a:lnRef idx="2">
+            <a:schemeClr val="accent1"/>
+          </a:lnRef>
+          <a:fillRef idx="1">
+            <a:schemeClr val="lt1"/>
+          </a:fillRef>
+          <a:effectRef idx="0">
+            <a:schemeClr val="accent1"/>
+          </a:effectRef>
+          <a:fontRef idx="minor">
+            <a:schemeClr val="dk1"/>
+          </a:fontRef>
+        </p:style>
+        <p:txBody>
+          <a:bodyPr wrap="none" lIns="0" tIns="0" rIns="0" bIns="0" rtlCol="0" anchor="ctr"/>
+          <a:lstStyle/>
+          <a:p>
+            <a:pPr algn="ctr"/>
+            <a:r>
+              <a:rPr lang="en-US" dirty="0" smtClean="0"/>
+              <a:t>Tokens yet?</a:t>
+            </a:r>
+            <a:endParaRPr lang="en-US" dirty="0"/>
+          </a:p>
+        </p:txBody>
+      </p:sp>
+      <p:cxnSp>
+        <p:nvCxnSpPr>
+          <p:cNvPr id="63" name="Elbow Connector 62"/>
+          <p:cNvCxnSpPr>
+            <a:stCxn id="37" idx="3"/>
+            <a:endCxn id="38" idx="2"/>
+          </p:cNvCxnSpPr>
+          <p:nvPr/>
+        </p:nvCxnSpPr>
+        <p:spPr>
+          <a:xfrm flipV="1">
+            <a:off x="7732603" y="4537529"/>
+            <a:ext cx="2370249" cy="953039"/>
+          </a:xfrm>
+          <a:prstGeom prst="bentConnector2">
+            <a:avLst/>
+          </a:prstGeom>
+          <a:ln>
+            <a:tailEnd type="triangle"/>
+          </a:ln>
+        </p:spPr>
+        <p:style>
+          <a:lnRef idx="1">
+            <a:schemeClr val="accent1"/>
+          </a:lnRef>
+          <a:fillRef idx="0">
+            <a:schemeClr val="accent1"/>
+          </a:fillRef>
+          <a:effectRef idx="0">
+            <a:schemeClr val="accent1"/>
+          </a:effectRef>
+          <a:fontRef idx="minor">
+            <a:schemeClr val="tx1"/>
+          </a:fontRef>
+        </p:style>
+      </p:cxnSp>
+      <p:cxnSp>
+        <p:nvCxnSpPr>
+          <p:cNvPr id="72" name="Elbow Connector 71"/>
+          <p:cNvCxnSpPr>
+            <a:stCxn id="18" idx="3"/>
+            <a:endCxn id="8" idx="3"/>
+          </p:cNvCxnSpPr>
+          <p:nvPr/>
+        </p:nvCxnSpPr>
+        <p:spPr>
+          <a:xfrm flipV="1">
+            <a:off x="9366523" y="2507636"/>
+            <a:ext cx="1081903" cy="3940435"/>
+          </a:xfrm>
+          <a:prstGeom prst="bentConnector3">
+            <a:avLst>
+              <a:gd name="adj1" fmla="val 227044"/>
+            </a:avLst>
+          </a:prstGeom>
+          <a:ln>
+            <a:tailEnd type="triangle"/>
+          </a:ln>
+        </p:spPr>
+        <p:style>
+          <a:lnRef idx="1">
+            <a:schemeClr val="accent1"/>
+          </a:lnRef>
+          <a:fillRef idx="0">
+            <a:schemeClr val="accent1"/>
+          </a:fillRef>
+          <a:effectRef idx="0">
+            <a:schemeClr val="accent1"/>
+          </a:effectRef>
+          <a:fontRef idx="minor">
+            <a:schemeClr val="tx1"/>
+          </a:fontRef>
+        </p:style>
+      </p:cxnSp>
+      <p:sp>
+        <p:nvSpPr>
+          <p:cNvPr id="74" name="TextBox 73">
+            <a:extLst>
+              <a:ext uri="{FF2B5EF4-FFF2-40B4-BE49-F238E27FC236}">
+                <a16:creationId xmlns:a16="http://schemas.microsoft.com/office/drawing/2014/main" xmlns="" id="{D0161953-B802-E031-9173-88AC95ED3465}"/>
+              </a:ext>
+            </a:extLst>
+          </p:cNvPr>
+          <p:cNvSpPr txBox="1"/>
+          <p:nvPr/>
+        </p:nvSpPr>
+        <p:spPr>
+          <a:xfrm>
+            <a:off x="615820" y="1487718"/>
+            <a:ext cx="1085062" cy="461665"/>
+          </a:xfrm>
+          <a:prstGeom prst="rect">
+            <a:avLst/>
+          </a:prstGeom>
+          <a:ln w="19050"/>
+        </p:spPr>
+        <p:style>
+          <a:lnRef idx="2">
+            <a:schemeClr val="accent2"/>
+          </a:lnRef>
+          <a:fillRef idx="1">
+            <a:schemeClr val="lt1"/>
+          </a:fillRef>
+          <a:effectRef idx="0">
+            <a:schemeClr val="accent2"/>
+          </a:effectRef>
+          <a:fontRef idx="minor">
+            <a:schemeClr val="dk1"/>
+          </a:fontRef>
+        </p:style>
+        <p:txBody>
+          <a:bodyPr wrap="square" rtlCol="0">
+            <a:spAutoFit/>
+          </a:bodyPr>
+          <a:lstStyle/>
+          <a:p>
+            <a:pPr algn="ctr"/>
+            <a:r>
+              <a:rPr lang="en-US" sz="2400" dirty="0" smtClean="0"/>
+              <a:t>Start</a:t>
+            </a:r>
+            <a:endParaRPr lang="en-US" sz="2400" dirty="0"/>
+          </a:p>
+        </p:txBody>
+      </p:sp>
+      <p:cxnSp>
+        <p:nvCxnSpPr>
+          <p:cNvPr id="76" name="Straight Arrow Connector 75"/>
+          <p:cNvCxnSpPr>
+            <a:stCxn id="74" idx="3"/>
+            <a:endCxn id="3" idx="1"/>
+          </p:cNvCxnSpPr>
+          <p:nvPr/>
+        </p:nvCxnSpPr>
+        <p:spPr>
+          <a:xfrm>
+            <a:off x="1700882" y="1718551"/>
+            <a:ext cx="1510387" cy="1"/>
+          </a:xfrm>
+          <a:prstGeom prst="straightConnector1">
+            <a:avLst/>
+          </a:prstGeom>
+          <a:ln>
+            <a:tailEnd type="triangle"/>
+          </a:ln>
+        </p:spPr>
+        <p:style>
+          <a:lnRef idx="1">
+            <a:schemeClr val="accent1"/>
+          </a:lnRef>
+          <a:fillRef idx="0">
+            <a:schemeClr val="accent1"/>
+          </a:fillRef>
+          <a:effectRef idx="0">
+            <a:schemeClr val="accent1"/>
+          </a:effectRef>
+          <a:fontRef idx="minor">
+            <a:schemeClr val="tx1"/>
+          </a:fontRef>
+        </p:style>
+      </p:cxnSp>
+      <p:cxnSp>
+        <p:nvCxnSpPr>
+          <p:cNvPr id="85" name="Straight Arrow Connector 84"/>
+          <p:cNvCxnSpPr>
+            <a:stCxn id="37" idx="2"/>
+            <a:endCxn id="18" idx="0"/>
+          </p:cNvCxnSpPr>
+          <p:nvPr/>
+        </p:nvCxnSpPr>
+        <p:spPr>
+          <a:xfrm>
+            <a:off x="6829843" y="5868419"/>
+            <a:ext cx="0" cy="348819"/>
+          </a:xfrm>
+          <a:prstGeom prst="straightConnector1">
+            <a:avLst/>
+          </a:prstGeom>
+          <a:ln>
+            <a:tailEnd type="triangle"/>
+          </a:ln>
+        </p:spPr>
+        <p:style>
+          <a:lnRef idx="1">
+            <a:schemeClr val="accent1"/>
+          </a:lnRef>
+          <a:fillRef idx="0">
+            <a:schemeClr val="accent1"/>
+          </a:fillRef>
+          <a:effectRef idx="0">
+            <a:schemeClr val="accent1"/>
+          </a:effectRef>
+          <a:fontRef idx="minor">
+            <a:schemeClr val="tx1"/>
+          </a:fontRef>
+        </p:style>
+      </p:cxnSp>
+      <p:sp>
+        <p:nvSpPr>
+          <p:cNvPr id="94" name="TextBox 93"/>
+          <p:cNvSpPr txBox="1"/>
+          <p:nvPr/>
+        </p:nvSpPr>
+        <p:spPr>
+          <a:xfrm>
+            <a:off x="7824599" y="5115066"/>
+            <a:ext cx="485518" cy="369332"/>
+          </a:xfrm>
+          <a:prstGeom prst="rect">
+            <a:avLst/>
+          </a:prstGeom>
+          <a:noFill/>
+        </p:spPr>
+        <p:txBody>
+          <a:bodyPr wrap="none" rtlCol="0">
+            <a:spAutoFit/>
+          </a:bodyPr>
+          <a:lstStyle/>
+          <a:p>
+            <a:r>
+              <a:rPr lang="en-US" dirty="0" smtClean="0"/>
+              <a:t>Yes</a:t>
+            </a:r>
+            <a:endParaRPr lang="en-US" dirty="0"/>
+          </a:p>
+        </p:txBody>
+      </p:sp>
+      <p:sp>
+        <p:nvSpPr>
+          <p:cNvPr id="95" name="TextBox 94"/>
+          <p:cNvSpPr txBox="1"/>
+          <p:nvPr/>
+        </p:nvSpPr>
+        <p:spPr>
+          <a:xfrm>
+            <a:off x="6920884" y="5847906"/>
+            <a:ext cx="455574" cy="369332"/>
+          </a:xfrm>
+          <a:prstGeom prst="rect">
+            <a:avLst/>
+          </a:prstGeom>
+          <a:noFill/>
+        </p:spPr>
+        <p:txBody>
+          <a:bodyPr wrap="none" rtlCol="0">
+            <a:spAutoFit/>
+          </a:bodyPr>
+          <a:lstStyle/>
+          <a:p>
+            <a:r>
+              <a:rPr lang="en-US" dirty="0" smtClean="0"/>
+              <a:t>No</a:t>
+            </a:r>
+            <a:endParaRPr lang="en-US" dirty="0"/>
+          </a:p>
+        </p:txBody>
+      </p:sp>
+      <p:sp>
+        <p:nvSpPr>
+          <p:cNvPr id="96" name="TextBox 95">
+            <a:extLst>
+              <a:ext uri="{FF2B5EF4-FFF2-40B4-BE49-F238E27FC236}">
+                <a16:creationId xmlns:a16="http://schemas.microsoft.com/office/drawing/2014/main" xmlns="" id="{D0161953-B802-E031-9173-88AC95ED3465}"/>
+              </a:ext>
+            </a:extLst>
+          </p:cNvPr>
+          <p:cNvSpPr txBox="1"/>
+          <p:nvPr/>
+        </p:nvSpPr>
+        <p:spPr>
+          <a:xfrm>
+            <a:off x="362764" y="6199895"/>
+            <a:ext cx="1437252" cy="461665"/>
+          </a:xfrm>
+          <a:prstGeom prst="rect">
+            <a:avLst/>
+          </a:prstGeom>
+          <a:ln w="19050"/>
+        </p:spPr>
+        <p:style>
+          <a:lnRef idx="2">
+            <a:schemeClr val="accent6"/>
+          </a:lnRef>
+          <a:fillRef idx="1">
+            <a:schemeClr val="lt1"/>
+          </a:fillRef>
+          <a:effectRef idx="0">
+            <a:schemeClr val="accent6"/>
+          </a:effectRef>
+          <a:fontRef idx="minor">
+            <a:schemeClr val="dk1"/>
+          </a:fontRef>
+        </p:style>
+        <p:txBody>
+          <a:bodyPr wrap="square" rtlCol="0">
+            <a:spAutoFit/>
+          </a:bodyPr>
+          <a:lstStyle/>
+          <a:p>
+            <a:pPr algn="ctr"/>
+            <a:r>
+              <a:rPr lang="en-US" sz="2400" dirty="0" smtClean="0"/>
+              <a:t>Type I</a:t>
+            </a:r>
+            <a:endParaRPr lang="en-US" sz="2400" dirty="0"/>
+          </a:p>
+        </p:txBody>
+      </p:sp>
+      <p:sp>
+        <p:nvSpPr>
+          <p:cNvPr id="97" name="TextBox 96">
+            <a:extLst>
+              <a:ext uri="{FF2B5EF4-FFF2-40B4-BE49-F238E27FC236}">
+                <a16:creationId xmlns:a16="http://schemas.microsoft.com/office/drawing/2014/main" xmlns="" id="{D0161953-B802-E031-9173-88AC95ED3465}"/>
+              </a:ext>
+            </a:extLst>
+          </p:cNvPr>
+          <p:cNvSpPr txBox="1"/>
+          <p:nvPr/>
+        </p:nvSpPr>
+        <p:spPr>
+          <a:xfrm>
+            <a:off x="2502543" y="6199894"/>
+            <a:ext cx="1437252" cy="461665"/>
+          </a:xfrm>
+          <a:prstGeom prst="rect">
+            <a:avLst/>
+          </a:prstGeom>
+          <a:ln w="19050"/>
+        </p:spPr>
+        <p:style>
+          <a:lnRef idx="2">
+            <a:schemeClr val="accent6"/>
+          </a:lnRef>
+          <a:fillRef idx="1">
+            <a:schemeClr val="lt1"/>
+          </a:fillRef>
+          <a:effectRef idx="0">
+            <a:schemeClr val="accent6"/>
+          </a:effectRef>
+          <a:fontRef idx="minor">
+            <a:schemeClr val="dk1"/>
+          </a:fontRef>
+        </p:style>
+        <p:txBody>
+          <a:bodyPr wrap="square" rtlCol="0">
+            <a:spAutoFit/>
+          </a:bodyPr>
+          <a:lstStyle/>
+          <a:p>
+            <a:pPr algn="ctr"/>
+            <a:r>
+              <a:rPr lang="en-US" sz="2400" dirty="0" smtClean="0"/>
+              <a:t>Type II</a:t>
+            </a:r>
+            <a:endParaRPr lang="en-US" sz="2400" dirty="0"/>
+          </a:p>
+        </p:txBody>
+      </p:sp>
+      <p:cxnSp>
+        <p:nvCxnSpPr>
+          <p:cNvPr id="101" name="Elbow Connector 100"/>
+          <p:cNvCxnSpPr>
+            <a:stCxn id="56" idx="1"/>
+            <a:endCxn id="96" idx="0"/>
+          </p:cNvCxnSpPr>
+          <p:nvPr/>
+        </p:nvCxnSpPr>
+        <p:spPr>
+          <a:xfrm rot="10800000" flipV="1">
+            <a:off x="1081390" y="5490567"/>
+            <a:ext cx="158764" cy="709327"/>
+          </a:xfrm>
+          <a:prstGeom prst="bentConnector2">
+            <a:avLst/>
+          </a:prstGeom>
+          <a:ln>
+            <a:tailEnd type="triangle"/>
+          </a:ln>
+        </p:spPr>
+        <p:style>
+          <a:lnRef idx="1">
+            <a:schemeClr val="accent1"/>
+          </a:lnRef>
+          <a:fillRef idx="0">
+            <a:schemeClr val="accent1"/>
+          </a:fillRef>
+          <a:effectRef idx="0">
+            <a:schemeClr val="accent1"/>
+          </a:effectRef>
+          <a:fontRef idx="minor">
+            <a:schemeClr val="tx1"/>
+          </a:fontRef>
+        </p:style>
+      </p:cxnSp>
+      <p:cxnSp>
+        <p:nvCxnSpPr>
+          <p:cNvPr id="103" name="Elbow Connector 102"/>
+          <p:cNvCxnSpPr>
+            <a:stCxn id="56" idx="3"/>
+            <a:endCxn id="97" idx="0"/>
+          </p:cNvCxnSpPr>
+          <p:nvPr/>
+        </p:nvCxnSpPr>
+        <p:spPr>
+          <a:xfrm>
+            <a:off x="3044107" y="5490568"/>
+            <a:ext cx="177062" cy="709326"/>
+          </a:xfrm>
+          <a:prstGeom prst="bentConnector2">
+            <a:avLst/>
+          </a:prstGeom>
+          <a:ln>
+            <a:tailEnd type="triangle"/>
+          </a:ln>
+        </p:spPr>
+        <p:style>
+          <a:lnRef idx="1">
+            <a:schemeClr val="accent1"/>
+          </a:lnRef>
+          <a:fillRef idx="0">
+            <a:schemeClr val="accent1"/>
+          </a:fillRef>
+          <a:effectRef idx="0">
+            <a:schemeClr val="accent1"/>
+          </a:effectRef>
+          <a:fontRef idx="minor">
+            <a:schemeClr val="tx1"/>
+          </a:fontRef>
+        </p:style>
+      </p:cxnSp>
+      <p:cxnSp>
+        <p:nvCxnSpPr>
+          <p:cNvPr id="108" name="Straight Arrow Connector 107"/>
+          <p:cNvCxnSpPr>
+            <a:stCxn id="11" idx="2"/>
+            <a:endCxn id="56" idx="0"/>
+          </p:cNvCxnSpPr>
+          <p:nvPr/>
+        </p:nvCxnSpPr>
+        <p:spPr>
+          <a:xfrm>
+            <a:off x="2142130" y="4537529"/>
+            <a:ext cx="1" cy="575187"/>
+          </a:xfrm>
+          <a:prstGeom prst="straightConnector1">
+            <a:avLst/>
+          </a:prstGeom>
+          <a:ln>
+            <a:tailEnd type="triangle"/>
+          </a:ln>
+        </p:spPr>
+        <p:style>
+          <a:lnRef idx="1">
+            <a:schemeClr val="accent1"/>
+          </a:lnRef>
+          <a:fillRef idx="0">
+            <a:schemeClr val="accent1"/>
+          </a:fillRef>
+          <a:effectRef idx="0">
+            <a:schemeClr val="accent1"/>
+          </a:effectRef>
+          <a:fontRef idx="minor">
+            <a:schemeClr val="tx1"/>
+          </a:fontRef>
+        </p:style>
+      </p:cxnSp>
+      <p:sp>
+        <p:nvSpPr>
+          <p:cNvPr id="109" name="TextBox 108"/>
+          <p:cNvSpPr txBox="1"/>
+          <p:nvPr/>
+        </p:nvSpPr>
+        <p:spPr>
+          <a:xfrm>
+            <a:off x="3250858" y="5735419"/>
+            <a:ext cx="485518" cy="369332"/>
+          </a:xfrm>
+          <a:prstGeom prst="rect">
+            <a:avLst/>
+          </a:prstGeom>
+          <a:noFill/>
+        </p:spPr>
+        <p:txBody>
+          <a:bodyPr wrap="none" rtlCol="0">
+            <a:spAutoFit/>
+          </a:bodyPr>
+          <a:lstStyle/>
+          <a:p>
+            <a:r>
+              <a:rPr lang="en-US" dirty="0" smtClean="0"/>
+              <a:t>Yes</a:t>
+            </a:r>
+            <a:endParaRPr lang="en-US" dirty="0"/>
+          </a:p>
+        </p:txBody>
+      </p:sp>
+      <p:sp>
+        <p:nvSpPr>
+          <p:cNvPr id="110" name="TextBox 109"/>
+          <p:cNvSpPr txBox="1"/>
+          <p:nvPr/>
+        </p:nvSpPr>
+        <p:spPr>
+          <a:xfrm>
+            <a:off x="1117152" y="5738230"/>
+            <a:ext cx="455574" cy="369332"/>
+          </a:xfrm>
+          <a:prstGeom prst="rect">
+            <a:avLst/>
+          </a:prstGeom>
+          <a:noFill/>
+        </p:spPr>
+        <p:txBody>
+          <a:bodyPr wrap="none" rtlCol="0">
+            <a:spAutoFit/>
+          </a:bodyPr>
+          <a:lstStyle/>
+          <a:p>
+            <a:r>
+              <a:rPr lang="en-US" dirty="0" smtClean="0"/>
+              <a:t>No</a:t>
+            </a:r>
+            <a:endParaRPr lang="en-US" dirty="0"/>
+          </a:p>
+        </p:txBody>
+      </p:sp>
     </p:spTree>
     <p:extLst>
       <p:ext uri="{BB962C8B-B14F-4D97-AF65-F5344CB8AC3E}">

</xml_diff>

<commit_message>
add slides tokenizer and test data
</commit_message>
<xml_diff>
--- a/presentation.pptx
+++ b/presentation.pptx
@@ -5,7 +5,7 @@
     <p:sldMasterId id="2147483648" r:id="rId1"/>
   </p:sldMasterIdLst>
   <p:notesMasterIdLst>
-    <p:notesMasterId r:id="rId9"/>
+    <p:notesMasterId r:id="rId11"/>
   </p:notesMasterIdLst>
   <p:sldIdLst>
     <p:sldId id="256" r:id="rId2"/>
@@ -15,6 +15,8 @@
     <p:sldId id="258" r:id="rId6"/>
     <p:sldId id="259" r:id="rId7"/>
     <p:sldId id="260" r:id="rId8"/>
+    <p:sldId id="263" r:id="rId9"/>
+    <p:sldId id="264" r:id="rId10"/>
   </p:sldIdLst>
   <p:sldSz cx="12192000" cy="6858000"/>
   <p:notesSz cx="6858000" cy="9144000"/>
@@ -773,6 +775,174 @@
 </p:notes>
 </file>
 
+<file path=ppt/notesSlides/notesSlide4.xml><?xml version="1.0" encoding="utf-8"?>
+<p:notes xmlns:a="http://schemas.openxmlformats.org/drawingml/2006/main" xmlns:r="http://schemas.openxmlformats.org/officeDocument/2006/relationships" xmlns:p="http://schemas.openxmlformats.org/presentationml/2006/main">
+  <p:cSld>
+    <p:spTree>
+      <p:nvGrpSpPr>
+        <p:cNvPr id="1" name=""/>
+        <p:cNvGrpSpPr/>
+        <p:nvPr/>
+      </p:nvGrpSpPr>
+      <p:grpSpPr>
+        <a:xfrm>
+          <a:off x="0" y="0"/>
+          <a:ext cx="0" cy="0"/>
+          <a:chOff x="0" y="0"/>
+          <a:chExt cx="0" cy="0"/>
+        </a:xfrm>
+      </p:grpSpPr>
+      <p:sp>
+        <p:nvSpPr>
+          <p:cNvPr id="2" name="Slide Image Placeholder 1"/>
+          <p:cNvSpPr>
+            <a:spLocks noGrp="1" noRot="1" noChangeAspect="1"/>
+          </p:cNvSpPr>
+          <p:nvPr>
+            <p:ph type="sldImg"/>
+          </p:nvPr>
+        </p:nvSpPr>
+        <p:spPr/>
+      </p:sp>
+      <p:sp>
+        <p:nvSpPr>
+          <p:cNvPr id="3" name="Notes Placeholder 2"/>
+          <p:cNvSpPr>
+            <a:spLocks noGrp="1"/>
+          </p:cNvSpPr>
+          <p:nvPr>
+            <p:ph type="body" idx="1"/>
+          </p:nvPr>
+        </p:nvSpPr>
+        <p:spPr/>
+        <p:txBody>
+          <a:bodyPr/>
+          <a:lstStyle/>
+          <a:p>
+            <a:endParaRPr lang="en-US" dirty="0"/>
+          </a:p>
+        </p:txBody>
+      </p:sp>
+      <p:sp>
+        <p:nvSpPr>
+          <p:cNvPr id="4" name="Slide Number Placeholder 3"/>
+          <p:cNvSpPr>
+            <a:spLocks noGrp="1"/>
+          </p:cNvSpPr>
+          <p:nvPr>
+            <p:ph type="sldNum" sz="quarter" idx="5"/>
+          </p:nvPr>
+        </p:nvSpPr>
+        <p:spPr/>
+        <p:txBody>
+          <a:bodyPr/>
+          <a:lstStyle/>
+          <a:p>
+            <a:fld id="{1BFF8EC0-4E85-4B5B-B1AE-D39CEADE6519}" type="slidenum">
+              <a:rPr lang="en-US" smtClean="0"/>
+              <a:t>8</a:t>
+            </a:fld>
+            <a:endParaRPr lang="en-US"/>
+          </a:p>
+        </p:txBody>
+      </p:sp>
+    </p:spTree>
+    <p:extLst>
+      <p:ext uri="{BB962C8B-B14F-4D97-AF65-F5344CB8AC3E}">
+        <p14:creationId xmlns:p14="http://schemas.microsoft.com/office/powerpoint/2010/main" val="1635376767"/>
+      </p:ext>
+    </p:extLst>
+  </p:cSld>
+  <p:clrMapOvr>
+    <a:masterClrMapping/>
+  </p:clrMapOvr>
+</p:notes>
+</file>
+
+<file path=ppt/notesSlides/notesSlide5.xml><?xml version="1.0" encoding="utf-8"?>
+<p:notes xmlns:a="http://schemas.openxmlformats.org/drawingml/2006/main" xmlns:r="http://schemas.openxmlformats.org/officeDocument/2006/relationships" xmlns:p="http://schemas.openxmlformats.org/presentationml/2006/main">
+  <p:cSld>
+    <p:spTree>
+      <p:nvGrpSpPr>
+        <p:cNvPr id="1" name=""/>
+        <p:cNvGrpSpPr/>
+        <p:nvPr/>
+      </p:nvGrpSpPr>
+      <p:grpSpPr>
+        <a:xfrm>
+          <a:off x="0" y="0"/>
+          <a:ext cx="0" cy="0"/>
+          <a:chOff x="0" y="0"/>
+          <a:chExt cx="0" cy="0"/>
+        </a:xfrm>
+      </p:grpSpPr>
+      <p:sp>
+        <p:nvSpPr>
+          <p:cNvPr id="2" name="Slide Image Placeholder 1"/>
+          <p:cNvSpPr>
+            <a:spLocks noGrp="1" noRot="1" noChangeAspect="1"/>
+          </p:cNvSpPr>
+          <p:nvPr>
+            <p:ph type="sldImg"/>
+          </p:nvPr>
+        </p:nvSpPr>
+        <p:spPr/>
+      </p:sp>
+      <p:sp>
+        <p:nvSpPr>
+          <p:cNvPr id="3" name="Notes Placeholder 2"/>
+          <p:cNvSpPr>
+            <a:spLocks noGrp="1"/>
+          </p:cNvSpPr>
+          <p:nvPr>
+            <p:ph type="body" idx="1"/>
+          </p:nvPr>
+        </p:nvSpPr>
+        <p:spPr/>
+        <p:txBody>
+          <a:bodyPr/>
+          <a:lstStyle/>
+          <a:p>
+            <a:endParaRPr lang="en-US" dirty="0"/>
+          </a:p>
+        </p:txBody>
+      </p:sp>
+      <p:sp>
+        <p:nvSpPr>
+          <p:cNvPr id="4" name="Slide Number Placeholder 3"/>
+          <p:cNvSpPr>
+            <a:spLocks noGrp="1"/>
+          </p:cNvSpPr>
+          <p:nvPr>
+            <p:ph type="sldNum" sz="quarter" idx="5"/>
+          </p:nvPr>
+        </p:nvSpPr>
+        <p:spPr/>
+        <p:txBody>
+          <a:bodyPr/>
+          <a:lstStyle/>
+          <a:p>
+            <a:fld id="{1BFF8EC0-4E85-4B5B-B1AE-D39CEADE6519}" type="slidenum">
+              <a:rPr lang="en-US" smtClean="0"/>
+              <a:t>9</a:t>
+            </a:fld>
+            <a:endParaRPr lang="en-US"/>
+          </a:p>
+        </p:txBody>
+      </p:sp>
+    </p:spTree>
+    <p:extLst>
+      <p:ext uri="{BB962C8B-B14F-4D97-AF65-F5344CB8AC3E}">
+        <p14:creationId xmlns:p14="http://schemas.microsoft.com/office/powerpoint/2010/main" val="3344669977"/>
+      </p:ext>
+    </p:extLst>
+  </p:cSld>
+  <p:clrMapOvr>
+    <a:masterClrMapping/>
+  </p:clrMapOvr>
+</p:notes>
+</file>
+
 <file path=ppt/slideLayouts/slideLayout1.xml><?xml version="1.0" encoding="utf-8"?>
 <p:sldLayout xmlns:a="http://schemas.openxmlformats.org/drawingml/2006/main" xmlns:r="http://schemas.openxmlformats.org/officeDocument/2006/relationships" xmlns:p="http://schemas.openxmlformats.org/presentationml/2006/main" type="title" preserve="1">
   <p:cSld name="Title Slide">
@@ -795,7 +965,7 @@
           <p:cNvPr id="2" name="Title 1">
             <a:extLst>
               <a:ext uri="{FF2B5EF4-FFF2-40B4-BE49-F238E27FC236}">
-                <a16:creationId xmlns="" xmlns:a16="http://schemas.microsoft.com/office/drawing/2014/main" id="{213A34AA-5E43-435A-A7B7-BCC9F3E207DC}"/>
+                <a16:creationId xmlns:a16="http://schemas.microsoft.com/office/drawing/2014/main" id="{213A34AA-5E43-435A-A7B7-BCC9F3E207DC}"/>
               </a:ext>
             </a:extLst>
           </p:cNvPr>
@@ -832,7 +1002,7 @@
           <p:cNvPr id="3" name="Subtitle 2">
             <a:extLst>
               <a:ext uri="{FF2B5EF4-FFF2-40B4-BE49-F238E27FC236}">
-                <a16:creationId xmlns="" xmlns:a16="http://schemas.microsoft.com/office/drawing/2014/main" id="{5F4F9EDB-7F05-4023-B4E0-405F390EA9F3}"/>
+                <a16:creationId xmlns:a16="http://schemas.microsoft.com/office/drawing/2014/main" id="{5F4F9EDB-7F05-4023-B4E0-405F390EA9F3}"/>
               </a:ext>
             </a:extLst>
           </p:cNvPr>
@@ -902,7 +1072,7 @@
           <p:cNvPr id="4" name="Date Placeholder 3">
             <a:extLst>
               <a:ext uri="{FF2B5EF4-FFF2-40B4-BE49-F238E27FC236}">
-                <a16:creationId xmlns="" xmlns:a16="http://schemas.microsoft.com/office/drawing/2014/main" id="{F3FF794F-1319-48B1-A178-7CF25CA76618}"/>
+                <a16:creationId xmlns:a16="http://schemas.microsoft.com/office/drawing/2014/main" id="{F3FF794F-1319-48B1-A178-7CF25CA76618}"/>
               </a:ext>
             </a:extLst>
           </p:cNvPr>
@@ -931,7 +1101,7 @@
           <p:cNvPr id="5" name="Footer Placeholder 4">
             <a:extLst>
               <a:ext uri="{FF2B5EF4-FFF2-40B4-BE49-F238E27FC236}">
-                <a16:creationId xmlns="" xmlns:a16="http://schemas.microsoft.com/office/drawing/2014/main" id="{AD6F78D6-F2B5-4B62-BD56-CE7B1EE4BFD4}"/>
+                <a16:creationId xmlns:a16="http://schemas.microsoft.com/office/drawing/2014/main" id="{AD6F78D6-F2B5-4B62-BD56-CE7B1EE4BFD4}"/>
               </a:ext>
             </a:extLst>
           </p:cNvPr>
@@ -956,7 +1126,7 @@
           <p:cNvPr id="6" name="Slide Number Placeholder 5">
             <a:extLst>
               <a:ext uri="{FF2B5EF4-FFF2-40B4-BE49-F238E27FC236}">
-                <a16:creationId xmlns="" xmlns:a16="http://schemas.microsoft.com/office/drawing/2014/main" id="{7B5ED8BB-7569-424A-BB8B-F7DB6CD610AF}"/>
+                <a16:creationId xmlns:a16="http://schemas.microsoft.com/office/drawing/2014/main" id="{7B5ED8BB-7569-424A-BB8B-F7DB6CD610AF}"/>
               </a:ext>
             </a:extLst>
           </p:cNvPr>
@@ -1015,7 +1185,7 @@
           <p:cNvPr id="2" name="Title 1">
             <a:extLst>
               <a:ext uri="{FF2B5EF4-FFF2-40B4-BE49-F238E27FC236}">
-                <a16:creationId xmlns="" xmlns:a16="http://schemas.microsoft.com/office/drawing/2014/main" id="{674061D1-01DA-4CF4-ADFD-4320CF9A1AC2}"/>
+                <a16:creationId xmlns:a16="http://schemas.microsoft.com/office/drawing/2014/main" id="{674061D1-01DA-4CF4-ADFD-4320CF9A1AC2}"/>
               </a:ext>
             </a:extLst>
           </p:cNvPr>
@@ -1043,7 +1213,7 @@
           <p:cNvPr id="3" name="Vertical Text Placeholder 2">
             <a:extLst>
               <a:ext uri="{FF2B5EF4-FFF2-40B4-BE49-F238E27FC236}">
-                <a16:creationId xmlns="" xmlns:a16="http://schemas.microsoft.com/office/drawing/2014/main" id="{72FADD50-F22E-4FF0-8992-4446F74924B0}"/>
+                <a16:creationId xmlns:a16="http://schemas.microsoft.com/office/drawing/2014/main" id="{72FADD50-F22E-4FF0-8992-4446F74924B0}"/>
               </a:ext>
             </a:extLst>
           </p:cNvPr>
@@ -1100,7 +1270,7 @@
           <p:cNvPr id="4" name="Date Placeholder 3">
             <a:extLst>
               <a:ext uri="{FF2B5EF4-FFF2-40B4-BE49-F238E27FC236}">
-                <a16:creationId xmlns="" xmlns:a16="http://schemas.microsoft.com/office/drawing/2014/main" id="{4FD568AB-3774-460A-9993-F8C912398DEE}"/>
+                <a16:creationId xmlns:a16="http://schemas.microsoft.com/office/drawing/2014/main" id="{4FD568AB-3774-460A-9993-F8C912398DEE}"/>
               </a:ext>
             </a:extLst>
           </p:cNvPr>
@@ -1129,7 +1299,7 @@
           <p:cNvPr id="5" name="Footer Placeholder 4">
             <a:extLst>
               <a:ext uri="{FF2B5EF4-FFF2-40B4-BE49-F238E27FC236}">
-                <a16:creationId xmlns="" xmlns:a16="http://schemas.microsoft.com/office/drawing/2014/main" id="{26595190-64E7-44FA-8F10-C4B9CE118C7C}"/>
+                <a16:creationId xmlns:a16="http://schemas.microsoft.com/office/drawing/2014/main" id="{26595190-64E7-44FA-8F10-C4B9CE118C7C}"/>
               </a:ext>
             </a:extLst>
           </p:cNvPr>
@@ -1154,7 +1324,7 @@
           <p:cNvPr id="6" name="Slide Number Placeholder 5">
             <a:extLst>
               <a:ext uri="{FF2B5EF4-FFF2-40B4-BE49-F238E27FC236}">
-                <a16:creationId xmlns="" xmlns:a16="http://schemas.microsoft.com/office/drawing/2014/main" id="{1269AE7E-E85B-4C0C-9F9F-4A9E512A8DD4}"/>
+                <a16:creationId xmlns:a16="http://schemas.microsoft.com/office/drawing/2014/main" id="{1269AE7E-E85B-4C0C-9F9F-4A9E512A8DD4}"/>
               </a:ext>
             </a:extLst>
           </p:cNvPr>
@@ -1213,7 +1383,7 @@
           <p:cNvPr id="2" name="Vertical Title 1">
             <a:extLst>
               <a:ext uri="{FF2B5EF4-FFF2-40B4-BE49-F238E27FC236}">
-                <a16:creationId xmlns="" xmlns:a16="http://schemas.microsoft.com/office/drawing/2014/main" id="{75F13DAB-B72E-415D-AB8E-CE29234F5655}"/>
+                <a16:creationId xmlns:a16="http://schemas.microsoft.com/office/drawing/2014/main" id="{75F13DAB-B72E-415D-AB8E-CE29234F5655}"/>
               </a:ext>
             </a:extLst>
           </p:cNvPr>
@@ -1246,7 +1416,7 @@
           <p:cNvPr id="3" name="Vertical Text Placeholder 2">
             <a:extLst>
               <a:ext uri="{FF2B5EF4-FFF2-40B4-BE49-F238E27FC236}">
-                <a16:creationId xmlns="" xmlns:a16="http://schemas.microsoft.com/office/drawing/2014/main" id="{8A678E1E-5EB3-48CE-A09B-F57E17B5BA50}"/>
+                <a16:creationId xmlns:a16="http://schemas.microsoft.com/office/drawing/2014/main" id="{8A678E1E-5EB3-48CE-A09B-F57E17B5BA50}"/>
               </a:ext>
             </a:extLst>
           </p:cNvPr>
@@ -1308,7 +1478,7 @@
           <p:cNvPr id="4" name="Date Placeholder 3">
             <a:extLst>
               <a:ext uri="{FF2B5EF4-FFF2-40B4-BE49-F238E27FC236}">
-                <a16:creationId xmlns="" xmlns:a16="http://schemas.microsoft.com/office/drawing/2014/main" id="{0B724926-44BF-43CC-984F-83B2B3ABCB87}"/>
+                <a16:creationId xmlns:a16="http://schemas.microsoft.com/office/drawing/2014/main" id="{0B724926-44BF-43CC-984F-83B2B3ABCB87}"/>
               </a:ext>
             </a:extLst>
           </p:cNvPr>
@@ -1337,7 +1507,7 @@
           <p:cNvPr id="5" name="Footer Placeholder 4">
             <a:extLst>
               <a:ext uri="{FF2B5EF4-FFF2-40B4-BE49-F238E27FC236}">
-                <a16:creationId xmlns="" xmlns:a16="http://schemas.microsoft.com/office/drawing/2014/main" id="{5F3EF2D1-473B-44ED-BC3D-63CE7CEE9F7B}"/>
+                <a16:creationId xmlns:a16="http://schemas.microsoft.com/office/drawing/2014/main" id="{5F3EF2D1-473B-44ED-BC3D-63CE7CEE9F7B}"/>
               </a:ext>
             </a:extLst>
           </p:cNvPr>
@@ -1362,7 +1532,7 @@
           <p:cNvPr id="6" name="Slide Number Placeholder 5">
             <a:extLst>
               <a:ext uri="{FF2B5EF4-FFF2-40B4-BE49-F238E27FC236}">
-                <a16:creationId xmlns="" xmlns:a16="http://schemas.microsoft.com/office/drawing/2014/main" id="{E5835003-389E-431A-BBE3-43DD45A54185}"/>
+                <a16:creationId xmlns:a16="http://schemas.microsoft.com/office/drawing/2014/main" id="{E5835003-389E-431A-BBE3-43DD45A54185}"/>
               </a:ext>
             </a:extLst>
           </p:cNvPr>
@@ -1421,7 +1591,7 @@
           <p:cNvPr id="2" name="Title 1">
             <a:extLst>
               <a:ext uri="{FF2B5EF4-FFF2-40B4-BE49-F238E27FC236}">
-                <a16:creationId xmlns="" xmlns:a16="http://schemas.microsoft.com/office/drawing/2014/main" id="{5452D5BD-C1DF-4673-AD18-9028F79FC53C}"/>
+                <a16:creationId xmlns:a16="http://schemas.microsoft.com/office/drawing/2014/main" id="{5452D5BD-C1DF-4673-AD18-9028F79FC53C}"/>
               </a:ext>
             </a:extLst>
           </p:cNvPr>
@@ -1460,7 +1630,7 @@
           <p:cNvPr id="3" name="Content Placeholder 2">
             <a:extLst>
               <a:ext uri="{FF2B5EF4-FFF2-40B4-BE49-F238E27FC236}">
-                <a16:creationId xmlns="" xmlns:a16="http://schemas.microsoft.com/office/drawing/2014/main" id="{872F80AF-00BC-4B52-99D4-8FCA3A097FC0}"/>
+                <a16:creationId xmlns:a16="http://schemas.microsoft.com/office/drawing/2014/main" id="{872F80AF-00BC-4B52-99D4-8FCA3A097FC0}"/>
               </a:ext>
             </a:extLst>
           </p:cNvPr>
@@ -1517,7 +1687,7 @@
           <p:cNvPr id="4" name="Date Placeholder 3">
             <a:extLst>
               <a:ext uri="{FF2B5EF4-FFF2-40B4-BE49-F238E27FC236}">
-                <a16:creationId xmlns="" xmlns:a16="http://schemas.microsoft.com/office/drawing/2014/main" id="{0292E782-6B5B-40FC-91C1-A2D12D0D9806}"/>
+                <a16:creationId xmlns:a16="http://schemas.microsoft.com/office/drawing/2014/main" id="{0292E782-6B5B-40FC-91C1-A2D12D0D9806}"/>
               </a:ext>
             </a:extLst>
           </p:cNvPr>
@@ -1546,7 +1716,7 @@
           <p:cNvPr id="5" name="Footer Placeholder 4">
             <a:extLst>
               <a:ext uri="{FF2B5EF4-FFF2-40B4-BE49-F238E27FC236}">
-                <a16:creationId xmlns="" xmlns:a16="http://schemas.microsoft.com/office/drawing/2014/main" id="{E22C71DF-7E1C-480A-9F46-C30FE13A6F29}"/>
+                <a16:creationId xmlns:a16="http://schemas.microsoft.com/office/drawing/2014/main" id="{E22C71DF-7E1C-480A-9F46-C30FE13A6F29}"/>
               </a:ext>
             </a:extLst>
           </p:cNvPr>
@@ -1571,7 +1741,7 @@
           <p:cNvPr id="6" name="Slide Number Placeholder 5">
             <a:extLst>
               <a:ext uri="{FF2B5EF4-FFF2-40B4-BE49-F238E27FC236}">
-                <a16:creationId xmlns="" xmlns:a16="http://schemas.microsoft.com/office/drawing/2014/main" id="{7BDBEA1F-7D89-4993-B0E2-EBEF464F47BA}"/>
+                <a16:creationId xmlns:a16="http://schemas.microsoft.com/office/drawing/2014/main" id="{7BDBEA1F-7D89-4993-B0E2-EBEF464F47BA}"/>
               </a:ext>
             </a:extLst>
           </p:cNvPr>
@@ -1600,7 +1770,7 @@
           <p:cNvPr id="7" name="Straight Connector 6">
             <a:extLst>
               <a:ext uri="{FF2B5EF4-FFF2-40B4-BE49-F238E27FC236}">
-                <a16:creationId xmlns="" xmlns:a16="http://schemas.microsoft.com/office/drawing/2014/main" id="{1FFB6EB9-9B8F-2375-C5BD-AD79DF4E3AD2}"/>
+                <a16:creationId xmlns:a16="http://schemas.microsoft.com/office/drawing/2014/main" id="{1FFB6EB9-9B8F-2375-C5BD-AD79DF4E3AD2}"/>
               </a:ext>
             </a:extLst>
           </p:cNvPr>
@@ -1674,7 +1844,7 @@
           <p:cNvPr id="2" name="Title 1">
             <a:extLst>
               <a:ext uri="{FF2B5EF4-FFF2-40B4-BE49-F238E27FC236}">
-                <a16:creationId xmlns="" xmlns:a16="http://schemas.microsoft.com/office/drawing/2014/main" id="{DE75824E-C687-48A0-9A3C-B8705386EAF9}"/>
+                <a16:creationId xmlns:a16="http://schemas.microsoft.com/office/drawing/2014/main" id="{DE75824E-C687-48A0-9A3C-B8705386EAF9}"/>
               </a:ext>
             </a:extLst>
           </p:cNvPr>
@@ -1711,7 +1881,7 @@
           <p:cNvPr id="3" name="Text Placeholder 2">
             <a:extLst>
               <a:ext uri="{FF2B5EF4-FFF2-40B4-BE49-F238E27FC236}">
-                <a16:creationId xmlns="" xmlns:a16="http://schemas.microsoft.com/office/drawing/2014/main" id="{0D1B597D-16B1-4C13-8406-A9E5AFB4CCAD}"/>
+                <a16:creationId xmlns:a16="http://schemas.microsoft.com/office/drawing/2014/main" id="{0D1B597D-16B1-4C13-8406-A9E5AFB4CCAD}"/>
               </a:ext>
             </a:extLst>
           </p:cNvPr>
@@ -1836,7 +2006,7 @@
           <p:cNvPr id="4" name="Date Placeholder 3">
             <a:extLst>
               <a:ext uri="{FF2B5EF4-FFF2-40B4-BE49-F238E27FC236}">
-                <a16:creationId xmlns="" xmlns:a16="http://schemas.microsoft.com/office/drawing/2014/main" id="{E3A81C5D-813E-43A4-BA6C-1E3E5035FC73}"/>
+                <a16:creationId xmlns:a16="http://schemas.microsoft.com/office/drawing/2014/main" id="{E3A81C5D-813E-43A4-BA6C-1E3E5035FC73}"/>
               </a:ext>
             </a:extLst>
           </p:cNvPr>
@@ -1865,7 +2035,7 @@
           <p:cNvPr id="5" name="Footer Placeholder 4">
             <a:extLst>
               <a:ext uri="{FF2B5EF4-FFF2-40B4-BE49-F238E27FC236}">
-                <a16:creationId xmlns="" xmlns:a16="http://schemas.microsoft.com/office/drawing/2014/main" id="{5EA3CFD6-6559-4140-B76A-09E4BE83C8B5}"/>
+                <a16:creationId xmlns:a16="http://schemas.microsoft.com/office/drawing/2014/main" id="{5EA3CFD6-6559-4140-B76A-09E4BE83C8B5}"/>
               </a:ext>
             </a:extLst>
           </p:cNvPr>
@@ -1890,7 +2060,7 @@
           <p:cNvPr id="6" name="Slide Number Placeholder 5">
             <a:extLst>
               <a:ext uri="{FF2B5EF4-FFF2-40B4-BE49-F238E27FC236}">
-                <a16:creationId xmlns="" xmlns:a16="http://schemas.microsoft.com/office/drawing/2014/main" id="{ECDA1549-12AC-4059-A8F6-0D84C0707D1F}"/>
+                <a16:creationId xmlns:a16="http://schemas.microsoft.com/office/drawing/2014/main" id="{ECDA1549-12AC-4059-A8F6-0D84C0707D1F}"/>
               </a:ext>
             </a:extLst>
           </p:cNvPr>
@@ -1949,7 +2119,7 @@
           <p:cNvPr id="2" name="Title 1">
             <a:extLst>
               <a:ext uri="{FF2B5EF4-FFF2-40B4-BE49-F238E27FC236}">
-                <a16:creationId xmlns="" xmlns:a16="http://schemas.microsoft.com/office/drawing/2014/main" id="{A60BC9F5-576E-42DE-B055-199083CAF103}"/>
+                <a16:creationId xmlns:a16="http://schemas.microsoft.com/office/drawing/2014/main" id="{A60BC9F5-576E-42DE-B055-199083CAF103}"/>
               </a:ext>
             </a:extLst>
           </p:cNvPr>
@@ -1977,7 +2147,7 @@
           <p:cNvPr id="3" name="Content Placeholder 2">
             <a:extLst>
               <a:ext uri="{FF2B5EF4-FFF2-40B4-BE49-F238E27FC236}">
-                <a16:creationId xmlns="" xmlns:a16="http://schemas.microsoft.com/office/drawing/2014/main" id="{71A3C86C-66B7-4437-B8FF-5BA1B3B63C63}"/>
+                <a16:creationId xmlns:a16="http://schemas.microsoft.com/office/drawing/2014/main" id="{71A3C86C-66B7-4437-B8FF-5BA1B3B63C63}"/>
               </a:ext>
             </a:extLst>
           </p:cNvPr>
@@ -2039,7 +2209,7 @@
           <p:cNvPr id="4" name="Content Placeholder 3">
             <a:extLst>
               <a:ext uri="{FF2B5EF4-FFF2-40B4-BE49-F238E27FC236}">
-                <a16:creationId xmlns="" xmlns:a16="http://schemas.microsoft.com/office/drawing/2014/main" id="{92959486-1032-47F9-84F0-2B4B46D772F0}"/>
+                <a16:creationId xmlns:a16="http://schemas.microsoft.com/office/drawing/2014/main" id="{92959486-1032-47F9-84F0-2B4B46D772F0}"/>
               </a:ext>
             </a:extLst>
           </p:cNvPr>
@@ -2101,7 +2271,7 @@
           <p:cNvPr id="5" name="Date Placeholder 4">
             <a:extLst>
               <a:ext uri="{FF2B5EF4-FFF2-40B4-BE49-F238E27FC236}">
-                <a16:creationId xmlns="" xmlns:a16="http://schemas.microsoft.com/office/drawing/2014/main" id="{A6D883F3-47AF-45FD-9291-206A04A5F7EA}"/>
+                <a16:creationId xmlns:a16="http://schemas.microsoft.com/office/drawing/2014/main" id="{A6D883F3-47AF-45FD-9291-206A04A5F7EA}"/>
               </a:ext>
             </a:extLst>
           </p:cNvPr>
@@ -2130,7 +2300,7 @@
           <p:cNvPr id="6" name="Footer Placeholder 5">
             <a:extLst>
               <a:ext uri="{FF2B5EF4-FFF2-40B4-BE49-F238E27FC236}">
-                <a16:creationId xmlns="" xmlns:a16="http://schemas.microsoft.com/office/drawing/2014/main" id="{69F8164B-C772-4EB8-94A2-C24897BD216C}"/>
+                <a16:creationId xmlns:a16="http://schemas.microsoft.com/office/drawing/2014/main" id="{69F8164B-C772-4EB8-94A2-C24897BD216C}"/>
               </a:ext>
             </a:extLst>
           </p:cNvPr>
@@ -2155,7 +2325,7 @@
           <p:cNvPr id="7" name="Slide Number Placeholder 6">
             <a:extLst>
               <a:ext uri="{FF2B5EF4-FFF2-40B4-BE49-F238E27FC236}">
-                <a16:creationId xmlns="" xmlns:a16="http://schemas.microsoft.com/office/drawing/2014/main" id="{40170100-5C66-4772-A280-A70E353823C6}"/>
+                <a16:creationId xmlns:a16="http://schemas.microsoft.com/office/drawing/2014/main" id="{40170100-5C66-4772-A280-A70E353823C6}"/>
               </a:ext>
             </a:extLst>
           </p:cNvPr>
@@ -2214,7 +2384,7 @@
           <p:cNvPr id="2" name="Title 1">
             <a:extLst>
               <a:ext uri="{FF2B5EF4-FFF2-40B4-BE49-F238E27FC236}">
-                <a16:creationId xmlns="" xmlns:a16="http://schemas.microsoft.com/office/drawing/2014/main" id="{01235673-6FE8-45A3-A361-B5F5F1F3C486}"/>
+                <a16:creationId xmlns:a16="http://schemas.microsoft.com/office/drawing/2014/main" id="{01235673-6FE8-45A3-A361-B5F5F1F3C486}"/>
               </a:ext>
             </a:extLst>
           </p:cNvPr>
@@ -2247,7 +2417,7 @@
           <p:cNvPr id="3" name="Text Placeholder 2">
             <a:extLst>
               <a:ext uri="{FF2B5EF4-FFF2-40B4-BE49-F238E27FC236}">
-                <a16:creationId xmlns="" xmlns:a16="http://schemas.microsoft.com/office/drawing/2014/main" id="{68B14653-79B1-4EDB-B3DB-60E1A37667C1}"/>
+                <a16:creationId xmlns:a16="http://schemas.microsoft.com/office/drawing/2014/main" id="{68B14653-79B1-4EDB-B3DB-60E1A37667C1}"/>
               </a:ext>
             </a:extLst>
           </p:cNvPr>
@@ -2318,7 +2488,7 @@
           <p:cNvPr id="4" name="Content Placeholder 3">
             <a:extLst>
               <a:ext uri="{FF2B5EF4-FFF2-40B4-BE49-F238E27FC236}">
-                <a16:creationId xmlns="" xmlns:a16="http://schemas.microsoft.com/office/drawing/2014/main" id="{0AC4CE1B-FA0F-4FED-AF46-75720527F96D}"/>
+                <a16:creationId xmlns:a16="http://schemas.microsoft.com/office/drawing/2014/main" id="{0AC4CE1B-FA0F-4FED-AF46-75720527F96D}"/>
               </a:ext>
             </a:extLst>
           </p:cNvPr>
@@ -2380,7 +2550,7 @@
           <p:cNvPr id="5" name="Text Placeholder 4">
             <a:extLst>
               <a:ext uri="{FF2B5EF4-FFF2-40B4-BE49-F238E27FC236}">
-                <a16:creationId xmlns="" xmlns:a16="http://schemas.microsoft.com/office/drawing/2014/main" id="{C928A86F-6541-41F4-8141-0E5397B6BFB2}"/>
+                <a16:creationId xmlns:a16="http://schemas.microsoft.com/office/drawing/2014/main" id="{C928A86F-6541-41F4-8141-0E5397B6BFB2}"/>
               </a:ext>
             </a:extLst>
           </p:cNvPr>
@@ -2451,7 +2621,7 @@
           <p:cNvPr id="6" name="Content Placeholder 5">
             <a:extLst>
               <a:ext uri="{FF2B5EF4-FFF2-40B4-BE49-F238E27FC236}">
-                <a16:creationId xmlns="" xmlns:a16="http://schemas.microsoft.com/office/drawing/2014/main" id="{4F930E6C-8D3B-46FB-8D9D-CAB40E0DBFD1}"/>
+                <a16:creationId xmlns:a16="http://schemas.microsoft.com/office/drawing/2014/main" id="{4F930E6C-8D3B-46FB-8D9D-CAB40E0DBFD1}"/>
               </a:ext>
             </a:extLst>
           </p:cNvPr>
@@ -2513,7 +2683,7 @@
           <p:cNvPr id="7" name="Date Placeholder 6">
             <a:extLst>
               <a:ext uri="{FF2B5EF4-FFF2-40B4-BE49-F238E27FC236}">
-                <a16:creationId xmlns="" xmlns:a16="http://schemas.microsoft.com/office/drawing/2014/main" id="{DC999066-0E0E-4AB1-A82D-0A337EFBA275}"/>
+                <a16:creationId xmlns:a16="http://schemas.microsoft.com/office/drawing/2014/main" id="{DC999066-0E0E-4AB1-A82D-0A337EFBA275}"/>
               </a:ext>
             </a:extLst>
           </p:cNvPr>
@@ -2542,7 +2712,7 @@
           <p:cNvPr id="8" name="Footer Placeholder 7">
             <a:extLst>
               <a:ext uri="{FF2B5EF4-FFF2-40B4-BE49-F238E27FC236}">
-                <a16:creationId xmlns="" xmlns:a16="http://schemas.microsoft.com/office/drawing/2014/main" id="{8C1085FD-2875-4547-BCA9-0A7C3025B8E1}"/>
+                <a16:creationId xmlns:a16="http://schemas.microsoft.com/office/drawing/2014/main" id="{8C1085FD-2875-4547-BCA9-0A7C3025B8E1}"/>
               </a:ext>
             </a:extLst>
           </p:cNvPr>
@@ -2567,7 +2737,7 @@
           <p:cNvPr id="9" name="Slide Number Placeholder 8">
             <a:extLst>
               <a:ext uri="{FF2B5EF4-FFF2-40B4-BE49-F238E27FC236}">
-                <a16:creationId xmlns="" xmlns:a16="http://schemas.microsoft.com/office/drawing/2014/main" id="{4DC75EAD-6B1A-402D-8ABC-2B209FEC6432}"/>
+                <a16:creationId xmlns:a16="http://schemas.microsoft.com/office/drawing/2014/main" id="{4DC75EAD-6B1A-402D-8ABC-2B209FEC6432}"/>
               </a:ext>
             </a:extLst>
           </p:cNvPr>
@@ -2626,7 +2796,7 @@
           <p:cNvPr id="2" name="Title 1">
             <a:extLst>
               <a:ext uri="{FF2B5EF4-FFF2-40B4-BE49-F238E27FC236}">
-                <a16:creationId xmlns="" xmlns:a16="http://schemas.microsoft.com/office/drawing/2014/main" id="{0AEEC28D-2A24-4691-8B5E-BD2FAB5F770A}"/>
+                <a16:creationId xmlns:a16="http://schemas.microsoft.com/office/drawing/2014/main" id="{0AEEC28D-2A24-4691-8B5E-BD2FAB5F770A}"/>
               </a:ext>
             </a:extLst>
           </p:cNvPr>
@@ -2654,7 +2824,7 @@
           <p:cNvPr id="3" name="Date Placeholder 2">
             <a:extLst>
               <a:ext uri="{FF2B5EF4-FFF2-40B4-BE49-F238E27FC236}">
-                <a16:creationId xmlns="" xmlns:a16="http://schemas.microsoft.com/office/drawing/2014/main" id="{991570B2-8C27-4ABF-80B6-B55E4708B792}"/>
+                <a16:creationId xmlns:a16="http://schemas.microsoft.com/office/drawing/2014/main" id="{991570B2-8C27-4ABF-80B6-B55E4708B792}"/>
               </a:ext>
             </a:extLst>
           </p:cNvPr>
@@ -2683,7 +2853,7 @@
           <p:cNvPr id="4" name="Footer Placeholder 3">
             <a:extLst>
               <a:ext uri="{FF2B5EF4-FFF2-40B4-BE49-F238E27FC236}">
-                <a16:creationId xmlns="" xmlns:a16="http://schemas.microsoft.com/office/drawing/2014/main" id="{1A3935D8-1AD9-4C98-A851-5552255BE606}"/>
+                <a16:creationId xmlns:a16="http://schemas.microsoft.com/office/drawing/2014/main" id="{1A3935D8-1AD9-4C98-A851-5552255BE606}"/>
               </a:ext>
             </a:extLst>
           </p:cNvPr>
@@ -2708,7 +2878,7 @@
           <p:cNvPr id="5" name="Slide Number Placeholder 4">
             <a:extLst>
               <a:ext uri="{FF2B5EF4-FFF2-40B4-BE49-F238E27FC236}">
-                <a16:creationId xmlns="" xmlns:a16="http://schemas.microsoft.com/office/drawing/2014/main" id="{60CC3E2B-319D-4F7D-AAE1-90F625AE016C}"/>
+                <a16:creationId xmlns:a16="http://schemas.microsoft.com/office/drawing/2014/main" id="{60CC3E2B-319D-4F7D-AAE1-90F625AE016C}"/>
               </a:ext>
             </a:extLst>
           </p:cNvPr>
@@ -2767,7 +2937,7 @@
           <p:cNvPr id="2" name="Date Placeholder 1">
             <a:extLst>
               <a:ext uri="{FF2B5EF4-FFF2-40B4-BE49-F238E27FC236}">
-                <a16:creationId xmlns="" xmlns:a16="http://schemas.microsoft.com/office/drawing/2014/main" id="{1A5AA1FD-5E00-4D00-8C52-C127D7954892}"/>
+                <a16:creationId xmlns:a16="http://schemas.microsoft.com/office/drawing/2014/main" id="{1A5AA1FD-5E00-4D00-8C52-C127D7954892}"/>
               </a:ext>
             </a:extLst>
           </p:cNvPr>
@@ -2796,7 +2966,7 @@
           <p:cNvPr id="3" name="Footer Placeholder 2">
             <a:extLst>
               <a:ext uri="{FF2B5EF4-FFF2-40B4-BE49-F238E27FC236}">
-                <a16:creationId xmlns="" xmlns:a16="http://schemas.microsoft.com/office/drawing/2014/main" id="{9C406108-9619-49A5-AF84-495EFEBEA696}"/>
+                <a16:creationId xmlns:a16="http://schemas.microsoft.com/office/drawing/2014/main" id="{9C406108-9619-49A5-AF84-495EFEBEA696}"/>
               </a:ext>
             </a:extLst>
           </p:cNvPr>
@@ -2821,7 +2991,7 @@
           <p:cNvPr id="4" name="Slide Number Placeholder 3">
             <a:extLst>
               <a:ext uri="{FF2B5EF4-FFF2-40B4-BE49-F238E27FC236}">
-                <a16:creationId xmlns="" xmlns:a16="http://schemas.microsoft.com/office/drawing/2014/main" id="{1B813436-D426-492A-9226-0920D5CFE042}"/>
+                <a16:creationId xmlns:a16="http://schemas.microsoft.com/office/drawing/2014/main" id="{1B813436-D426-492A-9226-0920D5CFE042}"/>
               </a:ext>
             </a:extLst>
           </p:cNvPr>
@@ -2880,7 +3050,7 @@
           <p:cNvPr id="2" name="Title 1">
             <a:extLst>
               <a:ext uri="{FF2B5EF4-FFF2-40B4-BE49-F238E27FC236}">
-                <a16:creationId xmlns="" xmlns:a16="http://schemas.microsoft.com/office/drawing/2014/main" id="{D967986A-6145-42DA-B61A-658219270C61}"/>
+                <a16:creationId xmlns:a16="http://schemas.microsoft.com/office/drawing/2014/main" id="{D967986A-6145-42DA-B61A-658219270C61}"/>
               </a:ext>
             </a:extLst>
           </p:cNvPr>
@@ -2917,7 +3087,7 @@
           <p:cNvPr id="3" name="Content Placeholder 2">
             <a:extLst>
               <a:ext uri="{FF2B5EF4-FFF2-40B4-BE49-F238E27FC236}">
-                <a16:creationId xmlns="" xmlns:a16="http://schemas.microsoft.com/office/drawing/2014/main" id="{738B42C9-4D21-4D87-A4D6-B69D502D7A18}"/>
+                <a16:creationId xmlns:a16="http://schemas.microsoft.com/office/drawing/2014/main" id="{738B42C9-4D21-4D87-A4D6-B69D502D7A18}"/>
               </a:ext>
             </a:extLst>
           </p:cNvPr>
@@ -3007,7 +3177,7 @@
           <p:cNvPr id="4" name="Text Placeholder 3">
             <a:extLst>
               <a:ext uri="{FF2B5EF4-FFF2-40B4-BE49-F238E27FC236}">
-                <a16:creationId xmlns="" xmlns:a16="http://schemas.microsoft.com/office/drawing/2014/main" id="{2B7D580D-8BBE-4840-A34B-6929FF0BB154}"/>
+                <a16:creationId xmlns:a16="http://schemas.microsoft.com/office/drawing/2014/main" id="{2B7D580D-8BBE-4840-A34B-6929FF0BB154}"/>
               </a:ext>
             </a:extLst>
           </p:cNvPr>
@@ -3078,7 +3248,7 @@
           <p:cNvPr id="5" name="Date Placeholder 4">
             <a:extLst>
               <a:ext uri="{FF2B5EF4-FFF2-40B4-BE49-F238E27FC236}">
-                <a16:creationId xmlns="" xmlns:a16="http://schemas.microsoft.com/office/drawing/2014/main" id="{2F107C27-AD4E-4D6F-AEF2-D527DBBB420E}"/>
+                <a16:creationId xmlns:a16="http://schemas.microsoft.com/office/drawing/2014/main" id="{2F107C27-AD4E-4D6F-AEF2-D527DBBB420E}"/>
               </a:ext>
             </a:extLst>
           </p:cNvPr>
@@ -3107,7 +3277,7 @@
           <p:cNvPr id="6" name="Footer Placeholder 5">
             <a:extLst>
               <a:ext uri="{FF2B5EF4-FFF2-40B4-BE49-F238E27FC236}">
-                <a16:creationId xmlns="" xmlns:a16="http://schemas.microsoft.com/office/drawing/2014/main" id="{1C73A189-BE23-44B5-AF70-7A5849D8877C}"/>
+                <a16:creationId xmlns:a16="http://schemas.microsoft.com/office/drawing/2014/main" id="{1C73A189-BE23-44B5-AF70-7A5849D8877C}"/>
               </a:ext>
             </a:extLst>
           </p:cNvPr>
@@ -3132,7 +3302,7 @@
           <p:cNvPr id="7" name="Slide Number Placeholder 6">
             <a:extLst>
               <a:ext uri="{FF2B5EF4-FFF2-40B4-BE49-F238E27FC236}">
-                <a16:creationId xmlns="" xmlns:a16="http://schemas.microsoft.com/office/drawing/2014/main" id="{3D5B1BE8-EA4A-445C-A2AB-FD678F21B492}"/>
+                <a16:creationId xmlns:a16="http://schemas.microsoft.com/office/drawing/2014/main" id="{3D5B1BE8-EA4A-445C-A2AB-FD678F21B492}"/>
               </a:ext>
             </a:extLst>
           </p:cNvPr>
@@ -3191,7 +3361,7 @@
           <p:cNvPr id="2" name="Title 1">
             <a:extLst>
               <a:ext uri="{FF2B5EF4-FFF2-40B4-BE49-F238E27FC236}">
-                <a16:creationId xmlns="" xmlns:a16="http://schemas.microsoft.com/office/drawing/2014/main" id="{205B61B1-267A-4FA9-B3C7-F1D55E48384B}"/>
+                <a16:creationId xmlns:a16="http://schemas.microsoft.com/office/drawing/2014/main" id="{205B61B1-267A-4FA9-B3C7-F1D55E48384B}"/>
               </a:ext>
             </a:extLst>
           </p:cNvPr>
@@ -3228,7 +3398,7 @@
           <p:cNvPr id="3" name="Picture Placeholder 2">
             <a:extLst>
               <a:ext uri="{FF2B5EF4-FFF2-40B4-BE49-F238E27FC236}">
-                <a16:creationId xmlns="" xmlns:a16="http://schemas.microsoft.com/office/drawing/2014/main" id="{1CB2FD67-EFF8-4BC3-850D-BA1B1B8085F9}"/>
+                <a16:creationId xmlns:a16="http://schemas.microsoft.com/office/drawing/2014/main" id="{1CB2FD67-EFF8-4BC3-850D-BA1B1B8085F9}"/>
               </a:ext>
             </a:extLst>
           </p:cNvPr>
@@ -3295,7 +3465,7 @@
           <p:cNvPr id="4" name="Text Placeholder 3">
             <a:extLst>
               <a:ext uri="{FF2B5EF4-FFF2-40B4-BE49-F238E27FC236}">
-                <a16:creationId xmlns="" xmlns:a16="http://schemas.microsoft.com/office/drawing/2014/main" id="{8F0F29B7-6DD9-4959-8D89-D8A87F449619}"/>
+                <a16:creationId xmlns:a16="http://schemas.microsoft.com/office/drawing/2014/main" id="{8F0F29B7-6DD9-4959-8D89-D8A87F449619}"/>
               </a:ext>
             </a:extLst>
           </p:cNvPr>
@@ -3366,7 +3536,7 @@
           <p:cNvPr id="5" name="Date Placeholder 4">
             <a:extLst>
               <a:ext uri="{FF2B5EF4-FFF2-40B4-BE49-F238E27FC236}">
-                <a16:creationId xmlns="" xmlns:a16="http://schemas.microsoft.com/office/drawing/2014/main" id="{C0F50D6A-6AB5-493A-99F8-5BD7085BB2FC}"/>
+                <a16:creationId xmlns:a16="http://schemas.microsoft.com/office/drawing/2014/main" id="{C0F50D6A-6AB5-493A-99F8-5BD7085BB2FC}"/>
               </a:ext>
             </a:extLst>
           </p:cNvPr>
@@ -3395,7 +3565,7 @@
           <p:cNvPr id="6" name="Footer Placeholder 5">
             <a:extLst>
               <a:ext uri="{FF2B5EF4-FFF2-40B4-BE49-F238E27FC236}">
-                <a16:creationId xmlns="" xmlns:a16="http://schemas.microsoft.com/office/drawing/2014/main" id="{B5DDB1B5-62DF-4E2C-8AB0-9B77899B0C5B}"/>
+                <a16:creationId xmlns:a16="http://schemas.microsoft.com/office/drawing/2014/main" id="{B5DDB1B5-62DF-4E2C-8AB0-9B77899B0C5B}"/>
               </a:ext>
             </a:extLst>
           </p:cNvPr>
@@ -3420,7 +3590,7 @@
           <p:cNvPr id="7" name="Slide Number Placeholder 6">
             <a:extLst>
               <a:ext uri="{FF2B5EF4-FFF2-40B4-BE49-F238E27FC236}">
-                <a16:creationId xmlns="" xmlns:a16="http://schemas.microsoft.com/office/drawing/2014/main" id="{D70A59F4-0C5E-4F23-B69C-A3C9F776BEE2}"/>
+                <a16:creationId xmlns:a16="http://schemas.microsoft.com/office/drawing/2014/main" id="{D70A59F4-0C5E-4F23-B69C-A3C9F776BEE2}"/>
               </a:ext>
             </a:extLst>
           </p:cNvPr>
@@ -3484,7 +3654,7 @@
           <p:cNvPr id="2" name="Title Placeholder 1">
             <a:extLst>
               <a:ext uri="{FF2B5EF4-FFF2-40B4-BE49-F238E27FC236}">
-                <a16:creationId xmlns="" xmlns:a16="http://schemas.microsoft.com/office/drawing/2014/main" id="{4813BCD2-8A5E-4D49-90F8-55AE5F05214D}"/>
+                <a16:creationId xmlns:a16="http://schemas.microsoft.com/office/drawing/2014/main" id="{4813BCD2-8A5E-4D49-90F8-55AE5F05214D}"/>
               </a:ext>
             </a:extLst>
           </p:cNvPr>
@@ -3522,7 +3692,7 @@
           <p:cNvPr id="3" name="Text Placeholder 2">
             <a:extLst>
               <a:ext uri="{FF2B5EF4-FFF2-40B4-BE49-F238E27FC236}">
-                <a16:creationId xmlns="" xmlns:a16="http://schemas.microsoft.com/office/drawing/2014/main" id="{AE92E3E2-D29B-46E0-80AC-34D21DF87517}"/>
+                <a16:creationId xmlns:a16="http://schemas.microsoft.com/office/drawing/2014/main" id="{AE92E3E2-D29B-46E0-80AC-34D21DF87517}"/>
               </a:ext>
             </a:extLst>
           </p:cNvPr>
@@ -3589,7 +3759,7 @@
           <p:cNvPr id="4" name="Date Placeholder 3">
             <a:extLst>
               <a:ext uri="{FF2B5EF4-FFF2-40B4-BE49-F238E27FC236}">
-                <a16:creationId xmlns="" xmlns:a16="http://schemas.microsoft.com/office/drawing/2014/main" id="{2A31DDCA-89E3-4D45-B126-8247341F4621}"/>
+                <a16:creationId xmlns:a16="http://schemas.microsoft.com/office/drawing/2014/main" id="{2A31DDCA-89E3-4D45-B126-8247341F4621}"/>
               </a:ext>
             </a:extLst>
           </p:cNvPr>
@@ -3636,7 +3806,7 @@
           <p:cNvPr id="5" name="Footer Placeholder 4">
             <a:extLst>
               <a:ext uri="{FF2B5EF4-FFF2-40B4-BE49-F238E27FC236}">
-                <a16:creationId xmlns="" xmlns:a16="http://schemas.microsoft.com/office/drawing/2014/main" id="{47DFE6DC-0EA6-47E4-B1F3-3EF1ADDD8CAD}"/>
+                <a16:creationId xmlns:a16="http://schemas.microsoft.com/office/drawing/2014/main" id="{47DFE6DC-0EA6-47E4-B1F3-3EF1ADDD8CAD}"/>
               </a:ext>
             </a:extLst>
           </p:cNvPr>
@@ -3679,7 +3849,7 @@
           <p:cNvPr id="6" name="Slide Number Placeholder 5">
             <a:extLst>
               <a:ext uri="{FF2B5EF4-FFF2-40B4-BE49-F238E27FC236}">
-                <a16:creationId xmlns="" xmlns:a16="http://schemas.microsoft.com/office/drawing/2014/main" id="{32F7927D-7ECA-4692-A0A9-E3D137290ECC}"/>
+                <a16:creationId xmlns:a16="http://schemas.microsoft.com/office/drawing/2014/main" id="{32F7927D-7ECA-4692-A0A9-E3D137290ECC}"/>
               </a:ext>
             </a:extLst>
           </p:cNvPr>
@@ -4055,10 +4225,10 @@
           <p:cNvPr id="8" name="Rectangle 7">
             <a:extLst>
               <a:ext uri="{FF2B5EF4-FFF2-40B4-BE49-F238E27FC236}">
-                <a16:creationId xmlns="" xmlns:a16="http://schemas.microsoft.com/office/drawing/2014/main" id="{FFD48BC7-DC40-47DE-87EE-9F4B6ECB9ABB}"/>
+                <a16:creationId xmlns:a16="http://schemas.microsoft.com/office/drawing/2014/main" id="{FFD48BC7-DC40-47DE-87EE-9F4B6ECB9ABB}"/>
               </a:ext>
               <a:ext uri="{C183D7F6-B498-43B3-948B-1728B52AA6E4}">
-                <adec:decorative xmlns="" xmlns:adec="http://schemas.microsoft.com/office/drawing/2017/decorative" val="1"/>
+                <adec:decorative xmlns:adec="http://schemas.microsoft.com/office/drawing/2017/decorative" val="1"/>
               </a:ext>
             </a:extLst>
           </p:cNvPr>
@@ -4068,7 +4238,7 @@
           <p:nvPr>
             <p:extLst>
               <p:ext uri="{386F3935-93C4-4BCD-93E2-E3B085C9AB24}">
-                <p16:designElem xmlns="" xmlns:p16="http://schemas.microsoft.com/office/powerpoint/2015/main" val="1"/>
+                <p16:designElem xmlns:p16="http://schemas.microsoft.com/office/powerpoint/2015/main" val="1"/>
               </p:ext>
             </p:extLst>
           </p:nvPr>
@@ -4115,10 +4285,10 @@
           <p:cNvPr id="10" name="Freeform: Shape 9">
             <a:extLst>
               <a:ext uri="{FF2B5EF4-FFF2-40B4-BE49-F238E27FC236}">
-                <a16:creationId xmlns="" xmlns:a16="http://schemas.microsoft.com/office/drawing/2014/main" id="{E502BBC7-2C76-46F3-BC24-5985BC13DB88}"/>
+                <a16:creationId xmlns:a16="http://schemas.microsoft.com/office/drawing/2014/main" id="{E502BBC7-2C76-46F3-BC24-5985BC13DB88}"/>
               </a:ext>
               <a:ext uri="{C183D7F6-B498-43B3-948B-1728B52AA6E4}">
-                <adec:decorative xmlns="" xmlns:adec="http://schemas.microsoft.com/office/drawing/2017/decorative" val="1"/>
+                <adec:decorative xmlns:adec="http://schemas.microsoft.com/office/drawing/2017/decorative" val="1"/>
               </a:ext>
             </a:extLst>
           </p:cNvPr>
@@ -4128,7 +4298,7 @@
           <p:nvPr>
             <p:extLst>
               <p:ext uri="{386F3935-93C4-4BCD-93E2-E3B085C9AB24}">
-                <p16:designElem xmlns="" xmlns:p16="http://schemas.microsoft.com/office/powerpoint/2015/main" val="1"/>
+                <p16:designElem xmlns:p16="http://schemas.microsoft.com/office/powerpoint/2015/main" val="1"/>
               </p:ext>
             </p:extLst>
           </p:nvPr>
@@ -4315,10 +4485,10 @@
           <p:cNvPr id="12" name="Freeform: Shape 11">
             <a:extLst>
               <a:ext uri="{FF2B5EF4-FFF2-40B4-BE49-F238E27FC236}">
-                <a16:creationId xmlns="" xmlns:a16="http://schemas.microsoft.com/office/drawing/2014/main" id="{C7F28D52-2A5F-4D23-81AE-7CB8B591C7AF}"/>
+                <a16:creationId xmlns:a16="http://schemas.microsoft.com/office/drawing/2014/main" id="{C7F28D52-2A5F-4D23-81AE-7CB8B591C7AF}"/>
               </a:ext>
               <a:ext uri="{C183D7F6-B498-43B3-948B-1728B52AA6E4}">
-                <adec:decorative xmlns="" xmlns:adec="http://schemas.microsoft.com/office/drawing/2017/decorative" val="1"/>
+                <adec:decorative xmlns:adec="http://schemas.microsoft.com/office/drawing/2017/decorative" val="1"/>
               </a:ext>
             </a:extLst>
           </p:cNvPr>
@@ -4328,7 +4498,7 @@
           <p:nvPr>
             <p:extLst>
               <p:ext uri="{386F3935-93C4-4BCD-93E2-E3B085C9AB24}">
-                <p16:designElem xmlns="" xmlns:p16="http://schemas.microsoft.com/office/powerpoint/2015/main" val="1"/>
+                <p16:designElem xmlns:p16="http://schemas.microsoft.com/office/powerpoint/2015/main" val="1"/>
               </p:ext>
             </p:extLst>
           </p:nvPr>
@@ -4506,7 +4676,7 @@
           <p:cNvPr id="2" name="Title 1">
             <a:extLst>
               <a:ext uri="{FF2B5EF4-FFF2-40B4-BE49-F238E27FC236}">
-                <a16:creationId xmlns="" xmlns:a16="http://schemas.microsoft.com/office/drawing/2014/main" id="{07A9CF8F-21F5-4E3B-BB07-9920DADEE900}"/>
+                <a16:creationId xmlns:a16="http://schemas.microsoft.com/office/drawing/2014/main" id="{07A9CF8F-21F5-4E3B-BB07-9920DADEE900}"/>
               </a:ext>
             </a:extLst>
           </p:cNvPr>
@@ -4541,10 +4711,6 @@
               <a:rPr lang="en-US" sz="4800" spc="-150" dirty="0"/>
               <a:t>COSC 6386 Project</a:t>
             </a:r>
-            <a:r>
-              <a:rPr lang="en-US" sz="6100" dirty="0"/>
-              <a:t/>
-            </a:r>
             <a:br>
               <a:rPr lang="en-US" sz="6100" dirty="0"/>
             </a:br>
@@ -4567,7 +4733,7 @@
           <p:cNvPr id="3" name="Subtitle 2">
             <a:extLst>
               <a:ext uri="{FF2B5EF4-FFF2-40B4-BE49-F238E27FC236}">
-                <a16:creationId xmlns="" xmlns:a16="http://schemas.microsoft.com/office/drawing/2014/main" id="{521EE48C-5A0E-4A1C-AE14-5F20EB0F0153}"/>
+                <a16:creationId xmlns:a16="http://schemas.microsoft.com/office/drawing/2014/main" id="{521EE48C-5A0E-4A1C-AE14-5F20EB0F0153}"/>
               </a:ext>
             </a:extLst>
           </p:cNvPr>
@@ -4616,10 +4782,10 @@
           <p:cNvPr id="14" name="Rectangle 13">
             <a:extLst>
               <a:ext uri="{FF2B5EF4-FFF2-40B4-BE49-F238E27FC236}">
-                <a16:creationId xmlns="" xmlns:a16="http://schemas.microsoft.com/office/drawing/2014/main" id="{3629484E-3792-4B3D-89AD-7C8A1ED0E0D4}"/>
+                <a16:creationId xmlns:a16="http://schemas.microsoft.com/office/drawing/2014/main" id="{3629484E-3792-4B3D-89AD-7C8A1ED0E0D4}"/>
               </a:ext>
               <a:ext uri="{C183D7F6-B498-43B3-948B-1728B52AA6E4}">
-                <adec:decorative xmlns="" xmlns:adec="http://schemas.microsoft.com/office/drawing/2017/decorative" val="1"/>
+                <adec:decorative xmlns:adec="http://schemas.microsoft.com/office/drawing/2017/decorative" val="1"/>
               </a:ext>
             </a:extLst>
           </p:cNvPr>
@@ -4629,7 +4795,7 @@
           <p:nvPr>
             <p:extLst>
               <p:ext uri="{386F3935-93C4-4BCD-93E2-E3B085C9AB24}">
-                <p16:designElem xmlns="" xmlns:p16="http://schemas.microsoft.com/office/powerpoint/2015/main" val="1"/>
+                <p16:designElem xmlns:p16="http://schemas.microsoft.com/office/powerpoint/2015/main" val="1"/>
               </p:ext>
             </p:extLst>
           </p:nvPr>
@@ -4738,7 +4904,7 @@
           <p:cNvPr id="2" name="Title 1">
             <a:extLst>
               <a:ext uri="{FF2B5EF4-FFF2-40B4-BE49-F238E27FC236}">
-                <a16:creationId xmlns="" xmlns:a16="http://schemas.microsoft.com/office/drawing/2014/main" id="{D0B87F8E-5D83-4513-9285-8A122C4A62CB}"/>
+                <a16:creationId xmlns:a16="http://schemas.microsoft.com/office/drawing/2014/main" id="{D0B87F8E-5D83-4513-9285-8A122C4A62CB}"/>
               </a:ext>
             </a:extLst>
           </p:cNvPr>
@@ -4771,7 +4937,7 @@
           <p:cNvPr id="5" name="Straight Connector 4">
             <a:extLst>
               <a:ext uri="{FF2B5EF4-FFF2-40B4-BE49-F238E27FC236}">
-                <a16:creationId xmlns="" xmlns:a16="http://schemas.microsoft.com/office/drawing/2014/main" id="{86EF85BD-B585-F4FA-AB4B-371C19D22622}"/>
+                <a16:creationId xmlns:a16="http://schemas.microsoft.com/office/drawing/2014/main" id="{86EF85BD-B585-F4FA-AB4B-371C19D22622}"/>
               </a:ext>
             </a:extLst>
           </p:cNvPr>
@@ -4815,7 +4981,7 @@
           <p:cNvPr id="4" name="Content Placeholder 3">
             <a:extLst>
               <a:ext uri="{FF2B5EF4-FFF2-40B4-BE49-F238E27FC236}">
-                <a16:creationId xmlns="" xmlns:a16="http://schemas.microsoft.com/office/drawing/2014/main" id="{8A9E4EF8-5E69-948B-8D9B-5C6461DEB974}"/>
+                <a16:creationId xmlns:a16="http://schemas.microsoft.com/office/drawing/2014/main" id="{8A9E4EF8-5E69-948B-8D9B-5C6461DEB974}"/>
               </a:ext>
             </a:extLst>
           </p:cNvPr>
@@ -4839,30 +5005,29 @@
           <a:lstStyle/>
           <a:p>
             <a:r>
-              <a:rPr lang="en-US" sz="3200" dirty="0" smtClean="0"/>
+              <a:rPr lang="en-US" sz="3200" dirty="0"/>
               <a:t>We wanted to catch the simplest but most common types of clones (types I and II) at lightning speed.</a:t>
             </a:r>
           </a:p>
           <a:p>
             <a:pPr lvl="1"/>
             <a:r>
-              <a:rPr lang="en-US" dirty="0" smtClean="0"/>
+              <a:rPr lang="en-US" dirty="0"/>
               <a:t>We streamlined the detection model to be sensitive to cloned functions, which are common in our experience.</a:t>
             </a:r>
           </a:p>
           <a:p>
             <a:pPr lvl="1"/>
             <a:r>
-              <a:rPr lang="en-US" dirty="0" smtClean="0"/>
+              <a:rPr lang="en-US" dirty="0"/>
               <a:t>Our “lazy”/non-exhaustive approach might miss some clones, but it works efficiently and quickly to catch most clones in our intended category.</a:t>
             </a:r>
           </a:p>
           <a:p>
             <a:r>
-              <a:rPr lang="en-US" sz="3200" dirty="0" smtClean="0"/>
+              <a:rPr lang="en-US" sz="3200" dirty="0"/>
               <a:t>Our work focuses on Python language exclusively, but it would be easy to adapt to other languages.</a:t>
             </a:r>
-            <a:endParaRPr lang="en-US" sz="3200" dirty="0"/>
           </a:p>
         </p:txBody>
       </p:sp>
@@ -4901,7 +5066,7 @@
           <p:cNvPr id="2" name="Title 1">
             <a:extLst>
               <a:ext uri="{FF2B5EF4-FFF2-40B4-BE49-F238E27FC236}">
-                <a16:creationId xmlns="" xmlns:a16="http://schemas.microsoft.com/office/drawing/2014/main" id="{D0B87F8E-5D83-4513-9285-8A122C4A62CB}"/>
+                <a16:creationId xmlns:a16="http://schemas.microsoft.com/office/drawing/2014/main" id="{D0B87F8E-5D83-4513-9285-8A122C4A62CB}"/>
               </a:ext>
             </a:extLst>
           </p:cNvPr>
@@ -4935,7 +5100,7 @@
           <p:cNvPr id="5" name="Straight Connector 4">
             <a:extLst>
               <a:ext uri="{FF2B5EF4-FFF2-40B4-BE49-F238E27FC236}">
-                <a16:creationId xmlns="" xmlns:a16="http://schemas.microsoft.com/office/drawing/2014/main" id="{86EF85BD-B585-F4FA-AB4B-371C19D22622}"/>
+                <a16:creationId xmlns:a16="http://schemas.microsoft.com/office/drawing/2014/main" id="{86EF85BD-B585-F4FA-AB4B-371C19D22622}"/>
               </a:ext>
             </a:extLst>
           </p:cNvPr>
@@ -4979,7 +5144,7 @@
           <p:cNvPr id="3" name="TextBox 2">
             <a:extLst>
               <a:ext uri="{FF2B5EF4-FFF2-40B4-BE49-F238E27FC236}">
-                <a16:creationId xmlns="" xmlns:a16="http://schemas.microsoft.com/office/drawing/2014/main" id="{84DC2BB8-292B-9547-F547-714E254909AC}"/>
+                <a16:creationId xmlns:a16="http://schemas.microsoft.com/office/drawing/2014/main" id="{84DC2BB8-292B-9547-F547-714E254909AC}"/>
               </a:ext>
             </a:extLst>
           </p:cNvPr>
@@ -5019,7 +5184,7 @@
           <p:cNvPr id="6" name="Straight Arrow Connector 5">
             <a:extLst>
               <a:ext uri="{FF2B5EF4-FFF2-40B4-BE49-F238E27FC236}">
-                <a16:creationId xmlns="" xmlns:a16="http://schemas.microsoft.com/office/drawing/2014/main" id="{B78E30C3-3DDD-81E6-326B-A6A9E45AD369}"/>
+                <a16:creationId xmlns:a16="http://schemas.microsoft.com/office/drawing/2014/main" id="{B78E30C3-3DDD-81E6-326B-A6A9E45AD369}"/>
               </a:ext>
             </a:extLst>
           </p:cNvPr>
@@ -5062,7 +5227,7 @@
           <p:cNvPr id="8" name="TextBox 7">
             <a:extLst>
               <a:ext uri="{FF2B5EF4-FFF2-40B4-BE49-F238E27FC236}">
-                <a16:creationId xmlns="" xmlns:a16="http://schemas.microsoft.com/office/drawing/2014/main" id="{D67CC55F-BD51-EFE5-750B-92A0584389C0}"/>
+                <a16:creationId xmlns:a16="http://schemas.microsoft.com/office/drawing/2014/main" id="{D67CC55F-BD51-EFE5-750B-92A0584389C0}"/>
               </a:ext>
             </a:extLst>
           </p:cNvPr>
@@ -5093,13 +5258,8 @@
             <a:pPr algn="ctr"/>
             <a:r>
               <a:rPr lang="en-US" sz="2400" dirty="0"/>
-              <a:t>Hash all of the code </a:t>
-            </a:r>
-            <a:r>
-              <a:rPr lang="en-US" sz="2400" dirty="0" smtClean="0"/>
-              <a:t>blocks</a:t>
-            </a:r>
-            <a:endParaRPr lang="en-US" sz="2400" dirty="0"/>
+              <a:t>Hash all of the code blocks</a:t>
+            </a:r>
           </a:p>
         </p:txBody>
       </p:sp>
@@ -5108,7 +5268,7 @@
           <p:cNvPr id="4" name="TextBox 3">
             <a:extLst>
               <a:ext uri="{FF2B5EF4-FFF2-40B4-BE49-F238E27FC236}">
-                <a16:creationId xmlns="" xmlns:a16="http://schemas.microsoft.com/office/drawing/2014/main" id="{3F21C954-9D99-07CD-A05F-AD817D7E0C03}"/>
+                <a16:creationId xmlns:a16="http://schemas.microsoft.com/office/drawing/2014/main" id="{3F21C954-9D99-07CD-A05F-AD817D7E0C03}"/>
               </a:ext>
             </a:extLst>
           </p:cNvPr>
@@ -5139,15 +5299,7 @@
             <a:pPr algn="ctr"/>
             <a:r>
               <a:rPr lang="en-US" sz="2400" dirty="0"/>
-              <a:t>Compare hash code for each </a:t>
-            </a:r>
-            <a:r>
-              <a:rPr lang="en-US" sz="2400" dirty="0" smtClean="0"/>
-              <a:t>block with </a:t>
-            </a:r>
-            <a:r>
-              <a:rPr lang="en-US" sz="2400" dirty="0"/>
-              <a:t>every other one</a:t>
+              <a:t>Compare hash code for each block with every other one</a:t>
             </a:r>
           </a:p>
         </p:txBody>
@@ -5157,7 +5309,7 @@
           <p:cNvPr id="9" name="Straight Arrow Connector 8">
             <a:extLst>
               <a:ext uri="{FF2B5EF4-FFF2-40B4-BE49-F238E27FC236}">
-                <a16:creationId xmlns="" xmlns:a16="http://schemas.microsoft.com/office/drawing/2014/main" id="{2C3F7B3C-ABB9-335A-DB6D-DDD7A150B158}"/>
+                <a16:creationId xmlns:a16="http://schemas.microsoft.com/office/drawing/2014/main" id="{2C3F7B3C-ABB9-335A-DB6D-DDD7A150B158}"/>
               </a:ext>
             </a:extLst>
           </p:cNvPr>
@@ -5200,7 +5352,7 @@
           <p:cNvPr id="11" name="TextBox 10">
             <a:extLst>
               <a:ext uri="{FF2B5EF4-FFF2-40B4-BE49-F238E27FC236}">
-                <a16:creationId xmlns="" xmlns:a16="http://schemas.microsoft.com/office/drawing/2014/main" id="{D0161953-B802-E031-9173-88AC95ED3465}"/>
+                <a16:creationId xmlns:a16="http://schemas.microsoft.com/office/drawing/2014/main" id="{D0161953-B802-E031-9173-88AC95ED3465}"/>
               </a:ext>
             </a:extLst>
           </p:cNvPr>
@@ -5231,13 +5383,8 @@
             <a:pPr algn="ctr"/>
             <a:r>
               <a:rPr lang="en-US" sz="2400" dirty="0"/>
-              <a:t>Report </a:t>
-            </a:r>
-            <a:r>
-              <a:rPr lang="en-US" sz="2400" dirty="0" smtClean="0"/>
-              <a:t>clone:</a:t>
-            </a:r>
-            <a:endParaRPr lang="en-US" sz="2400" dirty="0"/>
+              <a:t>Report clone:</a:t>
+            </a:r>
           </a:p>
         </p:txBody>
       </p:sp>
@@ -5246,7 +5393,7 @@
           <p:cNvPr id="18" name="TextBox 17">
             <a:extLst>
               <a:ext uri="{FF2B5EF4-FFF2-40B4-BE49-F238E27FC236}">
-                <a16:creationId xmlns="" xmlns:a16="http://schemas.microsoft.com/office/drawing/2014/main" id="{61A6DC2D-4998-61E7-D85C-270F4C9BAAD9}"/>
+                <a16:creationId xmlns:a16="http://schemas.microsoft.com/office/drawing/2014/main" id="{61A6DC2D-4998-61E7-D85C-270F4C9BAAD9}"/>
               </a:ext>
             </a:extLst>
           </p:cNvPr>
@@ -5276,10 +5423,9 @@
           <a:p>
             <a:pPr algn="ctr"/>
             <a:r>
-              <a:rPr lang="en-US" sz="2400" dirty="0" smtClean="0"/>
+              <a:rPr lang="en-US" sz="2400" dirty="0"/>
               <a:t>Code: tokenize, write to new files</a:t>
             </a:r>
-            <a:endParaRPr lang="en-US" sz="2400" dirty="0"/>
           </a:p>
         </p:txBody>
       </p:sp>
@@ -5319,10 +5465,9 @@
           <a:p>
             <a:pPr algn="ctr"/>
             <a:r>
-              <a:rPr lang="en-US" dirty="0" smtClean="0"/>
+              <a:rPr lang="en-US" dirty="0"/>
               <a:t>Hash similarity?</a:t>
             </a:r>
-            <a:endParaRPr lang="en-US" dirty="0"/>
           </a:p>
         </p:txBody>
       </p:sp>
@@ -5331,7 +5476,7 @@
           <p:cNvPr id="24" name="Straight Arrow Connector 23">
             <a:extLst>
               <a:ext uri="{FF2B5EF4-FFF2-40B4-BE49-F238E27FC236}">
-                <a16:creationId xmlns="" xmlns:a16="http://schemas.microsoft.com/office/drawing/2014/main" id="{2C3F7B3C-ABB9-335A-DB6D-DDD7A150B158}"/>
+                <a16:creationId xmlns:a16="http://schemas.microsoft.com/office/drawing/2014/main" id="{2C3F7B3C-ABB9-335A-DB6D-DDD7A150B158}"/>
               </a:ext>
             </a:extLst>
           </p:cNvPr>
@@ -5428,10 +5573,9 @@
           <a:lstStyle/>
           <a:p>
             <a:r>
-              <a:rPr lang="en-US" dirty="0" smtClean="0"/>
+              <a:rPr lang="en-US" dirty="0"/>
               <a:t>&gt;90%</a:t>
             </a:r>
-            <a:endParaRPr lang="en-US" dirty="0"/>
           </a:p>
         </p:txBody>
       </p:sp>
@@ -5507,10 +5651,9 @@
           <a:p>
             <a:pPr algn="ctr"/>
             <a:r>
-              <a:rPr lang="en-US" dirty="0" smtClean="0"/>
+              <a:rPr lang="en-US" dirty="0"/>
               <a:t>Tokenized yet?</a:t>
             </a:r>
-            <a:endParaRPr lang="en-US" dirty="0"/>
           </a:p>
         </p:txBody>
       </p:sp>
@@ -5519,7 +5662,7 @@
           <p:cNvPr id="38" name="TextBox 37">
             <a:extLst>
               <a:ext uri="{FF2B5EF4-FFF2-40B4-BE49-F238E27FC236}">
-                <a16:creationId xmlns="" xmlns:a16="http://schemas.microsoft.com/office/drawing/2014/main" id="{D0161953-B802-E031-9173-88AC95ED3465}"/>
+                <a16:creationId xmlns:a16="http://schemas.microsoft.com/office/drawing/2014/main" id="{D0161953-B802-E031-9173-88AC95ED3465}"/>
               </a:ext>
             </a:extLst>
           </p:cNvPr>
@@ -5562,10 +5705,9 @@
           <a:p>
             <a:pPr algn="ctr"/>
             <a:r>
-              <a:rPr lang="en-US" sz="2400" dirty="0" smtClean="0"/>
+              <a:rPr lang="en-US" sz="2400" dirty="0"/>
               <a:t>Not clone; discard</a:t>
             </a:r>
-            <a:endParaRPr lang="en-US" sz="2400" dirty="0"/>
           </a:p>
         </p:txBody>
       </p:sp>
@@ -5628,10 +5770,9 @@
           <a:lstStyle/>
           <a:p>
             <a:r>
-              <a:rPr lang="en-US" dirty="0" smtClean="0"/>
+              <a:rPr lang="en-US" dirty="0"/>
               <a:t>&lt;50%</a:t>
             </a:r>
-            <a:endParaRPr lang="en-US" dirty="0"/>
           </a:p>
         </p:txBody>
       </p:sp>
@@ -5658,10 +5799,9 @@
           <a:lstStyle/>
           <a:p>
             <a:r>
-              <a:rPr lang="en-US" dirty="0" smtClean="0"/>
+              <a:rPr lang="en-US" dirty="0"/>
               <a:t>50~90%</a:t>
             </a:r>
-            <a:endParaRPr lang="en-US" dirty="0"/>
           </a:p>
         </p:txBody>
       </p:sp>
@@ -5701,14 +5841,9 @@
           <a:p>
             <a:pPr algn="ctr"/>
             <a:r>
-              <a:rPr lang="en-US" dirty="0" smtClean="0"/>
-              <a:t>Tokenized </a:t>
-            </a:r>
-            <a:r>
-              <a:rPr lang="en-US" dirty="0" smtClean="0"/>
-              <a:t>yet?</a:t>
-            </a:r>
-            <a:endParaRPr lang="en-US" dirty="0"/>
+              <a:rPr lang="en-US" dirty="0"/>
+              <a:t>Tokenized yet?</a:t>
+            </a:r>
           </a:p>
         </p:txBody>
       </p:sp>
@@ -5791,7 +5926,7 @@
           <p:cNvPr id="74" name="TextBox 73">
             <a:extLst>
               <a:ext uri="{FF2B5EF4-FFF2-40B4-BE49-F238E27FC236}">
-                <a16:creationId xmlns="" xmlns:a16="http://schemas.microsoft.com/office/drawing/2014/main" id="{D0161953-B802-E031-9173-88AC95ED3465}"/>
+                <a16:creationId xmlns:a16="http://schemas.microsoft.com/office/drawing/2014/main" id="{D0161953-B802-E031-9173-88AC95ED3465}"/>
               </a:ext>
             </a:extLst>
           </p:cNvPr>
@@ -5834,10 +5969,9 @@
           <a:p>
             <a:pPr algn="ctr"/>
             <a:r>
-              <a:rPr lang="en-US" sz="2400" dirty="0" smtClean="0"/>
+              <a:rPr lang="en-US" sz="2400" dirty="0"/>
               <a:t>Start</a:t>
             </a:r>
-            <a:endParaRPr lang="en-US" sz="2400" dirty="0"/>
           </a:p>
         </p:txBody>
       </p:sp>
@@ -5936,10 +6070,9 @@
           <a:lstStyle/>
           <a:p>
             <a:r>
-              <a:rPr lang="en-US" dirty="0" smtClean="0"/>
+              <a:rPr lang="en-US" dirty="0"/>
               <a:t>Yes</a:t>
             </a:r>
-            <a:endParaRPr lang="en-US" dirty="0"/>
           </a:p>
         </p:txBody>
       </p:sp>
@@ -5966,10 +6099,9 @@
           <a:lstStyle/>
           <a:p>
             <a:r>
-              <a:rPr lang="en-US" dirty="0" smtClean="0"/>
+              <a:rPr lang="en-US" dirty="0"/>
               <a:t>No</a:t>
             </a:r>
-            <a:endParaRPr lang="en-US" dirty="0"/>
           </a:p>
         </p:txBody>
       </p:sp>
@@ -5978,7 +6110,7 @@
           <p:cNvPr id="96" name="TextBox 95">
             <a:extLst>
               <a:ext uri="{FF2B5EF4-FFF2-40B4-BE49-F238E27FC236}">
-                <a16:creationId xmlns="" xmlns:a16="http://schemas.microsoft.com/office/drawing/2014/main" id="{D0161953-B802-E031-9173-88AC95ED3465}"/>
+                <a16:creationId xmlns:a16="http://schemas.microsoft.com/office/drawing/2014/main" id="{D0161953-B802-E031-9173-88AC95ED3465}"/>
               </a:ext>
             </a:extLst>
           </p:cNvPr>
@@ -6017,10 +6149,9 @@
           <a:p>
             <a:pPr algn="ctr"/>
             <a:r>
-              <a:rPr lang="en-US" sz="2400" dirty="0" smtClean="0"/>
+              <a:rPr lang="en-US" sz="2400" dirty="0"/>
               <a:t>Type I</a:t>
             </a:r>
-            <a:endParaRPr lang="en-US" sz="2400" dirty="0"/>
           </a:p>
         </p:txBody>
       </p:sp>
@@ -6029,7 +6160,7 @@
           <p:cNvPr id="97" name="TextBox 96">
             <a:extLst>
               <a:ext uri="{FF2B5EF4-FFF2-40B4-BE49-F238E27FC236}">
-                <a16:creationId xmlns="" xmlns:a16="http://schemas.microsoft.com/office/drawing/2014/main" id="{D0161953-B802-E031-9173-88AC95ED3465}"/>
+                <a16:creationId xmlns:a16="http://schemas.microsoft.com/office/drawing/2014/main" id="{D0161953-B802-E031-9173-88AC95ED3465}"/>
               </a:ext>
             </a:extLst>
           </p:cNvPr>
@@ -6068,10 +6199,9 @@
           <a:p>
             <a:pPr algn="ctr"/>
             <a:r>
-              <a:rPr lang="en-US" sz="2400" dirty="0" smtClean="0"/>
+              <a:rPr lang="en-US" sz="2400" dirty="0"/>
               <a:t>Type II</a:t>
             </a:r>
-            <a:endParaRPr lang="en-US" sz="2400" dirty="0"/>
           </a:p>
         </p:txBody>
       </p:sp>
@@ -6206,10 +6336,9 @@
           <a:lstStyle/>
           <a:p>
             <a:r>
-              <a:rPr lang="en-US" dirty="0" smtClean="0"/>
+              <a:rPr lang="en-US" dirty="0"/>
               <a:t>Yes</a:t>
             </a:r>
-            <a:endParaRPr lang="en-US" dirty="0"/>
           </a:p>
         </p:txBody>
       </p:sp>
@@ -6236,10 +6365,9 @@
           <a:lstStyle/>
           <a:p>
             <a:r>
-              <a:rPr lang="en-US" dirty="0" smtClean="0"/>
+              <a:rPr lang="en-US" dirty="0"/>
               <a:t>No</a:t>
             </a:r>
-            <a:endParaRPr lang="en-US" dirty="0"/>
           </a:p>
         </p:txBody>
       </p:sp>
@@ -6278,7 +6406,7 @@
           <p:cNvPr id="2" name="Title 1">
             <a:extLst>
               <a:ext uri="{FF2B5EF4-FFF2-40B4-BE49-F238E27FC236}">
-                <a16:creationId xmlns="" xmlns:a16="http://schemas.microsoft.com/office/drawing/2014/main" id="{D0B87F8E-5D83-4513-9285-8A122C4A62CB}"/>
+                <a16:creationId xmlns:a16="http://schemas.microsoft.com/office/drawing/2014/main" id="{D0B87F8E-5D83-4513-9285-8A122C4A62CB}"/>
               </a:ext>
             </a:extLst>
           </p:cNvPr>
@@ -6311,7 +6439,7 @@
           <p:cNvPr id="5" name="Straight Connector 4">
             <a:extLst>
               <a:ext uri="{FF2B5EF4-FFF2-40B4-BE49-F238E27FC236}">
-                <a16:creationId xmlns="" xmlns:a16="http://schemas.microsoft.com/office/drawing/2014/main" id="{86EF85BD-B585-F4FA-AB4B-371C19D22622}"/>
+                <a16:creationId xmlns:a16="http://schemas.microsoft.com/office/drawing/2014/main" id="{86EF85BD-B585-F4FA-AB4B-371C19D22622}"/>
               </a:ext>
             </a:extLst>
           </p:cNvPr>
@@ -6355,7 +6483,7 @@
           <p:cNvPr id="4" name="TextBox 3">
             <a:extLst>
               <a:ext uri="{FF2B5EF4-FFF2-40B4-BE49-F238E27FC236}">
-                <a16:creationId xmlns="" xmlns:a16="http://schemas.microsoft.com/office/drawing/2014/main" id="{82DAD499-FD02-A701-175D-A67C401A6F59}"/>
+                <a16:creationId xmlns:a16="http://schemas.microsoft.com/office/drawing/2014/main" id="{82DAD499-FD02-A701-175D-A67C401A6F59}"/>
               </a:ext>
             </a:extLst>
           </p:cNvPr>
@@ -6486,7 +6614,7 @@
           <p:cNvPr id="2" name="Title 1">
             <a:extLst>
               <a:ext uri="{FF2B5EF4-FFF2-40B4-BE49-F238E27FC236}">
-                <a16:creationId xmlns="" xmlns:a16="http://schemas.microsoft.com/office/drawing/2014/main" id="{C522C03A-1F25-FFCB-9A59-564E472BE731}"/>
+                <a16:creationId xmlns:a16="http://schemas.microsoft.com/office/drawing/2014/main" id="{C522C03A-1F25-FFCB-9A59-564E472BE731}"/>
               </a:ext>
             </a:extLst>
           </p:cNvPr>
@@ -6514,7 +6642,7 @@
           <p:cNvPr id="3" name="Content Placeholder 2">
             <a:extLst>
               <a:ext uri="{FF2B5EF4-FFF2-40B4-BE49-F238E27FC236}">
-                <a16:creationId xmlns="" xmlns:a16="http://schemas.microsoft.com/office/drawing/2014/main" id="{4928701A-C732-A649-3B69-6F919769FA47}"/>
+                <a16:creationId xmlns:a16="http://schemas.microsoft.com/office/drawing/2014/main" id="{4928701A-C732-A649-3B69-6F919769FA47}"/>
               </a:ext>
             </a:extLst>
           </p:cNvPr>
@@ -6652,7 +6780,7 @@
           <p:cNvPr id="2" name="Title 1">
             <a:extLst>
               <a:ext uri="{FF2B5EF4-FFF2-40B4-BE49-F238E27FC236}">
-                <a16:creationId xmlns="" xmlns:a16="http://schemas.microsoft.com/office/drawing/2014/main" id="{C522C03A-1F25-FFCB-9A59-564E472BE731}"/>
+                <a16:creationId xmlns:a16="http://schemas.microsoft.com/office/drawing/2014/main" id="{C522C03A-1F25-FFCB-9A59-564E472BE731}"/>
               </a:ext>
             </a:extLst>
           </p:cNvPr>
@@ -6683,7 +6811,7 @@
           <p:cNvPr id="3" name="Content Placeholder 2">
             <a:extLst>
               <a:ext uri="{FF2B5EF4-FFF2-40B4-BE49-F238E27FC236}">
-                <a16:creationId xmlns="" xmlns:a16="http://schemas.microsoft.com/office/drawing/2014/main" id="{4928701A-C732-A649-3B69-6F919769FA47}"/>
+                <a16:creationId xmlns:a16="http://schemas.microsoft.com/office/drawing/2014/main" id="{4928701A-C732-A649-3B69-6F919769FA47}"/>
               </a:ext>
             </a:extLst>
           </p:cNvPr>
@@ -6766,7 +6894,7 @@
           <p:cNvPr id="2" name="Title 1">
             <a:extLst>
               <a:ext uri="{FF2B5EF4-FFF2-40B4-BE49-F238E27FC236}">
-                <a16:creationId xmlns="" xmlns:a16="http://schemas.microsoft.com/office/drawing/2014/main" id="{82A22F9F-30AD-859E-B701-92F7A256856D}"/>
+                <a16:creationId xmlns:a16="http://schemas.microsoft.com/office/drawing/2014/main" id="{82A22F9F-30AD-859E-B701-92F7A256856D}"/>
               </a:ext>
             </a:extLst>
           </p:cNvPr>
@@ -6798,7 +6926,7 @@
               <p:cNvPr id="3" name="Content Placeholder 2">
                 <a:extLst>
                   <a:ext uri="{FF2B5EF4-FFF2-40B4-BE49-F238E27FC236}">
-                    <a16:creationId xmlns="" xmlns:a16="http://schemas.microsoft.com/office/drawing/2014/main" id="{49BF805F-408E-585C-FCBE-9B0FA5EA3A8C}"/>
+                    <a16:creationId xmlns:a16="http://schemas.microsoft.com/office/drawing/2014/main" id="{49BF805F-408E-585C-FCBE-9B0FA5EA3A8C}"/>
                   </a:ext>
                 </a:extLst>
               </p:cNvPr>
@@ -6822,7 +6950,7 @@
               <a:lstStyle/>
               <a:p>
                 <a:r>
-                  <a:rPr lang="en-US" sz="3200" dirty="0" smtClean="0"/>
+                  <a:rPr lang="en-US" sz="3200" dirty="0"/>
                   <a:t>We can approximate how close two blocks of code are by computing string similarity on just the hash codes from LSH.</a:t>
                 </a:r>
               </a:p>
@@ -6830,15 +6958,7 @@
                 <a:pPr lvl="1"/>
                 <a:r>
                   <a:rPr lang="en-US" sz="2800" dirty="0"/>
-                  <a:t>It is much cheaper than checking </a:t>
-                </a:r>
-                <a:r>
-                  <a:rPr lang="en-US" sz="2800" dirty="0" smtClean="0"/>
-                  <a:t>the </a:t>
-                </a:r>
-                <a:r>
-                  <a:rPr lang="en-US" sz="2800" dirty="0"/>
-                  <a:t>whole </a:t>
+                  <a:t>It is much cheaper than checking the whole </a:t>
                 </a:r>
                 <a:r>
                   <a:rPr lang="en-US" sz="2800" dirty="0" err="1"/>
@@ -6876,11 +6996,7 @@
                 </a:r>
                 <a:r>
                   <a:rPr lang="en-US" sz="3200" dirty="0"/>
-                  <a:t> </a:t>
-                </a:r>
-                <a:r>
-                  <a:rPr lang="en-US" sz="3200" dirty="0" smtClean="0"/>
-                  <a:t>(</a:t>
+                  <a:t> (</a:t>
                 </a:r>
                 <a:r>
                   <a:rPr lang="en-US" sz="3200" dirty="0" err="1">
@@ -6898,21 +7014,17 @@
                 <a:pPr lvl="1"/>
                 <a:r>
                   <a:rPr lang="en-US" sz="2800" dirty="0"/>
-                  <a:t>Distance = # of edits needed to convert s1 into </a:t>
-                </a:r>
-                <a:r>
-                  <a:rPr lang="en-US" sz="2800" dirty="0" smtClean="0"/>
-                  <a:t>s2</a:t>
+                  <a:t>Distance = # of edits needed to convert s1 into s2</a:t>
                 </a:r>
               </a:p>
               <a:p>
                 <a:pPr lvl="1"/>
                 <a:r>
-                  <a:rPr lang="en-US" sz="2800" dirty="0" smtClean="0"/>
+                  <a:rPr lang="en-US" sz="2800" dirty="0"/>
                   <a:t>Edits = </a:t>
                 </a:r>
                 <a:r>
-                  <a:rPr lang="en-US" sz="2800" dirty="0" smtClean="0">
+                  <a:rPr lang="en-US" sz="2800" dirty="0">
                     <a:solidFill>
                       <a:schemeClr val="accent5"/>
                     </a:solidFill>
@@ -6920,11 +7032,11 @@
                   <a:t>change</a:t>
                 </a:r>
                 <a:r>
-                  <a:rPr lang="en-US" sz="2800" dirty="0" smtClean="0"/>
+                  <a:rPr lang="en-US" sz="2800" dirty="0"/>
                   <a:t>, </a:t>
                 </a:r>
                 <a:r>
-                  <a:rPr lang="en-US" sz="2800" dirty="0" smtClean="0">
+                  <a:rPr lang="en-US" sz="2800" dirty="0">
                     <a:solidFill>
                       <a:schemeClr val="accent6"/>
                     </a:solidFill>
@@ -6932,11 +7044,11 @@
                   <a:t>add</a:t>
                 </a:r>
                 <a:r>
-                  <a:rPr lang="en-US" sz="2800" dirty="0" smtClean="0"/>
+                  <a:rPr lang="en-US" sz="2800" dirty="0"/>
                   <a:t>, or </a:t>
                 </a:r>
                 <a:r>
-                  <a:rPr lang="en-US" sz="2800" dirty="0" smtClean="0">
+                  <a:rPr lang="en-US" sz="2800" dirty="0">
                     <a:solidFill>
                       <a:srgbClr val="FF0000"/>
                     </a:solidFill>
@@ -6944,7 +7056,7 @@
                   <a:t>delete</a:t>
                 </a:r>
                 <a:r>
-                  <a:rPr lang="en-US" sz="2800" dirty="0" smtClean="0"/>
+                  <a:rPr lang="en-US" sz="2800" dirty="0"/>
                   <a:t> one character.</a:t>
                 </a:r>
               </a:p>
@@ -7051,7 +7163,7 @@
                     </m:f>
                   </m:oMath>
                 </a14:m>
-                <a:endParaRPr lang="en-US" sz="2800" dirty="0" smtClean="0"/>
+                <a:endParaRPr lang="en-US" sz="2800" dirty="0"/>
               </a:p>
             </p:txBody>
           </p:sp>
@@ -7104,6 +7216,248 @@
     <p:extLst>
       <p:ext uri="{BB962C8B-B14F-4D97-AF65-F5344CB8AC3E}">
         <p14:creationId xmlns:p14="http://schemas.microsoft.com/office/powerpoint/2010/main" val="2475185730"/>
+      </p:ext>
+    </p:extLst>
+  </p:cSld>
+  <p:clrMapOvr>
+    <a:masterClrMapping/>
+  </p:clrMapOvr>
+</p:sld>
+</file>
+
+<file path=ppt/slides/slide8.xml><?xml version="1.0" encoding="utf-8"?>
+<p:sld xmlns:a="http://schemas.openxmlformats.org/drawingml/2006/main" xmlns:r="http://schemas.openxmlformats.org/officeDocument/2006/relationships" xmlns:p="http://schemas.openxmlformats.org/presentationml/2006/main">
+  <p:cSld>
+    <p:spTree>
+      <p:nvGrpSpPr>
+        <p:cNvPr id="1" name=""/>
+        <p:cNvGrpSpPr/>
+        <p:nvPr/>
+      </p:nvGrpSpPr>
+      <p:grpSpPr>
+        <a:xfrm>
+          <a:off x="0" y="0"/>
+          <a:ext cx="0" cy="0"/>
+          <a:chOff x="0" y="0"/>
+          <a:chExt cx="0" cy="0"/>
+        </a:xfrm>
+      </p:grpSpPr>
+      <p:sp>
+        <p:nvSpPr>
+          <p:cNvPr id="2" name="Title 1">
+            <a:extLst>
+              <a:ext uri="{FF2B5EF4-FFF2-40B4-BE49-F238E27FC236}">
+                <a16:creationId xmlns:a16="http://schemas.microsoft.com/office/drawing/2014/main" id="{82A22F9F-30AD-859E-B701-92F7A256856D}"/>
+              </a:ext>
+            </a:extLst>
+          </p:cNvPr>
+          <p:cNvSpPr>
+            <a:spLocks noGrp="1"/>
+          </p:cNvSpPr>
+          <p:nvPr>
+            <p:ph type="title"/>
+          </p:nvPr>
+        </p:nvSpPr>
+        <p:spPr/>
+        <p:txBody>
+          <a:bodyPr>
+            <a:noAutofit/>
+          </a:bodyPr>
+          <a:lstStyle/>
+          <a:p>
+            <a:r>
+              <a:rPr lang="en-US" dirty="0"/>
+              <a:t>Tokenizer</a:t>
+            </a:r>
+          </a:p>
+        </p:txBody>
+      </p:sp>
+      <p:sp>
+        <p:nvSpPr>
+          <p:cNvPr id="3" name="Content Placeholder 2">
+            <a:extLst>
+              <a:ext uri="{FF2B5EF4-FFF2-40B4-BE49-F238E27FC236}">
+                <a16:creationId xmlns:a16="http://schemas.microsoft.com/office/drawing/2014/main" id="{49BF805F-408E-585C-FCBE-9B0FA5EA3A8C}"/>
+              </a:ext>
+            </a:extLst>
+          </p:cNvPr>
+          <p:cNvSpPr>
+            <a:spLocks noGrp="1"/>
+          </p:cNvSpPr>
+          <p:nvPr>
+            <p:ph idx="1"/>
+          </p:nvPr>
+        </p:nvSpPr>
+        <p:spPr>
+          <a:xfrm>
+            <a:off x="838200" y="1635620"/>
+            <a:ext cx="10515600" cy="4515798"/>
+          </a:xfrm>
+        </p:spPr>
+        <p:txBody>
+          <a:bodyPr>
+            <a:normAutofit/>
+          </a:bodyPr>
+          <a:lstStyle/>
+          <a:p>
+            <a:r>
+              <a:rPr lang="en-US" dirty="0"/>
+              <a:t>The tokenizer is very basic, all it does is remove inconsistencies in variable/function names</a:t>
+            </a:r>
+          </a:p>
+          <a:p>
+            <a:r>
+              <a:rPr lang="en-US" dirty="0"/>
+              <a:t>It does this utilizing pythons tokenize library and replaces the names of variables with a consistent naming scheme</a:t>
+            </a:r>
+          </a:p>
+          <a:p>
+            <a:pPr lvl="1"/>
+            <a:r>
+              <a:rPr lang="en-US" dirty="0"/>
+              <a:t>This will even include things like print or type statements.</a:t>
+            </a:r>
+          </a:p>
+          <a:p>
+            <a:r>
+              <a:rPr lang="en-US" dirty="0"/>
+              <a:t>As of right now it only supports python, but it can be easily expanded in the future to include other languages</a:t>
+            </a:r>
+          </a:p>
+          <a:p>
+            <a:pPr lvl="1"/>
+            <a:r>
+              <a:rPr lang="en-US" dirty="0"/>
+              <a:t>Such as C, for which there is a similar library</a:t>
+            </a:r>
+          </a:p>
+        </p:txBody>
+      </p:sp>
+    </p:spTree>
+    <p:extLst>
+      <p:ext uri="{BB962C8B-B14F-4D97-AF65-F5344CB8AC3E}">
+        <p14:creationId xmlns:p14="http://schemas.microsoft.com/office/powerpoint/2010/main" val="4123943842"/>
+      </p:ext>
+    </p:extLst>
+  </p:cSld>
+  <p:clrMapOvr>
+    <a:masterClrMapping/>
+  </p:clrMapOvr>
+</p:sld>
+</file>
+
+<file path=ppt/slides/slide9.xml><?xml version="1.0" encoding="utf-8"?>
+<p:sld xmlns:a="http://schemas.openxmlformats.org/drawingml/2006/main" xmlns:r="http://schemas.openxmlformats.org/officeDocument/2006/relationships" xmlns:p="http://schemas.openxmlformats.org/presentationml/2006/main">
+  <p:cSld>
+    <p:spTree>
+      <p:nvGrpSpPr>
+        <p:cNvPr id="1" name=""/>
+        <p:cNvGrpSpPr/>
+        <p:nvPr/>
+      </p:nvGrpSpPr>
+      <p:grpSpPr>
+        <a:xfrm>
+          <a:off x="0" y="0"/>
+          <a:ext cx="0" cy="0"/>
+          <a:chOff x="0" y="0"/>
+          <a:chExt cx="0" cy="0"/>
+        </a:xfrm>
+      </p:grpSpPr>
+      <p:sp>
+        <p:nvSpPr>
+          <p:cNvPr id="2" name="Title 1">
+            <a:extLst>
+              <a:ext uri="{FF2B5EF4-FFF2-40B4-BE49-F238E27FC236}">
+                <a16:creationId xmlns:a16="http://schemas.microsoft.com/office/drawing/2014/main" id="{82A22F9F-30AD-859E-B701-92F7A256856D}"/>
+              </a:ext>
+            </a:extLst>
+          </p:cNvPr>
+          <p:cNvSpPr>
+            <a:spLocks noGrp="1"/>
+          </p:cNvSpPr>
+          <p:nvPr>
+            <p:ph type="title"/>
+          </p:nvPr>
+        </p:nvSpPr>
+        <p:spPr/>
+        <p:txBody>
+          <a:bodyPr>
+            <a:noAutofit/>
+          </a:bodyPr>
+          <a:lstStyle/>
+          <a:p>
+            <a:r>
+              <a:rPr lang="en-US" dirty="0"/>
+              <a:t>Test Data</a:t>
+            </a:r>
+          </a:p>
+        </p:txBody>
+      </p:sp>
+      <p:sp>
+        <p:nvSpPr>
+          <p:cNvPr id="3" name="Content Placeholder 2">
+            <a:extLst>
+              <a:ext uri="{FF2B5EF4-FFF2-40B4-BE49-F238E27FC236}">
+                <a16:creationId xmlns:a16="http://schemas.microsoft.com/office/drawing/2014/main" id="{49BF805F-408E-585C-FCBE-9B0FA5EA3A8C}"/>
+              </a:ext>
+            </a:extLst>
+          </p:cNvPr>
+          <p:cNvSpPr>
+            <a:spLocks noGrp="1"/>
+          </p:cNvSpPr>
+          <p:nvPr>
+            <p:ph idx="1"/>
+          </p:nvPr>
+        </p:nvSpPr>
+        <p:spPr>
+          <a:xfrm>
+            <a:off x="838200" y="1635620"/>
+            <a:ext cx="10515600" cy="4515798"/>
+          </a:xfrm>
+        </p:spPr>
+        <p:txBody>
+          <a:bodyPr>
+            <a:normAutofit/>
+          </a:bodyPr>
+          <a:lstStyle/>
+          <a:p>
+            <a:r>
+              <a:rPr lang="en-US" dirty="0"/>
+              <a:t>Our method was tested with a dataset extracted rom the competitive programming site https://atcoder.jp/.</a:t>
+            </a:r>
+          </a:p>
+          <a:p>
+            <a:r>
+              <a:rPr lang="en-US" dirty="0"/>
+              <a:t>All the data is on our </a:t>
+            </a:r>
+            <a:r>
+              <a:rPr lang="en-US" dirty="0" err="1"/>
+              <a:t>github</a:t>
+            </a:r>
+            <a:r>
+              <a:rPr lang="en-US" dirty="0"/>
+              <a:t> page under dataset</a:t>
+            </a:r>
+          </a:p>
+          <a:p>
+            <a:r>
+              <a:rPr lang="en-US" dirty="0"/>
+              <a:t>The dataset primarily consists of python code submitted to competitions and is organized by event</a:t>
+            </a:r>
+          </a:p>
+          <a:p>
+            <a:endParaRPr lang="en-US" dirty="0"/>
+          </a:p>
+          <a:p>
+            <a:endParaRPr lang="en-US" dirty="0"/>
+          </a:p>
+        </p:txBody>
+      </p:sp>
+    </p:spTree>
+    <p:extLst>
+      <p:ext uri="{BB962C8B-B14F-4D97-AF65-F5344CB8AC3E}">
+        <p14:creationId xmlns:p14="http://schemas.microsoft.com/office/powerpoint/2010/main" val="1550236583"/>
       </p:ext>
     </p:extLst>
   </p:cSld>

</xml_diff>

<commit_message>
bold text on diagram
</commit_message>
<xml_diff>
--- a/presentation.pptx
+++ b/presentation.pptx
@@ -5465,8 +5465,12 @@
           <a:p>
             <a:pPr algn="ctr"/>
             <a:r>
+              <a:rPr lang="en-US" b="1" dirty="0"/>
+              <a:t>Hash similarity</a:t>
+            </a:r>
+            <a:r>
               <a:rPr lang="en-US" dirty="0"/>
-              <a:t>Hash similarity?</a:t>
+              <a:t>?</a:t>
             </a:r>
           </a:p>
         </p:txBody>
@@ -5651,7 +5655,7 @@
           <a:p>
             <a:pPr algn="ctr"/>
             <a:r>
-              <a:rPr lang="en-US" dirty="0"/>
+              <a:rPr lang="en-US" b="1" dirty="0"/>
               <a:t>Tokenized yet?</a:t>
             </a:r>
           </a:p>
@@ -5841,7 +5845,7 @@
           <a:p>
             <a:pPr algn="ctr"/>
             <a:r>
-              <a:rPr lang="en-US" dirty="0"/>
+              <a:rPr lang="en-US" b="1" dirty="0"/>
               <a:t>Tokenized yet?</a:t>
             </a:r>
           </a:p>

</xml_diff>